<commit_message>
Update diagrams and add details
</commit_message>
<xml_diff>
--- a/docs/Diagrams.pptx
+++ b/docs/Diagrams.pptx
@@ -5,8 +5,9 @@
     <p:sldMasterId id="2147483648" r:id="rId1"/>
   </p:sldMasterIdLst>
   <p:sldIdLst>
-    <p:sldId id="256" r:id="rId2"/>
+    <p:sldId id="259" r:id="rId2"/>
     <p:sldId id="257" r:id="rId3"/>
+    <p:sldId id="260" r:id="rId4"/>
   </p:sldIdLst>
   <p:sldSz cx="9144000" cy="6858000" type="screen4x3"/>
   <p:notesSz cx="6858000" cy="9144000"/>
@@ -289,7 +290,7 @@
           <a:p>
             <a:fld id="{484EC519-DF3B-6F48-A9CC-901916BC8766}" type="datetimeFigureOut">
               <a:rPr lang="en-US" smtClean="0"/>
-              <a:t>12/11/17</a:t>
+              <a:t>13/11/17</a:t>
             </a:fld>
             <a:endParaRPr lang="en-US"/>
           </a:p>
@@ -459,7 +460,7 @@
           <a:p>
             <a:fld id="{484EC519-DF3B-6F48-A9CC-901916BC8766}" type="datetimeFigureOut">
               <a:rPr lang="en-US" smtClean="0"/>
-              <a:t>12/11/17</a:t>
+              <a:t>13/11/17</a:t>
             </a:fld>
             <a:endParaRPr lang="en-US"/>
           </a:p>
@@ -639,7 +640,7 @@
           <a:p>
             <a:fld id="{484EC519-DF3B-6F48-A9CC-901916BC8766}" type="datetimeFigureOut">
               <a:rPr lang="en-US" smtClean="0"/>
-              <a:t>12/11/17</a:t>
+              <a:t>13/11/17</a:t>
             </a:fld>
             <a:endParaRPr lang="en-US"/>
           </a:p>
@@ -809,7 +810,7 @@
           <a:p>
             <a:fld id="{484EC519-DF3B-6F48-A9CC-901916BC8766}" type="datetimeFigureOut">
               <a:rPr lang="en-US" smtClean="0"/>
-              <a:t>12/11/17</a:t>
+              <a:t>13/11/17</a:t>
             </a:fld>
             <a:endParaRPr lang="en-US"/>
           </a:p>
@@ -1055,7 +1056,7 @@
           <a:p>
             <a:fld id="{484EC519-DF3B-6F48-A9CC-901916BC8766}" type="datetimeFigureOut">
               <a:rPr lang="en-US" smtClean="0"/>
-              <a:t>12/11/17</a:t>
+              <a:t>13/11/17</a:t>
             </a:fld>
             <a:endParaRPr lang="en-US"/>
           </a:p>
@@ -1343,7 +1344,7 @@
           <a:p>
             <a:fld id="{484EC519-DF3B-6F48-A9CC-901916BC8766}" type="datetimeFigureOut">
               <a:rPr lang="en-US" smtClean="0"/>
-              <a:t>12/11/17</a:t>
+              <a:t>13/11/17</a:t>
             </a:fld>
             <a:endParaRPr lang="en-US"/>
           </a:p>
@@ -1765,7 +1766,7 @@
           <a:p>
             <a:fld id="{484EC519-DF3B-6F48-A9CC-901916BC8766}" type="datetimeFigureOut">
               <a:rPr lang="en-US" smtClean="0"/>
-              <a:t>12/11/17</a:t>
+              <a:t>13/11/17</a:t>
             </a:fld>
             <a:endParaRPr lang="en-US"/>
           </a:p>
@@ -1883,7 +1884,7 @@
           <a:p>
             <a:fld id="{484EC519-DF3B-6F48-A9CC-901916BC8766}" type="datetimeFigureOut">
               <a:rPr lang="en-US" smtClean="0"/>
-              <a:t>12/11/17</a:t>
+              <a:t>13/11/17</a:t>
             </a:fld>
             <a:endParaRPr lang="en-US"/>
           </a:p>
@@ -1978,7 +1979,7 @@
           <a:p>
             <a:fld id="{484EC519-DF3B-6F48-A9CC-901916BC8766}" type="datetimeFigureOut">
               <a:rPr lang="en-US" smtClean="0"/>
-              <a:t>12/11/17</a:t>
+              <a:t>13/11/17</a:t>
             </a:fld>
             <a:endParaRPr lang="en-US"/>
           </a:p>
@@ -2255,7 +2256,7 @@
           <a:p>
             <a:fld id="{484EC519-DF3B-6F48-A9CC-901916BC8766}" type="datetimeFigureOut">
               <a:rPr lang="en-US" smtClean="0"/>
-              <a:t>12/11/17</a:t>
+              <a:t>13/11/17</a:t>
             </a:fld>
             <a:endParaRPr lang="en-US"/>
           </a:p>
@@ -2508,7 +2509,7 @@
           <a:p>
             <a:fld id="{484EC519-DF3B-6F48-A9CC-901916BC8766}" type="datetimeFigureOut">
               <a:rPr lang="en-US" smtClean="0"/>
-              <a:t>12/11/17</a:t>
+              <a:t>13/11/17</a:t>
             </a:fld>
             <a:endParaRPr lang="en-US"/>
           </a:p>
@@ -2721,7 +2722,7 @@
           <a:p>
             <a:fld id="{484EC519-DF3B-6F48-A9CC-901916BC8766}" type="datetimeFigureOut">
               <a:rPr lang="en-US" smtClean="0"/>
-              <a:t>12/11/17</a:t>
+              <a:t>13/11/17</a:t>
             </a:fld>
             <a:endParaRPr lang="en-US"/>
           </a:p>
@@ -3096,404 +3097,906 @@
           <a:chExt cx="0" cy="0"/>
         </a:xfrm>
       </p:grpSpPr>
-      <p:sp>
-        <p:nvSpPr>
-          <p:cNvPr id="35" name="Rectangle 34"/>
-          <p:cNvSpPr/>
+      <p:grpSp>
+        <p:nvGrpSpPr>
+          <p:cNvPr id="74" name="Group 73"/>
+          <p:cNvGrpSpPr/>
           <p:nvPr/>
-        </p:nvSpPr>
-        <p:spPr>
+        </p:nvGrpSpPr>
+        <p:grpSpPr>
           <a:xfrm>
-            <a:off x="1584969" y="1125506"/>
-            <a:ext cx="7008293" cy="4166853"/>
+            <a:off x="358634" y="268929"/>
+            <a:ext cx="8234766" cy="6456017"/>
+            <a:chOff x="358634" y="268929"/>
+            <a:chExt cx="8234766" cy="6456017"/>
           </a:xfrm>
-          <a:prstGeom prst="rect">
-            <a:avLst/>
-          </a:prstGeom>
-        </p:spPr>
-        <p:style>
-          <a:lnRef idx="2">
-            <a:schemeClr val="dk1"/>
-          </a:lnRef>
-          <a:fillRef idx="1">
-            <a:schemeClr val="lt1"/>
-          </a:fillRef>
-          <a:effectRef idx="0">
-            <a:schemeClr val="dk1"/>
-          </a:effectRef>
-          <a:fontRef idx="minor">
-            <a:schemeClr val="dk1"/>
-          </a:fontRef>
-        </p:style>
-        <p:txBody>
-          <a:bodyPr rtlCol="0" anchor="ctr"/>
-          <a:lstStyle/>
-          <a:p>
-            <a:pPr algn="ctr"/>
-            <a:endParaRPr lang="en-US"/>
-          </a:p>
-        </p:txBody>
-      </p:sp>
-      <p:sp>
-        <p:nvSpPr>
-          <p:cNvPr id="4" name="Rounded Rectangle 3"/>
-          <p:cNvSpPr/>
-          <p:nvPr/>
-        </p:nvSpPr>
-        <p:spPr>
-          <a:xfrm>
-            <a:off x="5808866" y="1513745"/>
-            <a:ext cx="2160000" cy="1080000"/>
-          </a:xfrm>
-          <a:prstGeom prst="roundRect">
-            <a:avLst/>
-          </a:prstGeom>
-          <a:effectLst/>
-        </p:spPr>
-        <p:style>
-          <a:lnRef idx="2">
-            <a:schemeClr val="accent6">
-              <a:shade val="50000"/>
-            </a:schemeClr>
-          </a:lnRef>
-          <a:fillRef idx="1">
-            <a:schemeClr val="accent6"/>
-          </a:fillRef>
-          <a:effectRef idx="0">
-            <a:schemeClr val="accent6"/>
-          </a:effectRef>
-          <a:fontRef idx="minor">
-            <a:schemeClr val="lt1"/>
-          </a:fontRef>
-        </p:style>
-        <p:txBody>
-          <a:bodyPr rtlCol="0" anchor="ctr"/>
-          <a:lstStyle/>
-          <a:p>
-            <a:pPr algn="ctr"/>
-            <a:r>
-              <a:rPr lang="en-US" dirty="0" smtClean="0"/>
-              <a:t>Logic</a:t>
-            </a:r>
-          </a:p>
-        </p:txBody>
-      </p:sp>
-      <p:sp>
-        <p:nvSpPr>
-          <p:cNvPr id="6" name="Rounded Rectangle 5"/>
-          <p:cNvSpPr/>
-          <p:nvPr/>
-        </p:nvSpPr>
-        <p:spPr>
-          <a:xfrm>
-            <a:off x="5808866" y="3759300"/>
-            <a:ext cx="2160000" cy="1080000"/>
-          </a:xfrm>
-          <a:prstGeom prst="roundRect">
-            <a:avLst/>
-          </a:prstGeom>
-          <a:effectLst/>
-        </p:spPr>
-        <p:style>
-          <a:lnRef idx="2">
-            <a:schemeClr val="accent3">
-              <a:shade val="50000"/>
-            </a:schemeClr>
-          </a:lnRef>
-          <a:fillRef idx="1">
-            <a:schemeClr val="accent3"/>
-          </a:fillRef>
-          <a:effectRef idx="0">
-            <a:schemeClr val="accent3"/>
-          </a:effectRef>
-          <a:fontRef idx="minor">
-            <a:schemeClr val="lt1"/>
-          </a:fontRef>
-        </p:style>
-        <p:txBody>
-          <a:bodyPr rtlCol="0" anchor="ctr"/>
-          <a:lstStyle/>
-          <a:p>
-            <a:pPr algn="ctr"/>
-            <a:r>
-              <a:rPr lang="en-US" dirty="0" smtClean="0"/>
-              <a:t>Model</a:t>
-            </a:r>
-          </a:p>
-        </p:txBody>
-      </p:sp>
-      <p:sp>
-        <p:nvSpPr>
-          <p:cNvPr id="5" name="Rounded Rectangle 4"/>
-          <p:cNvSpPr/>
-          <p:nvPr/>
-        </p:nvSpPr>
-        <p:spPr>
-          <a:xfrm>
-            <a:off x="2054494" y="1513746"/>
-            <a:ext cx="2160000" cy="1080000"/>
-          </a:xfrm>
-          <a:prstGeom prst="roundRect">
-            <a:avLst/>
-          </a:prstGeom>
-          <a:effectLst/>
-        </p:spPr>
-        <p:style>
-          <a:lnRef idx="2">
-            <a:schemeClr val="accent5">
-              <a:shade val="50000"/>
-            </a:schemeClr>
-          </a:lnRef>
-          <a:fillRef idx="1">
-            <a:schemeClr val="accent5"/>
-          </a:fillRef>
-          <a:effectRef idx="0">
-            <a:schemeClr val="accent5"/>
-          </a:effectRef>
-          <a:fontRef idx="minor">
-            <a:schemeClr val="lt1"/>
-          </a:fontRef>
-        </p:style>
-        <p:txBody>
-          <a:bodyPr rtlCol="0" anchor="ctr"/>
-          <a:lstStyle/>
-          <a:p>
-            <a:pPr algn="ctr"/>
-            <a:r>
-              <a:rPr lang="en-US" dirty="0" smtClean="0"/>
-              <a:t>View</a:t>
-            </a:r>
-            <a:endParaRPr lang="en-US" dirty="0"/>
-          </a:p>
-        </p:txBody>
-      </p:sp>
-      <p:cxnSp>
-        <p:nvCxnSpPr>
-          <p:cNvPr id="42" name="Straight Arrow Connector 41"/>
-          <p:cNvCxnSpPr>
-            <a:stCxn id="5" idx="3"/>
-            <a:endCxn id="4" idx="1"/>
-          </p:cNvCxnSpPr>
-          <p:nvPr/>
-        </p:nvCxnSpPr>
-        <p:spPr>
-          <a:xfrm flipV="1">
-            <a:off x="4214494" y="2053745"/>
-            <a:ext cx="1594372" cy="1"/>
-          </a:xfrm>
-          <a:prstGeom prst="straightConnector1">
-            <a:avLst/>
-          </a:prstGeom>
-          <a:ln>
-            <a:tailEnd type="arrow"/>
-          </a:ln>
-          <a:effectLst/>
-        </p:spPr>
-        <p:style>
-          <a:lnRef idx="2">
-            <a:schemeClr val="dk1"/>
-          </a:lnRef>
-          <a:fillRef idx="0">
-            <a:schemeClr val="dk1"/>
-          </a:fillRef>
-          <a:effectRef idx="1">
-            <a:schemeClr val="dk1"/>
-          </a:effectRef>
-          <a:fontRef idx="minor">
-            <a:schemeClr val="tx1"/>
-          </a:fontRef>
-        </p:style>
-      </p:cxnSp>
-      <p:cxnSp>
-        <p:nvCxnSpPr>
-          <p:cNvPr id="45" name="Straight Arrow Connector 44"/>
-          <p:cNvCxnSpPr>
-            <a:stCxn id="4" idx="2"/>
-            <a:endCxn id="6" idx="0"/>
-          </p:cNvCxnSpPr>
-          <p:nvPr/>
-        </p:nvCxnSpPr>
-        <p:spPr>
-          <a:xfrm>
-            <a:off x="6888866" y="2593745"/>
-            <a:ext cx="0" cy="1165555"/>
-          </a:xfrm>
-          <a:prstGeom prst="straightConnector1">
-            <a:avLst/>
-          </a:prstGeom>
-          <a:ln>
-            <a:tailEnd type="arrow"/>
-          </a:ln>
-          <a:effectLst/>
-        </p:spPr>
-        <p:style>
-          <a:lnRef idx="2">
-            <a:schemeClr val="dk1"/>
-          </a:lnRef>
-          <a:fillRef idx="0">
-            <a:schemeClr val="dk1"/>
-          </a:fillRef>
-          <a:effectRef idx="1">
-            <a:schemeClr val="dk1"/>
-          </a:effectRef>
-          <a:fontRef idx="minor">
-            <a:schemeClr val="tx1"/>
-          </a:fontRef>
-        </p:style>
-      </p:cxnSp>
-      <p:sp>
-        <p:nvSpPr>
-          <p:cNvPr id="48" name="Rounded Rectangle 47"/>
-          <p:cNvSpPr/>
-          <p:nvPr/>
-        </p:nvSpPr>
-        <p:spPr>
-          <a:xfrm>
-            <a:off x="2054494" y="3759300"/>
-            <a:ext cx="2160000" cy="1080000"/>
-          </a:xfrm>
-          <a:prstGeom prst="roundRect">
-            <a:avLst/>
-          </a:prstGeom>
-        </p:spPr>
-        <p:style>
-          <a:lnRef idx="2">
-            <a:schemeClr val="accent2">
-              <a:shade val="50000"/>
-            </a:schemeClr>
-          </a:lnRef>
-          <a:fillRef idx="1">
-            <a:schemeClr val="accent2"/>
-          </a:fillRef>
-          <a:effectRef idx="0">
-            <a:schemeClr val="accent2"/>
-          </a:effectRef>
-          <a:fontRef idx="minor">
-            <a:schemeClr val="lt1"/>
-          </a:fontRef>
-        </p:style>
-        <p:txBody>
-          <a:bodyPr rtlCol="0" anchor="ctr"/>
-          <a:lstStyle/>
-          <a:p>
-            <a:pPr algn="ctr"/>
-            <a:r>
-              <a:rPr lang="en-US" dirty="0" err="1" smtClean="0"/>
-              <a:t>Util</a:t>
-            </a:r>
-            <a:endParaRPr lang="en-US" dirty="0"/>
-          </a:p>
-        </p:txBody>
-      </p:sp>
-      <p:sp>
-        <p:nvSpPr>
-          <p:cNvPr id="50" name="Smiley Face 49"/>
-          <p:cNvSpPr/>
-          <p:nvPr/>
-        </p:nvSpPr>
-        <p:spPr>
-          <a:xfrm>
-            <a:off x="310768" y="1604667"/>
-            <a:ext cx="914400" cy="914400"/>
-          </a:xfrm>
-          <a:prstGeom prst="smileyFace">
-            <a:avLst/>
-          </a:prstGeom>
-        </p:spPr>
-        <p:style>
-          <a:lnRef idx="2">
-            <a:schemeClr val="dk1"/>
-          </a:lnRef>
-          <a:fillRef idx="1">
-            <a:schemeClr val="lt1"/>
-          </a:fillRef>
-          <a:effectRef idx="0">
-            <a:schemeClr val="dk1"/>
-          </a:effectRef>
-          <a:fontRef idx="minor">
-            <a:schemeClr val="dk1"/>
-          </a:fontRef>
-        </p:style>
-        <p:txBody>
-          <a:bodyPr rtlCol="0" anchor="ctr"/>
-          <a:lstStyle/>
-          <a:p>
-            <a:pPr algn="ctr"/>
-            <a:endParaRPr lang="en-US"/>
-          </a:p>
-        </p:txBody>
-      </p:sp>
-      <p:cxnSp>
-        <p:nvCxnSpPr>
-          <p:cNvPr id="51" name="Straight Arrow Connector 50"/>
-          <p:cNvCxnSpPr>
-            <a:stCxn id="50" idx="6"/>
-          </p:cNvCxnSpPr>
-          <p:nvPr/>
-        </p:nvCxnSpPr>
-        <p:spPr>
-          <a:xfrm>
-            <a:off x="1225168" y="2061867"/>
-            <a:ext cx="829326" cy="0"/>
-          </a:xfrm>
-          <a:prstGeom prst="straightConnector1">
-            <a:avLst/>
-          </a:prstGeom>
-          <a:ln>
-            <a:prstDash val="dash"/>
-            <a:tailEnd type="arrow"/>
-          </a:ln>
-          <a:effectLst/>
-        </p:spPr>
-        <p:style>
-          <a:lnRef idx="2">
-            <a:schemeClr val="dk1"/>
-          </a:lnRef>
-          <a:fillRef idx="0">
-            <a:schemeClr val="dk1"/>
-          </a:fillRef>
-          <a:effectRef idx="1">
-            <a:schemeClr val="dk1"/>
-          </a:effectRef>
-          <a:fontRef idx="minor">
-            <a:schemeClr val="tx1"/>
-          </a:fontRef>
-        </p:style>
-      </p:cxnSp>
-      <p:sp>
-        <p:nvSpPr>
-          <p:cNvPr id="55" name="TextBox 54"/>
-          <p:cNvSpPr txBox="1"/>
-          <p:nvPr/>
-        </p:nvSpPr>
-        <p:spPr>
-          <a:xfrm>
-            <a:off x="3115792" y="445829"/>
-            <a:ext cx="2909621" cy="523220"/>
-          </a:xfrm>
-          <a:prstGeom prst="rect">
-            <a:avLst/>
-          </a:prstGeom>
-          <a:noFill/>
-        </p:spPr>
-        <p:txBody>
-          <a:bodyPr wrap="none" rtlCol="0">
-            <a:spAutoFit/>
-          </a:bodyPr>
-          <a:lstStyle/>
-          <a:p>
-            <a:r>
-              <a:rPr lang="en-US" sz="2800" dirty="0" smtClean="0"/>
-              <a:t>3 Tier Architecture</a:t>
-            </a:r>
-            <a:endParaRPr lang="en-US" sz="2800" dirty="0"/>
-          </a:p>
-        </p:txBody>
-      </p:sp>
+        </p:grpSpPr>
+        <p:sp>
+          <p:nvSpPr>
+            <p:cNvPr id="50" name="Smiley Face 49"/>
+            <p:cNvSpPr/>
+            <p:nvPr/>
+          </p:nvSpPr>
+          <p:spPr>
+            <a:xfrm>
+              <a:off x="358634" y="1239645"/>
+              <a:ext cx="914400" cy="914400"/>
+            </a:xfrm>
+            <a:prstGeom prst="smileyFace">
+              <a:avLst/>
+            </a:prstGeom>
+          </p:spPr>
+          <p:style>
+            <a:lnRef idx="2">
+              <a:schemeClr val="dk1"/>
+            </a:lnRef>
+            <a:fillRef idx="1">
+              <a:schemeClr val="lt1"/>
+            </a:fillRef>
+            <a:effectRef idx="0">
+              <a:schemeClr val="dk1"/>
+            </a:effectRef>
+            <a:fontRef idx="minor">
+              <a:schemeClr val="dk1"/>
+            </a:fontRef>
+          </p:style>
+          <p:txBody>
+            <a:bodyPr rtlCol="0" anchor="ctr"/>
+            <a:lstStyle/>
+            <a:p>
+              <a:pPr algn="ctr"/>
+              <a:endParaRPr lang="en-US"/>
+            </a:p>
+          </p:txBody>
+        </p:sp>
+        <p:grpSp>
+          <p:nvGrpSpPr>
+            <p:cNvPr id="9" name="Group 8"/>
+            <p:cNvGrpSpPr/>
+            <p:nvPr/>
+          </p:nvGrpSpPr>
+          <p:grpSpPr>
+            <a:xfrm>
+              <a:off x="1669832" y="3212353"/>
+              <a:ext cx="4066864" cy="3512593"/>
+              <a:chOff x="1836584" y="2048357"/>
+              <a:chExt cx="4066864" cy="3512593"/>
+            </a:xfrm>
+          </p:grpSpPr>
+          <p:sp>
+            <p:nvSpPr>
+              <p:cNvPr id="35" name="Rectangle 34"/>
+              <p:cNvSpPr/>
+              <p:nvPr/>
+            </p:nvSpPr>
+            <p:spPr>
+              <a:xfrm>
+                <a:off x="1836584" y="2048357"/>
+                <a:ext cx="4066864" cy="3512593"/>
+              </a:xfrm>
+              <a:prstGeom prst="rect">
+                <a:avLst/>
+              </a:prstGeom>
+            </p:spPr>
+            <p:style>
+              <a:lnRef idx="2">
+                <a:schemeClr val="dk1"/>
+              </a:lnRef>
+              <a:fillRef idx="1">
+                <a:schemeClr val="lt1"/>
+              </a:fillRef>
+              <a:effectRef idx="0">
+                <a:schemeClr val="dk1"/>
+              </a:effectRef>
+              <a:fontRef idx="minor">
+                <a:schemeClr val="dk1"/>
+              </a:fontRef>
+            </p:style>
+            <p:txBody>
+              <a:bodyPr rtlCol="0" anchor="ctr"/>
+              <a:lstStyle/>
+              <a:p>
+                <a:pPr algn="ctr"/>
+                <a:endParaRPr lang="en-US"/>
+              </a:p>
+            </p:txBody>
+          </p:sp>
+          <p:sp>
+            <p:nvSpPr>
+              <p:cNvPr id="4" name="Rounded Rectangle 3"/>
+              <p:cNvSpPr/>
+              <p:nvPr/>
+            </p:nvSpPr>
+            <p:spPr>
+              <a:xfrm>
+                <a:off x="4173958" y="4132421"/>
+                <a:ext cx="1440000" cy="720000"/>
+              </a:xfrm>
+              <a:prstGeom prst="roundRect">
+                <a:avLst/>
+              </a:prstGeom>
+              <a:effectLst/>
+            </p:spPr>
+            <p:style>
+              <a:lnRef idx="2">
+                <a:schemeClr val="accent6">
+                  <a:shade val="50000"/>
+                </a:schemeClr>
+              </a:lnRef>
+              <a:fillRef idx="1">
+                <a:schemeClr val="accent6"/>
+              </a:fillRef>
+              <a:effectRef idx="0">
+                <a:schemeClr val="accent6"/>
+              </a:effectRef>
+              <a:fontRef idx="minor">
+                <a:schemeClr val="lt1"/>
+              </a:fontRef>
+            </p:style>
+            <p:txBody>
+              <a:bodyPr rtlCol="0" anchor="ctr"/>
+              <a:lstStyle/>
+              <a:p>
+                <a:pPr algn="ctr"/>
+                <a:r>
+                  <a:rPr lang="en-US" dirty="0" smtClean="0"/>
+                  <a:t>Logic</a:t>
+                </a:r>
+              </a:p>
+            </p:txBody>
+          </p:sp>
+          <p:sp>
+            <p:nvSpPr>
+              <p:cNvPr id="6" name="Rounded Rectangle 5"/>
+              <p:cNvSpPr/>
+              <p:nvPr/>
+            </p:nvSpPr>
+            <p:spPr>
+              <a:xfrm>
+                <a:off x="2203942" y="4132421"/>
+                <a:ext cx="1440000" cy="720000"/>
+              </a:xfrm>
+              <a:prstGeom prst="roundRect">
+                <a:avLst/>
+              </a:prstGeom>
+              <a:effectLst/>
+            </p:spPr>
+            <p:style>
+              <a:lnRef idx="2">
+                <a:schemeClr val="accent3">
+                  <a:shade val="50000"/>
+                </a:schemeClr>
+              </a:lnRef>
+              <a:fillRef idx="1">
+                <a:schemeClr val="accent3"/>
+              </a:fillRef>
+              <a:effectRef idx="0">
+                <a:schemeClr val="accent3"/>
+              </a:effectRef>
+              <a:fontRef idx="minor">
+                <a:schemeClr val="lt1"/>
+              </a:fontRef>
+            </p:style>
+            <p:txBody>
+              <a:bodyPr rtlCol="0" anchor="ctr"/>
+              <a:lstStyle/>
+              <a:p>
+                <a:pPr algn="ctr"/>
+                <a:r>
+                  <a:rPr lang="en-US" dirty="0" smtClean="0"/>
+                  <a:t>Model</a:t>
+                </a:r>
+              </a:p>
+            </p:txBody>
+          </p:sp>
+          <p:sp>
+            <p:nvSpPr>
+              <p:cNvPr id="5" name="Rounded Rectangle 4"/>
+              <p:cNvSpPr/>
+              <p:nvPr/>
+            </p:nvSpPr>
+            <p:spPr>
+              <a:xfrm>
+                <a:off x="4173958" y="2945414"/>
+                <a:ext cx="1440000" cy="720000"/>
+              </a:xfrm>
+              <a:prstGeom prst="roundRect">
+                <a:avLst/>
+              </a:prstGeom>
+              <a:effectLst/>
+            </p:spPr>
+            <p:style>
+              <a:lnRef idx="2">
+                <a:schemeClr val="accent5">
+                  <a:shade val="50000"/>
+                </a:schemeClr>
+              </a:lnRef>
+              <a:fillRef idx="1">
+                <a:schemeClr val="accent5"/>
+              </a:fillRef>
+              <a:effectRef idx="0">
+                <a:schemeClr val="accent5"/>
+              </a:effectRef>
+              <a:fontRef idx="minor">
+                <a:schemeClr val="lt1"/>
+              </a:fontRef>
+            </p:style>
+            <p:txBody>
+              <a:bodyPr rtlCol="0" anchor="ctr"/>
+              <a:lstStyle/>
+              <a:p>
+                <a:pPr algn="ctr"/>
+                <a:r>
+                  <a:rPr lang="en-US" dirty="0" smtClean="0"/>
+                  <a:t>View</a:t>
+                </a:r>
+                <a:endParaRPr lang="en-US" dirty="0"/>
+              </a:p>
+            </p:txBody>
+          </p:sp>
+          <p:cxnSp>
+            <p:nvCxnSpPr>
+              <p:cNvPr id="42" name="Straight Arrow Connector 41"/>
+              <p:cNvCxnSpPr>
+                <a:stCxn id="5" idx="2"/>
+                <a:endCxn id="4" idx="0"/>
+              </p:cNvCxnSpPr>
+              <p:nvPr/>
+            </p:nvCxnSpPr>
+            <p:spPr>
+              <a:xfrm>
+                <a:off x="4893958" y="3665414"/>
+                <a:ext cx="0" cy="467007"/>
+              </a:xfrm>
+              <a:prstGeom prst="straightConnector1">
+                <a:avLst/>
+              </a:prstGeom>
+              <a:ln>
+                <a:tailEnd type="arrow"/>
+              </a:ln>
+              <a:effectLst/>
+            </p:spPr>
+            <p:style>
+              <a:lnRef idx="2">
+                <a:schemeClr val="dk1"/>
+              </a:lnRef>
+              <a:fillRef idx="0">
+                <a:schemeClr val="dk1"/>
+              </a:fillRef>
+              <a:effectRef idx="1">
+                <a:schemeClr val="dk1"/>
+              </a:effectRef>
+              <a:fontRef idx="minor">
+                <a:schemeClr val="tx1"/>
+              </a:fontRef>
+            </p:style>
+          </p:cxnSp>
+          <p:cxnSp>
+            <p:nvCxnSpPr>
+              <p:cNvPr id="45" name="Straight Arrow Connector 44"/>
+              <p:cNvCxnSpPr>
+                <a:stCxn id="4" idx="1"/>
+              </p:cNvCxnSpPr>
+              <p:nvPr/>
+            </p:nvCxnSpPr>
+            <p:spPr>
+              <a:xfrm flipH="1">
+                <a:off x="3643942" y="4492421"/>
+                <a:ext cx="530016" cy="0"/>
+              </a:xfrm>
+              <a:prstGeom prst="straightConnector1">
+                <a:avLst/>
+              </a:prstGeom>
+              <a:ln>
+                <a:tailEnd type="arrow"/>
+              </a:ln>
+              <a:effectLst/>
+            </p:spPr>
+            <p:style>
+              <a:lnRef idx="2">
+                <a:schemeClr val="dk1"/>
+              </a:lnRef>
+              <a:fillRef idx="0">
+                <a:schemeClr val="dk1"/>
+              </a:fillRef>
+              <a:effectRef idx="1">
+                <a:schemeClr val="dk1"/>
+              </a:effectRef>
+              <a:fontRef idx="minor">
+                <a:schemeClr val="tx1"/>
+              </a:fontRef>
+            </p:style>
+          </p:cxnSp>
+          <p:sp>
+            <p:nvSpPr>
+              <p:cNvPr id="48" name="Rounded Rectangle 47"/>
+              <p:cNvSpPr/>
+              <p:nvPr/>
+            </p:nvSpPr>
+            <p:spPr>
+              <a:xfrm>
+                <a:off x="2203942" y="2945414"/>
+                <a:ext cx="1440000" cy="720000"/>
+              </a:xfrm>
+              <a:prstGeom prst="roundRect">
+                <a:avLst/>
+              </a:prstGeom>
+            </p:spPr>
+            <p:style>
+              <a:lnRef idx="2">
+                <a:schemeClr val="accent2">
+                  <a:shade val="50000"/>
+                </a:schemeClr>
+              </a:lnRef>
+              <a:fillRef idx="1">
+                <a:schemeClr val="accent2"/>
+              </a:fillRef>
+              <a:effectRef idx="0">
+                <a:schemeClr val="accent2"/>
+              </a:effectRef>
+              <a:fontRef idx="minor">
+                <a:schemeClr val="lt1"/>
+              </a:fontRef>
+            </p:style>
+            <p:txBody>
+              <a:bodyPr rtlCol="0" anchor="ctr"/>
+              <a:lstStyle/>
+              <a:p>
+                <a:pPr algn="ctr"/>
+                <a:r>
+                  <a:rPr lang="en-US" dirty="0" err="1" smtClean="0"/>
+                  <a:t>Util</a:t>
+                </a:r>
+                <a:endParaRPr lang="en-US" dirty="0"/>
+              </a:p>
+            </p:txBody>
+          </p:sp>
+          <p:sp>
+            <p:nvSpPr>
+              <p:cNvPr id="15" name="TextBox 14"/>
+              <p:cNvSpPr txBox="1"/>
+              <p:nvPr/>
+            </p:nvSpPr>
+            <p:spPr>
+              <a:xfrm>
+                <a:off x="2020987" y="2257457"/>
+                <a:ext cx="1910950" cy="523220"/>
+              </a:xfrm>
+              <a:prstGeom prst="rect">
+                <a:avLst/>
+              </a:prstGeom>
+              <a:noFill/>
+            </p:spPr>
+            <p:txBody>
+              <a:bodyPr wrap="none" rtlCol="0">
+                <a:spAutoFit/>
+              </a:bodyPr>
+              <a:lstStyle/>
+              <a:p>
+                <a:r>
+                  <a:rPr lang="en-US" sz="2800" dirty="0" smtClean="0"/>
+                  <a:t>REST Server</a:t>
+                </a:r>
+                <a:endParaRPr lang="en-US" sz="2800" dirty="0"/>
+              </a:p>
+            </p:txBody>
+          </p:sp>
+        </p:grpSp>
+        <p:grpSp>
+          <p:nvGrpSpPr>
+            <p:cNvPr id="18" name="Group 17"/>
+            <p:cNvGrpSpPr/>
+            <p:nvPr/>
+          </p:nvGrpSpPr>
+          <p:grpSpPr>
+            <a:xfrm>
+              <a:off x="1669832" y="268929"/>
+              <a:ext cx="4066864" cy="2522398"/>
+              <a:chOff x="1836584" y="2048358"/>
+              <a:chExt cx="4066864" cy="2522398"/>
+            </a:xfrm>
+          </p:grpSpPr>
+          <p:sp>
+            <p:nvSpPr>
+              <p:cNvPr id="19" name="Rectangle 18"/>
+              <p:cNvSpPr/>
+              <p:nvPr/>
+            </p:nvSpPr>
+            <p:spPr>
+              <a:xfrm>
+                <a:off x="1836584" y="2048358"/>
+                <a:ext cx="4066864" cy="2522398"/>
+              </a:xfrm>
+              <a:prstGeom prst="rect">
+                <a:avLst/>
+              </a:prstGeom>
+            </p:spPr>
+            <p:style>
+              <a:lnRef idx="2">
+                <a:schemeClr val="dk1"/>
+              </a:lnRef>
+              <a:fillRef idx="1">
+                <a:schemeClr val="lt1"/>
+              </a:fillRef>
+              <a:effectRef idx="0">
+                <a:schemeClr val="dk1"/>
+              </a:effectRef>
+              <a:fontRef idx="minor">
+                <a:schemeClr val="dk1"/>
+              </a:fontRef>
+            </p:style>
+            <p:txBody>
+              <a:bodyPr rtlCol="0" anchor="ctr"/>
+              <a:lstStyle/>
+              <a:p>
+                <a:pPr algn="ctr"/>
+                <a:endParaRPr lang="en-US"/>
+              </a:p>
+            </p:txBody>
+          </p:sp>
+          <p:sp>
+            <p:nvSpPr>
+              <p:cNvPr id="20" name="Rounded Rectangle 19"/>
+              <p:cNvSpPr/>
+              <p:nvPr/>
+            </p:nvSpPr>
+            <p:spPr>
+              <a:xfrm>
+                <a:off x="4173958" y="3116273"/>
+                <a:ext cx="1440000" cy="720000"/>
+              </a:xfrm>
+              <a:prstGeom prst="roundRect">
+                <a:avLst/>
+              </a:prstGeom>
+              <a:effectLst/>
+            </p:spPr>
+            <p:style>
+              <a:lnRef idx="2">
+                <a:schemeClr val="accent6">
+                  <a:shade val="50000"/>
+                </a:schemeClr>
+              </a:lnRef>
+              <a:fillRef idx="1">
+                <a:schemeClr val="accent6"/>
+              </a:fillRef>
+              <a:effectRef idx="0">
+                <a:schemeClr val="accent6"/>
+              </a:effectRef>
+              <a:fontRef idx="minor">
+                <a:schemeClr val="lt1"/>
+              </a:fontRef>
+            </p:style>
+            <p:txBody>
+              <a:bodyPr rtlCol="0" anchor="ctr"/>
+              <a:lstStyle/>
+              <a:p>
+                <a:pPr algn="ctr"/>
+                <a:r>
+                  <a:rPr lang="en-US" dirty="0" err="1" smtClean="0"/>
+                  <a:t>js</a:t>
+                </a:r>
+                <a:endParaRPr lang="en-US" dirty="0" smtClean="0"/>
+              </a:p>
+            </p:txBody>
+          </p:sp>
+          <p:sp>
+            <p:nvSpPr>
+              <p:cNvPr id="22" name="Rounded Rectangle 21"/>
+              <p:cNvSpPr/>
+              <p:nvPr/>
+            </p:nvSpPr>
+            <p:spPr>
+              <a:xfrm>
+                <a:off x="2149076" y="3116274"/>
+                <a:ext cx="1440000" cy="720000"/>
+              </a:xfrm>
+              <a:prstGeom prst="roundRect">
+                <a:avLst/>
+              </a:prstGeom>
+              <a:effectLst/>
+            </p:spPr>
+            <p:style>
+              <a:lnRef idx="2">
+                <a:schemeClr val="accent5">
+                  <a:shade val="50000"/>
+                </a:schemeClr>
+              </a:lnRef>
+              <a:fillRef idx="1">
+                <a:schemeClr val="accent5"/>
+              </a:fillRef>
+              <a:effectRef idx="0">
+                <a:schemeClr val="accent5"/>
+              </a:effectRef>
+              <a:fontRef idx="minor">
+                <a:schemeClr val="lt1"/>
+              </a:fontRef>
+            </p:style>
+            <p:txBody>
+              <a:bodyPr rtlCol="0" anchor="ctr"/>
+              <a:lstStyle/>
+              <a:p>
+                <a:pPr algn="ctr"/>
+                <a:r>
+                  <a:rPr lang="en-US" dirty="0" smtClean="0"/>
+                  <a:t>html</a:t>
+                </a:r>
+                <a:endParaRPr lang="en-US" dirty="0"/>
+              </a:p>
+            </p:txBody>
+          </p:sp>
+          <p:cxnSp>
+            <p:nvCxnSpPr>
+              <p:cNvPr id="23" name="Straight Arrow Connector 22"/>
+              <p:cNvCxnSpPr>
+                <a:stCxn id="22" idx="3"/>
+                <a:endCxn id="20" idx="1"/>
+              </p:cNvCxnSpPr>
+              <p:nvPr/>
+            </p:nvCxnSpPr>
+            <p:spPr>
+              <a:xfrm flipV="1">
+                <a:off x="3589076" y="3476273"/>
+                <a:ext cx="584882" cy="1"/>
+              </a:xfrm>
+              <a:prstGeom prst="straightConnector1">
+                <a:avLst/>
+              </a:prstGeom>
+              <a:ln>
+                <a:tailEnd type="arrow"/>
+              </a:ln>
+              <a:effectLst/>
+            </p:spPr>
+            <p:style>
+              <a:lnRef idx="2">
+                <a:schemeClr val="dk1"/>
+              </a:lnRef>
+              <a:fillRef idx="0">
+                <a:schemeClr val="dk1"/>
+              </a:fillRef>
+              <a:effectRef idx="1">
+                <a:schemeClr val="dk1"/>
+              </a:effectRef>
+              <a:fontRef idx="minor">
+                <a:schemeClr val="tx1"/>
+              </a:fontRef>
+            </p:style>
+          </p:cxnSp>
+          <p:sp>
+            <p:nvSpPr>
+              <p:cNvPr id="26" name="TextBox 25"/>
+              <p:cNvSpPr txBox="1"/>
+              <p:nvPr/>
+            </p:nvSpPr>
+            <p:spPr>
+              <a:xfrm>
+                <a:off x="1991640" y="2257457"/>
+                <a:ext cx="1393205" cy="523220"/>
+              </a:xfrm>
+              <a:prstGeom prst="rect">
+                <a:avLst/>
+              </a:prstGeom>
+              <a:noFill/>
+            </p:spPr>
+            <p:txBody>
+              <a:bodyPr wrap="none" rtlCol="0">
+                <a:spAutoFit/>
+              </a:bodyPr>
+              <a:lstStyle/>
+              <a:p>
+                <a:r>
+                  <a:rPr lang="en-US" sz="2800" dirty="0" smtClean="0"/>
+                  <a:t>Website</a:t>
+                </a:r>
+                <a:endParaRPr lang="en-US" sz="2800" dirty="0"/>
+              </a:p>
+            </p:txBody>
+          </p:sp>
+        </p:grpSp>
+        <p:cxnSp>
+          <p:nvCxnSpPr>
+            <p:cNvPr id="51" name="Straight Arrow Connector 50"/>
+            <p:cNvCxnSpPr>
+              <a:stCxn id="50" idx="6"/>
+              <a:endCxn id="22" idx="1"/>
+            </p:cNvCxnSpPr>
+            <p:nvPr/>
+          </p:nvCxnSpPr>
+          <p:spPr>
+            <a:xfrm>
+              <a:off x="1273034" y="1696845"/>
+              <a:ext cx="709290" cy="0"/>
+            </a:xfrm>
+            <a:prstGeom prst="straightConnector1">
+              <a:avLst/>
+            </a:prstGeom>
+            <a:ln>
+              <a:prstDash val="dash"/>
+              <a:tailEnd type="arrow"/>
+            </a:ln>
+            <a:effectLst/>
+          </p:spPr>
+          <p:style>
+            <a:lnRef idx="2">
+              <a:schemeClr val="dk1"/>
+            </a:lnRef>
+            <a:fillRef idx="0">
+              <a:schemeClr val="dk1"/>
+            </a:fillRef>
+            <a:effectRef idx="1">
+              <a:schemeClr val="dk1"/>
+            </a:effectRef>
+            <a:fontRef idx="minor">
+              <a:schemeClr val="tx1"/>
+            </a:fontRef>
+          </p:style>
+        </p:cxnSp>
+        <p:cxnSp>
+          <p:nvCxnSpPr>
+            <p:cNvPr id="56" name="Straight Arrow Connector 55"/>
+            <p:cNvCxnSpPr>
+              <a:stCxn id="20" idx="2"/>
+              <a:endCxn id="5" idx="0"/>
+            </p:cNvCxnSpPr>
+            <p:nvPr/>
+          </p:nvCxnSpPr>
+          <p:spPr>
+            <a:xfrm>
+              <a:off x="4727206" y="2056844"/>
+              <a:ext cx="0" cy="2052566"/>
+            </a:xfrm>
+            <a:prstGeom prst="straightConnector1">
+              <a:avLst/>
+            </a:prstGeom>
+            <a:ln>
+              <a:tailEnd type="arrow"/>
+            </a:ln>
+            <a:effectLst/>
+          </p:spPr>
+          <p:style>
+            <a:lnRef idx="2">
+              <a:schemeClr val="dk1"/>
+            </a:lnRef>
+            <a:fillRef idx="0">
+              <a:schemeClr val="dk1"/>
+            </a:fillRef>
+            <a:effectRef idx="1">
+              <a:schemeClr val="dk1"/>
+            </a:effectRef>
+            <a:fontRef idx="minor">
+              <a:schemeClr val="tx1"/>
+            </a:fontRef>
+          </p:style>
+        </p:cxnSp>
+        <p:grpSp>
+          <p:nvGrpSpPr>
+            <p:cNvPr id="62" name="Group 61"/>
+            <p:cNvGrpSpPr/>
+            <p:nvPr/>
+          </p:nvGrpSpPr>
+          <p:grpSpPr>
+            <a:xfrm>
+              <a:off x="6296361" y="4337244"/>
+              <a:ext cx="2297039" cy="1891325"/>
+              <a:chOff x="1836584" y="2048358"/>
+              <a:chExt cx="2297039" cy="1891325"/>
+            </a:xfrm>
+          </p:grpSpPr>
+          <p:sp>
+            <p:nvSpPr>
+              <p:cNvPr id="63" name="Rectangle 62"/>
+              <p:cNvSpPr/>
+              <p:nvPr/>
+            </p:nvSpPr>
+            <p:spPr>
+              <a:xfrm>
+                <a:off x="1836584" y="2048358"/>
+                <a:ext cx="2297039" cy="1891325"/>
+              </a:xfrm>
+              <a:prstGeom prst="rect">
+                <a:avLst/>
+              </a:prstGeom>
+            </p:spPr>
+            <p:style>
+              <a:lnRef idx="2">
+                <a:schemeClr val="dk1"/>
+              </a:lnRef>
+              <a:fillRef idx="1">
+                <a:schemeClr val="lt1"/>
+              </a:fillRef>
+              <a:effectRef idx="0">
+                <a:schemeClr val="dk1"/>
+              </a:effectRef>
+              <a:fontRef idx="minor">
+                <a:schemeClr val="dk1"/>
+              </a:fontRef>
+            </p:style>
+            <p:txBody>
+              <a:bodyPr rtlCol="0" anchor="ctr"/>
+              <a:lstStyle/>
+              <a:p>
+                <a:pPr algn="ctr"/>
+                <a:endParaRPr lang="en-US"/>
+              </a:p>
+            </p:txBody>
+          </p:sp>
+          <p:sp>
+            <p:nvSpPr>
+              <p:cNvPr id="65" name="Rounded Rectangle 64"/>
+              <p:cNvSpPr/>
+              <p:nvPr/>
+            </p:nvSpPr>
+            <p:spPr>
+              <a:xfrm>
+                <a:off x="2270680" y="3010583"/>
+                <a:ext cx="1440000" cy="720000"/>
+              </a:xfrm>
+              <a:prstGeom prst="roundRect">
+                <a:avLst/>
+              </a:prstGeom>
+              <a:effectLst/>
+            </p:spPr>
+            <p:style>
+              <a:lnRef idx="2">
+                <a:schemeClr val="accent5">
+                  <a:shade val="50000"/>
+                </a:schemeClr>
+              </a:lnRef>
+              <a:fillRef idx="1">
+                <a:schemeClr val="accent5"/>
+              </a:fillRef>
+              <a:effectRef idx="0">
+                <a:schemeClr val="accent5"/>
+              </a:effectRef>
+              <a:fontRef idx="minor">
+                <a:schemeClr val="lt1"/>
+              </a:fontRef>
+            </p:style>
+            <p:txBody>
+              <a:bodyPr rtlCol="0" anchor="ctr"/>
+              <a:lstStyle/>
+              <a:p>
+                <a:pPr algn="ctr"/>
+                <a:r>
+                  <a:rPr lang="en-US" dirty="0" err="1" smtClean="0"/>
+                  <a:t>papers.json</a:t>
+                </a:r>
+                <a:endParaRPr lang="en-US" dirty="0"/>
+              </a:p>
+            </p:txBody>
+          </p:sp>
+          <p:sp>
+            <p:nvSpPr>
+              <p:cNvPr id="67" name="TextBox 66"/>
+              <p:cNvSpPr txBox="1"/>
+              <p:nvPr/>
+            </p:nvSpPr>
+            <p:spPr>
+              <a:xfrm>
+                <a:off x="2149076" y="2293446"/>
+                <a:ext cx="1672854" cy="523220"/>
+              </a:xfrm>
+              <a:prstGeom prst="rect">
+                <a:avLst/>
+              </a:prstGeom>
+              <a:noFill/>
+            </p:spPr>
+            <p:txBody>
+              <a:bodyPr wrap="none" rtlCol="0">
+                <a:spAutoFit/>
+              </a:bodyPr>
+              <a:lstStyle/>
+              <a:p>
+                <a:r>
+                  <a:rPr lang="en-US" sz="2800" dirty="0" smtClean="0"/>
+                  <a:t>Resources</a:t>
+                </a:r>
+                <a:endParaRPr lang="en-US" sz="2800" dirty="0"/>
+              </a:p>
+            </p:txBody>
+          </p:sp>
+        </p:grpSp>
+        <p:cxnSp>
+          <p:nvCxnSpPr>
+            <p:cNvPr id="68" name="Straight Arrow Connector 67"/>
+            <p:cNvCxnSpPr>
+              <a:stCxn id="4" idx="3"/>
+              <a:endCxn id="65" idx="1"/>
+            </p:cNvCxnSpPr>
+            <p:nvPr/>
+          </p:nvCxnSpPr>
+          <p:spPr>
+            <a:xfrm>
+              <a:off x="5447206" y="5656417"/>
+              <a:ext cx="1283251" cy="3052"/>
+            </a:xfrm>
+            <a:prstGeom prst="straightConnector1">
+              <a:avLst/>
+            </a:prstGeom>
+            <a:ln>
+              <a:tailEnd type="arrow"/>
+            </a:ln>
+            <a:effectLst/>
+          </p:spPr>
+          <p:style>
+            <a:lnRef idx="2">
+              <a:schemeClr val="dk1"/>
+            </a:lnRef>
+            <a:fillRef idx="0">
+              <a:schemeClr val="dk1"/>
+            </a:fillRef>
+            <a:effectRef idx="1">
+              <a:schemeClr val="dk1"/>
+            </a:effectRef>
+            <a:fontRef idx="minor">
+              <a:schemeClr val="tx1"/>
+            </a:fontRef>
+          </p:style>
+        </p:cxnSp>
+        <p:sp>
+          <p:nvSpPr>
+            <p:cNvPr id="72" name="TextBox 71"/>
+            <p:cNvSpPr txBox="1"/>
+            <p:nvPr/>
+          </p:nvSpPr>
+          <p:spPr>
+            <a:xfrm>
+              <a:off x="4780525" y="2829511"/>
+              <a:ext cx="3376420" cy="369332"/>
+            </a:xfrm>
+            <a:prstGeom prst="rect">
+              <a:avLst/>
+            </a:prstGeom>
+            <a:noFill/>
+          </p:spPr>
+          <p:txBody>
+            <a:bodyPr wrap="none" rtlCol="0">
+              <a:spAutoFit/>
+            </a:bodyPr>
+            <a:lstStyle/>
+            <a:p>
+              <a:r>
+                <a:rPr lang="en-US" dirty="0" smtClean="0"/>
+                <a:t>Make request for data to visualize</a:t>
+              </a:r>
+              <a:endParaRPr lang="en-US" dirty="0"/>
+            </a:p>
+          </p:txBody>
+        </p:sp>
+        <p:sp>
+          <p:nvSpPr>
+            <p:cNvPr id="73" name="TextBox 72"/>
+            <p:cNvSpPr txBox="1"/>
+            <p:nvPr/>
+          </p:nvSpPr>
+          <p:spPr>
+            <a:xfrm>
+              <a:off x="5736696" y="6269098"/>
+              <a:ext cx="2281657" cy="369332"/>
+            </a:xfrm>
+            <a:prstGeom prst="rect">
+              <a:avLst/>
+            </a:prstGeom>
+            <a:noFill/>
+          </p:spPr>
+          <p:txBody>
+            <a:bodyPr wrap="none" rtlCol="0">
+              <a:spAutoFit/>
+            </a:bodyPr>
+            <a:lstStyle/>
+            <a:p>
+              <a:r>
+                <a:rPr lang="en-US" dirty="0" smtClean="0"/>
+                <a:t>Make request for data</a:t>
+              </a:r>
+              <a:endParaRPr lang="en-US" dirty="0"/>
+            </a:p>
+          </p:txBody>
+        </p:sp>
+      </p:grpSp>
     </p:spTree>
     <p:extLst>
       <p:ext uri="{BB962C8B-B14F-4D97-AF65-F5344CB8AC3E}">
-        <p14:creationId xmlns:p14="http://schemas.microsoft.com/office/powerpoint/2010/main" val="1162147469"/>
+        <p14:creationId xmlns:p14="http://schemas.microsoft.com/office/powerpoint/2010/main" val="4118603424"/>
       </p:ext>
     </p:extLst>
   </p:cSld>
@@ -3520,823 +4023,2725 @@
           <a:chExt cx="0" cy="0"/>
         </a:xfrm>
       </p:grpSpPr>
-      <p:cxnSp>
-        <p:nvCxnSpPr>
-          <p:cNvPr id="6" name="Straight Connector 5"/>
-          <p:cNvCxnSpPr>
-            <a:stCxn id="8" idx="2"/>
-          </p:cNvCxnSpPr>
+      <p:grpSp>
+        <p:nvGrpSpPr>
+          <p:cNvPr id="83" name="Group 82"/>
+          <p:cNvGrpSpPr/>
           <p:nvPr/>
-        </p:nvCxnSpPr>
-        <p:spPr>
+        </p:nvGrpSpPr>
+        <p:grpSpPr>
           <a:xfrm>
-            <a:off x="767968" y="666552"/>
-            <a:ext cx="0" cy="5818235"/>
+            <a:off x="828185" y="718845"/>
+            <a:ext cx="7114727" cy="4455858"/>
+            <a:chOff x="828185" y="718845"/>
+            <a:chExt cx="7114727" cy="4455858"/>
           </a:xfrm>
-          <a:prstGeom prst="line">
-            <a:avLst/>
-          </a:prstGeom>
-          <a:ln>
-            <a:prstDash val="dash"/>
-          </a:ln>
-          <a:effectLst/>
-        </p:spPr>
-        <p:style>
-          <a:lnRef idx="2">
-            <a:schemeClr val="dk1"/>
-          </a:lnRef>
-          <a:fillRef idx="0">
-            <a:schemeClr val="dk1"/>
-          </a:fillRef>
-          <a:effectRef idx="1">
-            <a:schemeClr val="dk1"/>
-          </a:effectRef>
-          <a:fontRef idx="minor">
-            <a:schemeClr val="tx1"/>
-          </a:fontRef>
-        </p:style>
-      </p:cxnSp>
-      <p:sp>
-        <p:nvSpPr>
-          <p:cNvPr id="8" name="TextBox 7"/>
-          <p:cNvSpPr txBox="1"/>
-          <p:nvPr/>
-        </p:nvSpPr>
-        <p:spPr>
-          <a:xfrm>
-            <a:off x="457626" y="297220"/>
-            <a:ext cx="620683" cy="369332"/>
-          </a:xfrm>
-          <a:prstGeom prst="rect">
-            <a:avLst/>
-          </a:prstGeom>
-          <a:noFill/>
-          <a:ln>
+        </p:grpSpPr>
+        <p:cxnSp>
+          <p:nvCxnSpPr>
+            <p:cNvPr id="6" name="Straight Connector 5"/>
+            <p:cNvCxnSpPr/>
+            <p:nvPr/>
+          </p:nvCxnSpPr>
+          <p:spPr>
+            <a:xfrm>
+              <a:off x="1563893" y="1103053"/>
+              <a:ext cx="0" cy="4071650"/>
+            </a:xfrm>
+            <a:prstGeom prst="line">
+              <a:avLst/>
+            </a:prstGeom>
+            <a:ln>
+              <a:prstDash val="dash"/>
+            </a:ln>
+            <a:effectLst/>
+          </p:spPr>
+          <p:style>
+            <a:lnRef idx="2">
+              <a:schemeClr val="dk1"/>
+            </a:lnRef>
+            <a:fillRef idx="0">
+              <a:schemeClr val="dk1"/>
+            </a:fillRef>
+            <a:effectRef idx="1">
+              <a:schemeClr val="dk1"/>
+            </a:effectRef>
+            <a:fontRef idx="minor">
+              <a:schemeClr val="tx1"/>
+            </a:fontRef>
+          </p:style>
+        </p:cxnSp>
+        <p:cxnSp>
+          <p:nvCxnSpPr>
+            <p:cNvPr id="11" name="Straight Connector 10"/>
+            <p:cNvCxnSpPr/>
+            <p:nvPr/>
+          </p:nvCxnSpPr>
+          <p:spPr>
+            <a:xfrm>
+              <a:off x="4328966" y="1103053"/>
+              <a:ext cx="0" cy="4071650"/>
+            </a:xfrm>
+            <a:prstGeom prst="line">
+              <a:avLst/>
+            </a:prstGeom>
+            <a:ln>
+              <a:prstDash val="dash"/>
+            </a:ln>
+            <a:effectLst/>
+          </p:spPr>
+          <p:style>
+            <a:lnRef idx="2">
+              <a:schemeClr val="dk1"/>
+            </a:lnRef>
+            <a:fillRef idx="0">
+              <a:schemeClr val="dk1"/>
+            </a:fillRef>
+            <a:effectRef idx="1">
+              <a:schemeClr val="dk1"/>
+            </a:effectRef>
+            <a:fontRef idx="minor">
+              <a:schemeClr val="tx1"/>
+            </a:fontRef>
+          </p:style>
+        </p:cxnSp>
+        <p:cxnSp>
+          <p:nvCxnSpPr>
+            <p:cNvPr id="13" name="Straight Connector 12"/>
+            <p:cNvCxnSpPr/>
+            <p:nvPr/>
+          </p:nvCxnSpPr>
+          <p:spPr>
+            <a:xfrm>
+              <a:off x="7282979" y="1103053"/>
+              <a:ext cx="0" cy="4071650"/>
+            </a:xfrm>
+            <a:prstGeom prst="line">
+              <a:avLst/>
+            </a:prstGeom>
+            <a:ln>
+              <a:prstDash val="dash"/>
+            </a:ln>
+            <a:effectLst/>
+          </p:spPr>
+          <p:style>
+            <a:lnRef idx="2">
+              <a:schemeClr val="dk1"/>
+            </a:lnRef>
+            <a:fillRef idx="0">
+              <a:schemeClr val="dk1"/>
+            </a:fillRef>
+            <a:effectRef idx="1">
+              <a:schemeClr val="dk1"/>
+            </a:effectRef>
+            <a:fontRef idx="minor">
+              <a:schemeClr val="tx1"/>
+            </a:fontRef>
+          </p:style>
+        </p:cxnSp>
+        <p:sp>
+          <p:nvSpPr>
+            <p:cNvPr id="17" name="Rectangle 16"/>
+            <p:cNvSpPr/>
+            <p:nvPr/>
+          </p:nvSpPr>
+          <p:spPr>
+            <a:xfrm>
+              <a:off x="1377349" y="3359895"/>
+              <a:ext cx="378325" cy="1355471"/>
+            </a:xfrm>
+            <a:prstGeom prst="rect">
+              <a:avLst/>
+            </a:prstGeom>
+          </p:spPr>
+          <p:style>
+            <a:lnRef idx="2">
+              <a:schemeClr val="dk1"/>
+            </a:lnRef>
+            <a:fillRef idx="1">
+              <a:schemeClr val="lt1"/>
+            </a:fillRef>
+            <a:effectRef idx="0">
+              <a:schemeClr val="dk1"/>
+            </a:effectRef>
+            <a:fontRef idx="minor">
+              <a:schemeClr val="dk1"/>
+            </a:fontRef>
+          </p:style>
+          <p:txBody>
+            <a:bodyPr rtlCol="0" anchor="ctr"/>
+            <a:lstStyle/>
+            <a:p>
+              <a:pPr algn="ctr"/>
+              <a:endParaRPr lang="en-US"/>
+            </a:p>
+          </p:txBody>
+        </p:sp>
+        <p:sp>
+          <p:nvSpPr>
+            <p:cNvPr id="18" name="Rectangle 17"/>
+            <p:cNvSpPr/>
+            <p:nvPr/>
+          </p:nvSpPr>
+          <p:spPr>
+            <a:xfrm>
+              <a:off x="4140725" y="1402180"/>
+              <a:ext cx="378325" cy="3583384"/>
+            </a:xfrm>
+            <a:prstGeom prst="rect">
+              <a:avLst/>
+            </a:prstGeom>
+          </p:spPr>
+          <p:style>
+            <a:lnRef idx="2">
+              <a:schemeClr val="dk1"/>
+            </a:lnRef>
+            <a:fillRef idx="1">
+              <a:schemeClr val="lt1"/>
+            </a:fillRef>
+            <a:effectRef idx="0">
+              <a:schemeClr val="dk1"/>
+            </a:effectRef>
+            <a:fontRef idx="minor">
+              <a:schemeClr val="dk1"/>
+            </a:fontRef>
+          </p:style>
+          <p:txBody>
+            <a:bodyPr rtlCol="0" anchor="ctr"/>
+            <a:lstStyle/>
+            <a:p>
+              <a:pPr algn="ctr"/>
+              <a:endParaRPr lang="en-US"/>
+            </a:p>
+          </p:txBody>
+        </p:sp>
+        <p:sp>
+          <p:nvSpPr>
+            <p:cNvPr id="22" name="Rectangle 21"/>
+            <p:cNvSpPr/>
+            <p:nvPr/>
+          </p:nvSpPr>
+          <p:spPr>
+            <a:xfrm>
+              <a:off x="7093816" y="1618340"/>
+              <a:ext cx="378325" cy="476090"/>
+            </a:xfrm>
+            <a:prstGeom prst="rect">
+              <a:avLst/>
+            </a:prstGeom>
+          </p:spPr>
+          <p:style>
+            <a:lnRef idx="2">
+              <a:schemeClr val="dk1"/>
+            </a:lnRef>
+            <a:fillRef idx="1">
+              <a:schemeClr val="lt1"/>
+            </a:fillRef>
+            <a:effectRef idx="0">
+              <a:schemeClr val="dk1"/>
+            </a:effectRef>
+            <a:fontRef idx="minor">
+              <a:schemeClr val="dk1"/>
+            </a:fontRef>
+          </p:style>
+          <p:txBody>
+            <a:bodyPr rtlCol="0" anchor="ctr"/>
+            <a:lstStyle/>
+            <a:p>
+              <a:pPr algn="ctr"/>
+              <a:endParaRPr lang="en-US"/>
+            </a:p>
+          </p:txBody>
+        </p:sp>
+        <p:cxnSp>
+          <p:nvCxnSpPr>
+            <p:cNvPr id="34" name="Straight Arrow Connector 33"/>
+            <p:cNvCxnSpPr/>
+            <p:nvPr/>
+          </p:nvCxnSpPr>
+          <p:spPr>
+            <a:xfrm>
+              <a:off x="4519050" y="1618340"/>
+              <a:ext cx="2574766" cy="0"/>
+            </a:xfrm>
+            <a:prstGeom prst="straightConnector1">
+              <a:avLst/>
+            </a:prstGeom>
+            <a:ln>
+              <a:prstDash val="solid"/>
+              <a:tailEnd type="arrow"/>
+            </a:ln>
+            <a:effectLst/>
+          </p:spPr>
+          <p:style>
+            <a:lnRef idx="2">
+              <a:schemeClr val="dk1"/>
+            </a:lnRef>
+            <a:fillRef idx="0">
+              <a:schemeClr val="dk1"/>
+            </a:fillRef>
+            <a:effectRef idx="1">
+              <a:schemeClr val="dk1"/>
+            </a:effectRef>
+            <a:fontRef idx="minor">
+              <a:schemeClr val="tx1"/>
+            </a:fontRef>
+          </p:style>
+        </p:cxnSp>
+        <p:cxnSp>
+          <p:nvCxnSpPr>
+            <p:cNvPr id="35" name="Straight Arrow Connector 34"/>
+            <p:cNvCxnSpPr/>
+            <p:nvPr/>
+          </p:nvCxnSpPr>
+          <p:spPr>
+            <a:xfrm>
+              <a:off x="4519050" y="2094430"/>
+              <a:ext cx="2574766" cy="0"/>
+            </a:xfrm>
+            <a:prstGeom prst="straightConnector1">
+              <a:avLst/>
+            </a:prstGeom>
+            <a:ln>
+              <a:prstDash val="dash"/>
+              <a:headEnd type="arrow"/>
+              <a:tailEnd type="none"/>
+            </a:ln>
+            <a:effectLst/>
+          </p:spPr>
+          <p:style>
+            <a:lnRef idx="2">
+              <a:schemeClr val="dk1"/>
+            </a:lnRef>
+            <a:fillRef idx="0">
+              <a:schemeClr val="dk1"/>
+            </a:fillRef>
+            <a:effectRef idx="1">
+              <a:schemeClr val="dk1"/>
+            </a:effectRef>
+            <a:fontRef idx="minor">
+              <a:schemeClr val="tx1"/>
+            </a:fontRef>
+          </p:style>
+        </p:cxnSp>
+        <p:sp>
+          <p:nvSpPr>
+            <p:cNvPr id="20" name="TextBox 19"/>
+            <p:cNvSpPr txBox="1"/>
+            <p:nvPr/>
+          </p:nvSpPr>
+          <p:spPr>
+            <a:xfrm>
+              <a:off x="5205956" y="1231025"/>
+              <a:ext cx="1402623" cy="369332"/>
+            </a:xfrm>
+            <a:prstGeom prst="rect">
+              <a:avLst/>
+            </a:prstGeom>
+            <a:noFill/>
+          </p:spPr>
+          <p:txBody>
+            <a:bodyPr wrap="none" rtlCol="0">
+              <a:spAutoFit/>
+            </a:bodyPr>
+            <a:lstStyle/>
+            <a:p>
+              <a:r>
+                <a:rPr lang="en-US" dirty="0" smtClean="0"/>
+                <a:t>Get raw data</a:t>
+              </a:r>
+              <a:endParaRPr lang="en-US" dirty="0"/>
+            </a:p>
+          </p:txBody>
+        </p:sp>
+        <p:cxnSp>
+          <p:nvCxnSpPr>
+            <p:cNvPr id="43" name="Straight Arrow Connector 42"/>
+            <p:cNvCxnSpPr/>
+            <p:nvPr/>
+          </p:nvCxnSpPr>
+          <p:spPr>
+            <a:xfrm>
+              <a:off x="4519050" y="2692485"/>
+              <a:ext cx="324000" cy="0"/>
+            </a:xfrm>
+            <a:prstGeom prst="straightConnector1">
+              <a:avLst/>
+            </a:prstGeom>
+            <a:ln>
+              <a:prstDash val="solid"/>
+              <a:headEnd type="arrow"/>
+              <a:tailEnd type="none"/>
+            </a:ln>
+            <a:effectLst/>
+          </p:spPr>
+          <p:style>
+            <a:lnRef idx="2">
+              <a:schemeClr val="dk1"/>
+            </a:lnRef>
+            <a:fillRef idx="0">
+              <a:schemeClr val="dk1"/>
+            </a:fillRef>
+            <a:effectRef idx="1">
+              <a:schemeClr val="dk1"/>
+            </a:effectRef>
+            <a:fontRef idx="minor">
+              <a:schemeClr val="tx1"/>
+            </a:fontRef>
+          </p:style>
+        </p:cxnSp>
+        <p:cxnSp>
+          <p:nvCxnSpPr>
+            <p:cNvPr id="44" name="Straight Arrow Connector 43"/>
+            <p:cNvCxnSpPr/>
+            <p:nvPr/>
+          </p:nvCxnSpPr>
+          <p:spPr>
+            <a:xfrm>
+              <a:off x="4538324" y="2422230"/>
+              <a:ext cx="304726" cy="0"/>
+            </a:xfrm>
+            <a:prstGeom prst="straightConnector1">
+              <a:avLst/>
+            </a:prstGeom>
+            <a:ln>
+              <a:prstDash val="solid"/>
+              <a:headEnd type="none"/>
+              <a:tailEnd type="none"/>
+            </a:ln>
+            <a:effectLst/>
+          </p:spPr>
+          <p:style>
+            <a:lnRef idx="2">
+              <a:schemeClr val="dk1"/>
+            </a:lnRef>
+            <a:fillRef idx="0">
+              <a:schemeClr val="dk1"/>
+            </a:fillRef>
+            <a:effectRef idx="1">
+              <a:schemeClr val="dk1"/>
+            </a:effectRef>
+            <a:fontRef idx="minor">
+              <a:schemeClr val="tx1"/>
+            </a:fontRef>
+          </p:style>
+        </p:cxnSp>
+        <p:cxnSp>
+          <p:nvCxnSpPr>
+            <p:cNvPr id="46" name="Straight Arrow Connector 45"/>
+            <p:cNvCxnSpPr/>
+            <p:nvPr/>
+          </p:nvCxnSpPr>
+          <p:spPr>
+            <a:xfrm>
+              <a:off x="4830264" y="2418417"/>
+              <a:ext cx="0" cy="278330"/>
+            </a:xfrm>
+            <a:prstGeom prst="straightConnector1">
+              <a:avLst/>
+            </a:prstGeom>
+            <a:ln>
+              <a:prstDash val="solid"/>
+              <a:headEnd type="none"/>
+              <a:tailEnd type="none"/>
+            </a:ln>
+            <a:effectLst/>
+          </p:spPr>
+          <p:style>
+            <a:lnRef idx="2">
+              <a:schemeClr val="dk1"/>
+            </a:lnRef>
+            <a:fillRef idx="0">
+              <a:schemeClr val="dk1"/>
+            </a:fillRef>
+            <a:effectRef idx="1">
+              <a:schemeClr val="dk1"/>
+            </a:effectRef>
+            <a:fontRef idx="minor">
+              <a:schemeClr val="tx1"/>
+            </a:fontRef>
+          </p:style>
+        </p:cxnSp>
+        <p:sp>
+          <p:nvSpPr>
+            <p:cNvPr id="49" name="TextBox 48"/>
+            <p:cNvSpPr txBox="1"/>
+            <p:nvPr/>
+          </p:nvSpPr>
+          <p:spPr>
+            <a:xfrm>
+              <a:off x="4843050" y="2369103"/>
+              <a:ext cx="1388534" cy="369332"/>
+            </a:xfrm>
+            <a:prstGeom prst="rect">
+              <a:avLst/>
+            </a:prstGeom>
+            <a:noFill/>
+          </p:spPr>
+          <p:txBody>
+            <a:bodyPr wrap="none" rtlCol="0">
+              <a:spAutoFit/>
+            </a:bodyPr>
+            <a:lstStyle/>
+            <a:p>
+              <a:r>
+                <a:rPr lang="en-US" dirty="0" err="1" smtClean="0"/>
+                <a:t>parsePaper</a:t>
+              </a:r>
+              <a:r>
+                <a:rPr lang="en-US" dirty="0" smtClean="0"/>
+                <a:t>()</a:t>
+              </a:r>
+              <a:endParaRPr lang="en-US" dirty="0"/>
+            </a:p>
+          </p:txBody>
+        </p:sp>
+        <p:cxnSp>
+          <p:nvCxnSpPr>
+            <p:cNvPr id="50" name="Straight Arrow Connector 49"/>
+            <p:cNvCxnSpPr/>
+            <p:nvPr/>
+          </p:nvCxnSpPr>
+          <p:spPr>
+            <a:xfrm>
+              <a:off x="1754200" y="3576605"/>
+              <a:ext cx="2386525" cy="0"/>
+            </a:xfrm>
+            <a:prstGeom prst="straightConnector1">
+              <a:avLst/>
+            </a:prstGeom>
+            <a:ln>
+              <a:prstDash val="solid"/>
+              <a:tailEnd type="arrow"/>
+            </a:ln>
+            <a:effectLst/>
+          </p:spPr>
+          <p:style>
+            <a:lnRef idx="2">
+              <a:schemeClr val="dk1"/>
+            </a:lnRef>
+            <a:fillRef idx="0">
+              <a:schemeClr val="dk1"/>
+            </a:fillRef>
+            <a:effectRef idx="1">
+              <a:schemeClr val="dk1"/>
+            </a:effectRef>
+            <a:fontRef idx="minor">
+              <a:schemeClr val="tx1"/>
+            </a:fontRef>
+          </p:style>
+        </p:cxnSp>
+        <p:cxnSp>
+          <p:nvCxnSpPr>
+            <p:cNvPr id="53" name="Straight Arrow Connector 52"/>
+            <p:cNvCxnSpPr/>
+            <p:nvPr/>
+          </p:nvCxnSpPr>
+          <p:spPr>
+            <a:xfrm>
+              <a:off x="4506264" y="4114823"/>
+              <a:ext cx="324000" cy="0"/>
+            </a:xfrm>
+            <a:prstGeom prst="straightConnector1">
+              <a:avLst/>
+            </a:prstGeom>
+            <a:ln>
+              <a:prstDash val="solid"/>
+              <a:headEnd type="arrow"/>
+              <a:tailEnd type="none"/>
+            </a:ln>
+            <a:effectLst/>
+          </p:spPr>
+          <p:style>
+            <a:lnRef idx="2">
+              <a:schemeClr val="dk1"/>
+            </a:lnRef>
+            <a:fillRef idx="0">
+              <a:schemeClr val="dk1"/>
+            </a:fillRef>
+            <a:effectRef idx="1">
+              <a:schemeClr val="dk1"/>
+            </a:effectRef>
+            <a:fontRef idx="minor">
+              <a:schemeClr val="tx1"/>
+            </a:fontRef>
+          </p:style>
+        </p:cxnSp>
+        <p:cxnSp>
+          <p:nvCxnSpPr>
+            <p:cNvPr id="54" name="Straight Arrow Connector 53"/>
+            <p:cNvCxnSpPr/>
+            <p:nvPr/>
+          </p:nvCxnSpPr>
+          <p:spPr>
+            <a:xfrm>
+              <a:off x="4525538" y="3844568"/>
+              <a:ext cx="304726" cy="0"/>
+            </a:xfrm>
+            <a:prstGeom prst="straightConnector1">
+              <a:avLst/>
+            </a:prstGeom>
+            <a:ln>
+              <a:prstDash val="solid"/>
+              <a:headEnd type="none"/>
+              <a:tailEnd type="none"/>
+            </a:ln>
+            <a:effectLst/>
+          </p:spPr>
+          <p:style>
+            <a:lnRef idx="2">
+              <a:schemeClr val="dk1"/>
+            </a:lnRef>
+            <a:fillRef idx="0">
+              <a:schemeClr val="dk1"/>
+            </a:fillRef>
+            <a:effectRef idx="1">
+              <a:schemeClr val="dk1"/>
+            </a:effectRef>
+            <a:fontRef idx="minor">
+              <a:schemeClr val="tx1"/>
+            </a:fontRef>
+          </p:style>
+        </p:cxnSp>
+        <p:cxnSp>
+          <p:nvCxnSpPr>
+            <p:cNvPr id="55" name="Straight Arrow Connector 54"/>
+            <p:cNvCxnSpPr/>
+            <p:nvPr/>
+          </p:nvCxnSpPr>
+          <p:spPr>
+            <a:xfrm>
+              <a:off x="4817478" y="3840755"/>
+              <a:ext cx="0" cy="278330"/>
+            </a:xfrm>
+            <a:prstGeom prst="straightConnector1">
+              <a:avLst/>
+            </a:prstGeom>
+            <a:ln>
+              <a:prstDash val="solid"/>
+              <a:headEnd type="none"/>
+              <a:tailEnd type="none"/>
+            </a:ln>
+            <a:effectLst/>
+          </p:spPr>
+          <p:style>
+            <a:lnRef idx="2">
+              <a:schemeClr val="dk1"/>
+            </a:lnRef>
+            <a:fillRef idx="0">
+              <a:schemeClr val="dk1"/>
+            </a:fillRef>
+            <a:effectRef idx="1">
+              <a:schemeClr val="dk1"/>
+            </a:effectRef>
+            <a:fontRef idx="minor">
+              <a:schemeClr val="tx1"/>
+            </a:fontRef>
+          </p:style>
+        </p:cxnSp>
+        <p:sp>
+          <p:nvSpPr>
+            <p:cNvPr id="56" name="TextBox 55"/>
+            <p:cNvSpPr txBox="1"/>
+            <p:nvPr/>
+          </p:nvSpPr>
+          <p:spPr>
+            <a:xfrm>
+              <a:off x="4830264" y="3791441"/>
+              <a:ext cx="2032114" cy="369332"/>
+            </a:xfrm>
+            <a:prstGeom prst="rect">
+              <a:avLst/>
+            </a:prstGeom>
+            <a:noFill/>
+          </p:spPr>
+          <p:txBody>
+            <a:bodyPr wrap="none" rtlCol="0">
+              <a:spAutoFit/>
+            </a:bodyPr>
+            <a:lstStyle/>
+            <a:p>
+              <a:r>
+                <a:rPr lang="en-US" dirty="0" err="1" smtClean="0"/>
+                <a:t>executeCommand</a:t>
+              </a:r>
+              <a:r>
+                <a:rPr lang="en-US" dirty="0" smtClean="0"/>
+                <a:t>()</a:t>
+              </a:r>
+              <a:endParaRPr lang="en-US" dirty="0"/>
+            </a:p>
+          </p:txBody>
+        </p:sp>
+        <p:cxnSp>
+          <p:nvCxnSpPr>
+            <p:cNvPr id="57" name="Straight Arrow Connector 56"/>
+            <p:cNvCxnSpPr/>
+            <p:nvPr/>
+          </p:nvCxnSpPr>
+          <p:spPr>
+            <a:xfrm>
+              <a:off x="1754200" y="4462467"/>
+              <a:ext cx="2386525" cy="0"/>
+            </a:xfrm>
+            <a:prstGeom prst="straightConnector1">
+              <a:avLst/>
+            </a:prstGeom>
+            <a:ln>
+              <a:prstDash val="dash"/>
+              <a:headEnd type="arrow"/>
+              <a:tailEnd type="none"/>
+            </a:ln>
+            <a:effectLst/>
+          </p:spPr>
+          <p:style>
+            <a:lnRef idx="2">
+              <a:schemeClr val="dk1"/>
+            </a:lnRef>
+            <a:fillRef idx="0">
+              <a:schemeClr val="dk1"/>
+            </a:fillRef>
+            <a:effectRef idx="1">
+              <a:schemeClr val="dk1"/>
+            </a:effectRef>
+            <a:fontRef idx="minor">
+              <a:schemeClr val="tx1"/>
+            </a:fontRef>
+          </p:style>
+        </p:cxnSp>
+        <p:sp>
+          <p:nvSpPr>
+            <p:cNvPr id="59" name="TextBox 58"/>
+            <p:cNvSpPr txBox="1"/>
+            <p:nvPr/>
+          </p:nvSpPr>
+          <p:spPr>
+            <a:xfrm>
+              <a:off x="2193313" y="3175229"/>
+              <a:ext cx="1328008" cy="369332"/>
+            </a:xfrm>
+            <a:prstGeom prst="rect">
+              <a:avLst/>
+            </a:prstGeom>
+            <a:noFill/>
+          </p:spPr>
+          <p:txBody>
+            <a:bodyPr wrap="none" rtlCol="0">
+              <a:spAutoFit/>
+            </a:bodyPr>
+            <a:lstStyle/>
+            <a:p>
+              <a:r>
+                <a:rPr lang="en-US" dirty="0" smtClean="0"/>
+                <a:t>GET request</a:t>
+              </a:r>
+              <a:endParaRPr lang="en-US" dirty="0"/>
+            </a:p>
+          </p:txBody>
+        </p:sp>
+        <p:sp>
+          <p:nvSpPr>
+            <p:cNvPr id="60" name="TextBox 59"/>
+            <p:cNvSpPr txBox="1"/>
+            <p:nvPr/>
+          </p:nvSpPr>
+          <p:spPr>
+            <a:xfrm>
+              <a:off x="1909415" y="4093135"/>
+              <a:ext cx="2116197" cy="369332"/>
+            </a:xfrm>
+            <a:prstGeom prst="rect">
+              <a:avLst/>
+            </a:prstGeom>
+            <a:noFill/>
+          </p:spPr>
+          <p:txBody>
+            <a:bodyPr wrap="none" rtlCol="0">
+              <a:spAutoFit/>
+            </a:bodyPr>
+            <a:lstStyle/>
+            <a:p>
+              <a:r>
+                <a:rPr lang="en-US" dirty="0" smtClean="0"/>
+                <a:t>JSON representation</a:t>
+              </a:r>
+              <a:endParaRPr lang="en-US" dirty="0"/>
+            </a:p>
+          </p:txBody>
+        </p:sp>
+        <p:sp>
+          <p:nvSpPr>
+            <p:cNvPr id="68" name="Rectangle 67"/>
+            <p:cNvSpPr/>
+            <p:nvPr/>
+          </p:nvSpPr>
+          <p:spPr>
+            <a:xfrm>
+              <a:off x="828186" y="2918538"/>
+              <a:ext cx="6265630" cy="1945437"/>
+            </a:xfrm>
+            <a:prstGeom prst="rect">
+              <a:avLst/>
+            </a:prstGeom>
+            <a:noFill/>
+          </p:spPr>
+          <p:style>
+            <a:lnRef idx="2">
+              <a:schemeClr val="dk1"/>
+            </a:lnRef>
+            <a:fillRef idx="1">
+              <a:schemeClr val="lt1"/>
+            </a:fillRef>
+            <a:effectRef idx="0">
+              <a:schemeClr val="dk1"/>
+            </a:effectRef>
+            <a:fontRef idx="minor">
+              <a:schemeClr val="dk1"/>
+            </a:fontRef>
+          </p:style>
+          <p:txBody>
+            <a:bodyPr rtlCol="0" anchor="ctr"/>
+            <a:lstStyle/>
+            <a:p>
+              <a:pPr algn="ctr"/>
+              <a:endParaRPr lang="en-US"/>
+            </a:p>
+          </p:txBody>
+        </p:sp>
+        <p:sp>
+          <p:nvSpPr>
+            <p:cNvPr id="74" name="Rectangle 73"/>
+            <p:cNvSpPr/>
+            <p:nvPr/>
+          </p:nvSpPr>
+          <p:spPr>
+            <a:xfrm>
+              <a:off x="828185" y="2917175"/>
+              <a:ext cx="612000" cy="384208"/>
+            </a:xfrm>
+            <a:prstGeom prst="rect">
+              <a:avLst/>
+            </a:prstGeom>
             <a:solidFill>
-              <a:schemeClr val="tx1"/>
+              <a:srgbClr val="FFFFFF"/>
             </a:solidFill>
-          </a:ln>
-        </p:spPr>
-        <p:txBody>
-          <a:bodyPr wrap="none" rtlCol="0">
-            <a:spAutoFit/>
-          </a:bodyPr>
-          <a:lstStyle/>
-          <a:p>
-            <a:r>
-              <a:rPr lang="en-US" dirty="0" smtClean="0"/>
-              <a:t>User</a:t>
-            </a:r>
-            <a:endParaRPr lang="en-US" dirty="0"/>
-          </a:p>
-        </p:txBody>
-      </p:sp>
-      <p:cxnSp>
-        <p:nvCxnSpPr>
-          <p:cNvPr id="11" name="Straight Connector 10"/>
-          <p:cNvCxnSpPr>
-            <a:stCxn id="12" idx="2"/>
-          </p:cNvCxnSpPr>
-          <p:nvPr/>
-        </p:nvCxnSpPr>
-        <p:spPr>
-          <a:xfrm flipH="1">
-            <a:off x="2921669" y="666552"/>
-            <a:ext cx="13894" cy="5818235"/>
-          </a:xfrm>
-          <a:prstGeom prst="line">
-            <a:avLst/>
-          </a:prstGeom>
-          <a:ln>
-            <a:prstDash val="dash"/>
-          </a:ln>
-          <a:effectLst/>
-        </p:spPr>
-        <p:style>
-          <a:lnRef idx="2">
-            <a:schemeClr val="dk1"/>
-          </a:lnRef>
-          <a:fillRef idx="0">
-            <a:schemeClr val="dk1"/>
-          </a:fillRef>
-          <a:effectRef idx="1">
-            <a:schemeClr val="dk1"/>
-          </a:effectRef>
-          <a:fontRef idx="minor">
-            <a:schemeClr val="tx1"/>
-          </a:fontRef>
-        </p:style>
-      </p:cxnSp>
-      <p:sp>
-        <p:nvSpPr>
-          <p:cNvPr id="12" name="TextBox 11"/>
-          <p:cNvSpPr txBox="1"/>
-          <p:nvPr/>
-        </p:nvSpPr>
-        <p:spPr>
-          <a:xfrm>
-            <a:off x="2611327" y="297220"/>
-            <a:ext cx="648472" cy="369332"/>
-          </a:xfrm>
-          <a:prstGeom prst="rect">
-            <a:avLst/>
-          </a:prstGeom>
-          <a:noFill/>
-          <a:ln>
+          </p:spPr>
+          <p:style>
+            <a:lnRef idx="2">
+              <a:schemeClr val="dk1"/>
+            </a:lnRef>
+            <a:fillRef idx="1">
+              <a:schemeClr val="lt1"/>
+            </a:fillRef>
+            <a:effectRef idx="0">
+              <a:schemeClr val="dk1"/>
+            </a:effectRef>
+            <a:fontRef idx="minor">
+              <a:schemeClr val="dk1"/>
+            </a:fontRef>
+          </p:style>
+          <p:txBody>
+            <a:bodyPr rtlCol="0" anchor="ctr"/>
+            <a:lstStyle/>
+            <a:p>
+              <a:pPr algn="ctr"/>
+              <a:r>
+                <a:rPr lang="en-US" dirty="0" smtClean="0"/>
+                <a:t>loop</a:t>
+              </a:r>
+              <a:endParaRPr lang="en-US" dirty="0"/>
+            </a:p>
+          </p:txBody>
+        </p:sp>
+        <p:sp>
+          <p:nvSpPr>
+            <p:cNvPr id="79" name="Rectangle 78"/>
+            <p:cNvSpPr/>
+            <p:nvPr/>
+          </p:nvSpPr>
+          <p:spPr>
+            <a:xfrm>
+              <a:off x="903960" y="718845"/>
+              <a:ext cx="1319866" cy="384208"/>
+            </a:xfrm>
+            <a:prstGeom prst="rect">
+              <a:avLst/>
+            </a:prstGeom>
             <a:solidFill>
-              <a:schemeClr val="tx1"/>
+              <a:srgbClr val="FFFFFF"/>
             </a:solidFill>
-          </a:ln>
-        </p:spPr>
-        <p:txBody>
-          <a:bodyPr wrap="none" rtlCol="0">
-            <a:spAutoFit/>
-          </a:bodyPr>
-          <a:lstStyle/>
-          <a:p>
-            <a:r>
-              <a:rPr lang="en-US" dirty="0" smtClean="0"/>
-              <a:t>View</a:t>
-            </a:r>
-            <a:endParaRPr lang="en-US" dirty="0"/>
-          </a:p>
-        </p:txBody>
-      </p:sp>
-      <p:cxnSp>
-        <p:nvCxnSpPr>
-          <p:cNvPr id="13" name="Straight Connector 12"/>
-          <p:cNvCxnSpPr>
-            <a:stCxn id="14" idx="2"/>
-          </p:cNvCxnSpPr>
-          <p:nvPr/>
-        </p:nvCxnSpPr>
-        <p:spPr>
-          <a:xfrm flipH="1">
-            <a:off x="5068437" y="666552"/>
-            <a:ext cx="20995" cy="5818235"/>
-          </a:xfrm>
-          <a:prstGeom prst="line">
-            <a:avLst/>
-          </a:prstGeom>
-          <a:ln>
-            <a:prstDash val="dash"/>
-          </a:ln>
-          <a:effectLst/>
-        </p:spPr>
-        <p:style>
-          <a:lnRef idx="2">
-            <a:schemeClr val="dk1"/>
-          </a:lnRef>
-          <a:fillRef idx="0">
-            <a:schemeClr val="dk1"/>
-          </a:fillRef>
-          <a:effectRef idx="1">
-            <a:schemeClr val="dk1"/>
-          </a:effectRef>
-          <a:fontRef idx="minor">
-            <a:schemeClr val="tx1"/>
-          </a:fontRef>
-        </p:style>
-      </p:cxnSp>
-      <p:sp>
-        <p:nvSpPr>
-          <p:cNvPr id="14" name="TextBox 13"/>
-          <p:cNvSpPr txBox="1"/>
-          <p:nvPr/>
-        </p:nvSpPr>
-        <p:spPr>
-          <a:xfrm>
-            <a:off x="4758095" y="297220"/>
-            <a:ext cx="662674" cy="369332"/>
-          </a:xfrm>
-          <a:prstGeom prst="rect">
-            <a:avLst/>
-          </a:prstGeom>
-          <a:noFill/>
-          <a:ln>
+          </p:spPr>
+          <p:style>
+            <a:lnRef idx="2">
+              <a:schemeClr val="dk1"/>
+            </a:lnRef>
+            <a:fillRef idx="1">
+              <a:schemeClr val="lt1"/>
+            </a:fillRef>
+            <a:effectRef idx="0">
+              <a:schemeClr val="dk1"/>
+            </a:effectRef>
+            <a:fontRef idx="minor">
+              <a:schemeClr val="dk1"/>
+            </a:fontRef>
+          </p:style>
+          <p:txBody>
+            <a:bodyPr rtlCol="0" anchor="ctr"/>
+            <a:lstStyle/>
+            <a:p>
+              <a:pPr algn="ctr"/>
+              <a:r>
+                <a:rPr lang="en-US" dirty="0" smtClean="0"/>
+                <a:t>Website</a:t>
+              </a:r>
+              <a:endParaRPr lang="en-US" dirty="0"/>
+            </a:p>
+          </p:txBody>
+        </p:sp>
+        <p:sp>
+          <p:nvSpPr>
+            <p:cNvPr id="80" name="Rectangle 79"/>
+            <p:cNvSpPr/>
+            <p:nvPr/>
+          </p:nvSpPr>
+          <p:spPr>
+            <a:xfrm>
+              <a:off x="3669033" y="718845"/>
+              <a:ext cx="1319866" cy="384208"/>
+            </a:xfrm>
+            <a:prstGeom prst="rect">
+              <a:avLst/>
+            </a:prstGeom>
             <a:solidFill>
-              <a:schemeClr val="tx1"/>
+              <a:srgbClr val="FFFFFF"/>
             </a:solidFill>
-          </a:ln>
-        </p:spPr>
-        <p:txBody>
-          <a:bodyPr wrap="none" rtlCol="0">
-            <a:spAutoFit/>
-          </a:bodyPr>
-          <a:lstStyle/>
-          <a:p>
-            <a:r>
-              <a:rPr lang="en-US" dirty="0" smtClean="0"/>
-              <a:t>Logic</a:t>
-            </a:r>
-            <a:endParaRPr lang="en-US" dirty="0"/>
-          </a:p>
-        </p:txBody>
-      </p:sp>
-      <p:cxnSp>
-        <p:nvCxnSpPr>
-          <p:cNvPr id="15" name="Straight Connector 14"/>
-          <p:cNvCxnSpPr>
-            <a:stCxn id="16" idx="2"/>
-          </p:cNvCxnSpPr>
-          <p:nvPr/>
-        </p:nvCxnSpPr>
-        <p:spPr>
-          <a:xfrm flipH="1">
-            <a:off x="7181742" y="666552"/>
-            <a:ext cx="86085" cy="5818235"/>
-          </a:xfrm>
-          <a:prstGeom prst="line">
-            <a:avLst/>
-          </a:prstGeom>
-          <a:ln>
-            <a:prstDash val="dash"/>
-          </a:ln>
-          <a:effectLst/>
-        </p:spPr>
-        <p:style>
-          <a:lnRef idx="2">
-            <a:schemeClr val="dk1"/>
-          </a:lnRef>
-          <a:fillRef idx="0">
-            <a:schemeClr val="dk1"/>
-          </a:fillRef>
-          <a:effectRef idx="1">
-            <a:schemeClr val="dk1"/>
-          </a:effectRef>
-          <a:fontRef idx="minor">
-            <a:schemeClr val="tx1"/>
-          </a:fontRef>
-        </p:style>
-      </p:cxnSp>
-      <p:sp>
-        <p:nvSpPr>
-          <p:cNvPr id="16" name="TextBox 15"/>
-          <p:cNvSpPr txBox="1"/>
-          <p:nvPr/>
-        </p:nvSpPr>
-        <p:spPr>
-          <a:xfrm>
-            <a:off x="6871399" y="297220"/>
-            <a:ext cx="792855" cy="369332"/>
-          </a:xfrm>
-          <a:prstGeom prst="rect">
-            <a:avLst/>
-          </a:prstGeom>
-          <a:noFill/>
-          <a:ln>
+          </p:spPr>
+          <p:style>
+            <a:lnRef idx="2">
+              <a:schemeClr val="dk1"/>
+            </a:lnRef>
+            <a:fillRef idx="1">
+              <a:schemeClr val="lt1"/>
+            </a:fillRef>
+            <a:effectRef idx="0">
+              <a:schemeClr val="dk1"/>
+            </a:effectRef>
+            <a:fontRef idx="minor">
+              <a:schemeClr val="dk1"/>
+            </a:fontRef>
+          </p:style>
+          <p:txBody>
+            <a:bodyPr rtlCol="0" anchor="ctr"/>
+            <a:lstStyle/>
+            <a:p>
+              <a:pPr algn="ctr"/>
+              <a:r>
+                <a:rPr lang="en-US" dirty="0" smtClean="0"/>
+                <a:t>REST Server</a:t>
+              </a:r>
+              <a:endParaRPr lang="en-US" dirty="0"/>
+            </a:p>
+          </p:txBody>
+        </p:sp>
+        <p:sp>
+          <p:nvSpPr>
+            <p:cNvPr id="81" name="Rectangle 80"/>
+            <p:cNvSpPr/>
+            <p:nvPr/>
+          </p:nvSpPr>
+          <p:spPr>
+            <a:xfrm>
+              <a:off x="6623046" y="718845"/>
+              <a:ext cx="1319866" cy="384208"/>
+            </a:xfrm>
+            <a:prstGeom prst="rect">
+              <a:avLst/>
+            </a:prstGeom>
             <a:solidFill>
-              <a:schemeClr val="tx1"/>
+              <a:srgbClr val="FFFFFF"/>
             </a:solidFill>
-          </a:ln>
-        </p:spPr>
-        <p:txBody>
-          <a:bodyPr wrap="none" rtlCol="0">
-            <a:spAutoFit/>
-          </a:bodyPr>
-          <a:lstStyle/>
-          <a:p>
-            <a:r>
-              <a:rPr lang="en-US" dirty="0" smtClean="0"/>
-              <a:t>Model</a:t>
-            </a:r>
-            <a:endParaRPr lang="en-US" dirty="0"/>
-          </a:p>
-        </p:txBody>
-      </p:sp>
-      <p:sp>
-        <p:nvSpPr>
-          <p:cNvPr id="17" name="Rectangle 16"/>
-          <p:cNvSpPr/>
-          <p:nvPr/>
-        </p:nvSpPr>
-        <p:spPr>
-          <a:xfrm>
-            <a:off x="578805" y="1121328"/>
-            <a:ext cx="378325" cy="4985180"/>
-          </a:xfrm>
-          <a:prstGeom prst="rect">
-            <a:avLst/>
-          </a:prstGeom>
-        </p:spPr>
-        <p:style>
-          <a:lnRef idx="2">
-            <a:schemeClr val="dk1"/>
-          </a:lnRef>
-          <a:fillRef idx="1">
-            <a:schemeClr val="lt1"/>
-          </a:fillRef>
-          <a:effectRef idx="0">
-            <a:schemeClr val="dk1"/>
-          </a:effectRef>
-          <a:fontRef idx="minor">
-            <a:schemeClr val="dk1"/>
-          </a:fontRef>
-        </p:style>
-        <p:txBody>
-          <a:bodyPr rtlCol="0" anchor="ctr"/>
-          <a:lstStyle/>
-          <a:p>
-            <a:pPr algn="ctr"/>
-            <a:endParaRPr lang="en-US"/>
-          </a:p>
-        </p:txBody>
-      </p:sp>
-      <p:sp>
-        <p:nvSpPr>
-          <p:cNvPr id="18" name="Rectangle 17"/>
-          <p:cNvSpPr/>
-          <p:nvPr/>
-        </p:nvSpPr>
-        <p:spPr>
-          <a:xfrm>
-            <a:off x="2732506" y="1381808"/>
-            <a:ext cx="378325" cy="4413970"/>
-          </a:xfrm>
-          <a:prstGeom prst="rect">
-            <a:avLst/>
-          </a:prstGeom>
-        </p:spPr>
-        <p:style>
-          <a:lnRef idx="2">
-            <a:schemeClr val="dk1"/>
-          </a:lnRef>
-          <a:fillRef idx="1">
-            <a:schemeClr val="lt1"/>
-          </a:fillRef>
-          <a:effectRef idx="0">
-            <a:schemeClr val="dk1"/>
-          </a:effectRef>
-          <a:fontRef idx="minor">
-            <a:schemeClr val="dk1"/>
-          </a:fontRef>
-        </p:style>
-        <p:txBody>
-          <a:bodyPr rtlCol="0" anchor="ctr"/>
-          <a:lstStyle/>
-          <a:p>
-            <a:pPr algn="ctr"/>
-            <a:endParaRPr lang="en-US"/>
-          </a:p>
-        </p:txBody>
-      </p:sp>
-      <p:cxnSp>
-        <p:nvCxnSpPr>
-          <p:cNvPr id="19" name="Straight Arrow Connector 18"/>
-          <p:cNvCxnSpPr/>
-          <p:nvPr/>
-        </p:nvCxnSpPr>
-        <p:spPr>
-          <a:xfrm flipV="1">
-            <a:off x="957130" y="1418776"/>
-            <a:ext cx="1775376" cy="2"/>
-          </a:xfrm>
-          <a:prstGeom prst="straightConnector1">
-            <a:avLst/>
-          </a:prstGeom>
-          <a:ln>
-            <a:tailEnd type="arrow"/>
-          </a:ln>
-          <a:effectLst/>
-        </p:spPr>
-        <p:style>
-          <a:lnRef idx="2">
-            <a:schemeClr val="dk1"/>
-          </a:lnRef>
-          <a:fillRef idx="0">
-            <a:schemeClr val="dk1"/>
-          </a:fillRef>
-          <a:effectRef idx="1">
-            <a:schemeClr val="dk1"/>
-          </a:effectRef>
-          <a:fontRef idx="minor">
-            <a:schemeClr val="tx1"/>
-          </a:fontRef>
-        </p:style>
-      </p:cxnSp>
-      <p:sp>
-        <p:nvSpPr>
-          <p:cNvPr id="22" name="Rectangle 21"/>
-          <p:cNvSpPr/>
-          <p:nvPr/>
-        </p:nvSpPr>
-        <p:spPr>
-          <a:xfrm>
-            <a:off x="4900269" y="1534208"/>
-            <a:ext cx="378325" cy="3991371"/>
-          </a:xfrm>
-          <a:prstGeom prst="rect">
-            <a:avLst/>
-          </a:prstGeom>
-        </p:spPr>
-        <p:style>
-          <a:lnRef idx="2">
-            <a:schemeClr val="dk1"/>
-          </a:lnRef>
-          <a:fillRef idx="1">
-            <a:schemeClr val="lt1"/>
-          </a:fillRef>
-          <a:effectRef idx="0">
-            <a:schemeClr val="dk1"/>
-          </a:effectRef>
-          <a:fontRef idx="minor">
-            <a:schemeClr val="dk1"/>
-          </a:fontRef>
-        </p:style>
-        <p:txBody>
-          <a:bodyPr rtlCol="0" anchor="ctr"/>
-          <a:lstStyle/>
-          <a:p>
-            <a:pPr algn="ctr"/>
-            <a:endParaRPr lang="en-US"/>
-          </a:p>
-        </p:txBody>
-      </p:sp>
-      <p:cxnSp>
-        <p:nvCxnSpPr>
-          <p:cNvPr id="23" name="Straight Arrow Connector 22"/>
-          <p:cNvCxnSpPr/>
-          <p:nvPr/>
-        </p:nvCxnSpPr>
-        <p:spPr>
-          <a:xfrm flipV="1">
-            <a:off x="3117839" y="1575197"/>
-            <a:ext cx="1775376" cy="2"/>
-          </a:xfrm>
-          <a:prstGeom prst="straightConnector1">
-            <a:avLst/>
-          </a:prstGeom>
-          <a:ln>
-            <a:tailEnd type="arrow"/>
-          </a:ln>
-          <a:effectLst/>
-        </p:spPr>
-        <p:style>
-          <a:lnRef idx="2">
-            <a:schemeClr val="dk1"/>
-          </a:lnRef>
-          <a:fillRef idx="0">
-            <a:schemeClr val="dk1"/>
-          </a:fillRef>
-          <a:effectRef idx="1">
-            <a:schemeClr val="dk1"/>
-          </a:effectRef>
-          <a:fontRef idx="minor">
-            <a:schemeClr val="tx1"/>
-          </a:fontRef>
-        </p:style>
-      </p:cxnSp>
-      <p:cxnSp>
-        <p:nvCxnSpPr>
-          <p:cNvPr id="24" name="Straight Arrow Connector 23"/>
-          <p:cNvCxnSpPr/>
-          <p:nvPr/>
-        </p:nvCxnSpPr>
-        <p:spPr>
-          <a:xfrm flipV="1">
-            <a:off x="5278594" y="2871217"/>
-            <a:ext cx="1775376" cy="2"/>
-          </a:xfrm>
-          <a:prstGeom prst="straightConnector1">
-            <a:avLst/>
-          </a:prstGeom>
-          <a:ln>
-            <a:tailEnd type="arrow"/>
-          </a:ln>
-          <a:effectLst/>
-        </p:spPr>
-        <p:style>
-          <a:lnRef idx="2">
-            <a:schemeClr val="dk1"/>
-          </a:lnRef>
-          <a:fillRef idx="0">
-            <a:schemeClr val="dk1"/>
-          </a:fillRef>
-          <a:effectRef idx="1">
-            <a:schemeClr val="dk1"/>
-          </a:effectRef>
-          <a:fontRef idx="minor">
-            <a:schemeClr val="tx1"/>
-          </a:fontRef>
-        </p:style>
-      </p:cxnSp>
-      <p:sp>
-        <p:nvSpPr>
-          <p:cNvPr id="25" name="Rectangle 24"/>
-          <p:cNvSpPr/>
-          <p:nvPr/>
-        </p:nvSpPr>
-        <p:spPr>
-          <a:xfrm>
-            <a:off x="7051640" y="2830687"/>
-            <a:ext cx="378325" cy="690689"/>
-          </a:xfrm>
-          <a:prstGeom prst="rect">
-            <a:avLst/>
-          </a:prstGeom>
-        </p:spPr>
-        <p:style>
-          <a:lnRef idx="2">
-            <a:schemeClr val="dk1"/>
-          </a:lnRef>
-          <a:fillRef idx="1">
-            <a:schemeClr val="lt1"/>
-          </a:fillRef>
-          <a:effectRef idx="0">
-            <a:schemeClr val="dk1"/>
-          </a:effectRef>
-          <a:fontRef idx="minor">
-            <a:schemeClr val="dk1"/>
-          </a:fontRef>
-        </p:style>
-        <p:txBody>
-          <a:bodyPr rtlCol="0" anchor="ctr"/>
-          <a:lstStyle/>
-          <a:p>
-            <a:pPr algn="ctr"/>
-            <a:endParaRPr lang="en-US"/>
-          </a:p>
-        </p:txBody>
-      </p:sp>
-      <p:cxnSp>
-        <p:nvCxnSpPr>
-          <p:cNvPr id="26" name="Straight Arrow Connector 25"/>
-          <p:cNvCxnSpPr/>
-          <p:nvPr/>
-        </p:nvCxnSpPr>
-        <p:spPr>
-          <a:xfrm flipV="1">
-            <a:off x="5278594" y="3485066"/>
-            <a:ext cx="1775376" cy="2"/>
-          </a:xfrm>
-          <a:prstGeom prst="straightConnector1">
-            <a:avLst/>
-          </a:prstGeom>
-          <a:ln>
-            <a:prstDash val="dash"/>
-            <a:headEnd type="arrow"/>
-            <a:tailEnd type="none"/>
-          </a:ln>
-          <a:effectLst/>
-        </p:spPr>
-        <p:style>
-          <a:lnRef idx="2">
-            <a:schemeClr val="dk1"/>
-          </a:lnRef>
-          <a:fillRef idx="0">
-            <a:schemeClr val="dk1"/>
-          </a:fillRef>
-          <a:effectRef idx="1">
-            <a:schemeClr val="dk1"/>
-          </a:effectRef>
-          <a:fontRef idx="minor">
-            <a:schemeClr val="tx1"/>
-          </a:fontRef>
-        </p:style>
-      </p:cxnSp>
-      <p:cxnSp>
-        <p:nvCxnSpPr>
-          <p:cNvPr id="27" name="Straight Arrow Connector 26"/>
-          <p:cNvCxnSpPr/>
-          <p:nvPr/>
-        </p:nvCxnSpPr>
-        <p:spPr>
-          <a:xfrm flipV="1">
-            <a:off x="3124343" y="5525577"/>
-            <a:ext cx="1775376" cy="2"/>
-          </a:xfrm>
-          <a:prstGeom prst="straightConnector1">
-            <a:avLst/>
-          </a:prstGeom>
-          <a:ln>
-            <a:prstDash val="dash"/>
-            <a:headEnd type="arrow"/>
-            <a:tailEnd type="none"/>
-          </a:ln>
-          <a:effectLst/>
-        </p:spPr>
-        <p:style>
-          <a:lnRef idx="2">
-            <a:schemeClr val="dk1"/>
-          </a:lnRef>
-          <a:fillRef idx="0">
-            <a:schemeClr val="dk1"/>
-          </a:fillRef>
-          <a:effectRef idx="1">
-            <a:schemeClr val="dk1"/>
-          </a:effectRef>
-          <a:fontRef idx="minor">
-            <a:schemeClr val="tx1"/>
-          </a:fontRef>
-        </p:style>
-      </p:cxnSp>
-      <p:cxnSp>
-        <p:nvCxnSpPr>
-          <p:cNvPr id="28" name="Straight Arrow Connector 27"/>
-          <p:cNvCxnSpPr/>
-          <p:nvPr/>
-        </p:nvCxnSpPr>
-        <p:spPr>
-          <a:xfrm flipV="1">
-            <a:off x="957130" y="5778448"/>
-            <a:ext cx="1775376" cy="2"/>
-          </a:xfrm>
-          <a:prstGeom prst="straightConnector1">
-            <a:avLst/>
-          </a:prstGeom>
-          <a:ln>
-            <a:prstDash val="dash"/>
-            <a:headEnd type="arrow"/>
-            <a:tailEnd type="none"/>
-          </a:ln>
-          <a:effectLst/>
-        </p:spPr>
-        <p:style>
-          <a:lnRef idx="2">
-            <a:schemeClr val="dk1"/>
-          </a:lnRef>
-          <a:fillRef idx="0">
-            <a:schemeClr val="dk1"/>
-          </a:fillRef>
-          <a:effectRef idx="1">
-            <a:schemeClr val="dk1"/>
-          </a:effectRef>
-          <a:fontRef idx="minor">
-            <a:schemeClr val="tx1"/>
-          </a:fontRef>
-        </p:style>
-      </p:cxnSp>
-      <p:sp>
-        <p:nvSpPr>
-          <p:cNvPr id="29" name="TextBox 28"/>
-          <p:cNvSpPr txBox="1"/>
-          <p:nvPr/>
-        </p:nvSpPr>
-        <p:spPr>
-          <a:xfrm>
-            <a:off x="3205415" y="1210652"/>
-            <a:ext cx="1641796" cy="369332"/>
-          </a:xfrm>
-          <a:prstGeom prst="rect">
-            <a:avLst/>
-          </a:prstGeom>
-          <a:noFill/>
-        </p:spPr>
-        <p:txBody>
-          <a:bodyPr wrap="none" rtlCol="0">
-            <a:spAutoFit/>
-          </a:bodyPr>
-          <a:lstStyle/>
-          <a:p>
-            <a:r>
-              <a:rPr lang="en-US" dirty="0" err="1" smtClean="0"/>
-              <a:t>executeQuery</a:t>
-            </a:r>
-            <a:r>
-              <a:rPr lang="en-US" dirty="0" smtClean="0"/>
-              <a:t>()</a:t>
-            </a:r>
-            <a:endParaRPr lang="en-US" dirty="0"/>
-          </a:p>
-        </p:txBody>
-      </p:sp>
-      <p:sp>
-        <p:nvSpPr>
-          <p:cNvPr id="30" name="TextBox 29"/>
-          <p:cNvSpPr txBox="1"/>
-          <p:nvPr/>
-        </p:nvSpPr>
-        <p:spPr>
-          <a:xfrm>
-            <a:off x="5465699" y="2521031"/>
-            <a:ext cx="1351652" cy="646331"/>
-          </a:xfrm>
-          <a:prstGeom prst="rect">
-            <a:avLst/>
-          </a:prstGeom>
-          <a:noFill/>
-        </p:spPr>
-        <p:txBody>
-          <a:bodyPr wrap="none" rtlCol="0">
-            <a:spAutoFit/>
-          </a:bodyPr>
-          <a:lstStyle/>
-          <a:p>
-            <a:r>
-              <a:rPr lang="en-US" dirty="0" smtClean="0"/>
-              <a:t>Get relevant</a:t>
-            </a:r>
-          </a:p>
-          <a:p>
-            <a:r>
-              <a:rPr lang="en-US" dirty="0" smtClean="0"/>
-              <a:t>details</a:t>
-            </a:r>
-            <a:endParaRPr lang="en-US" dirty="0"/>
-          </a:p>
-        </p:txBody>
-      </p:sp>
-      <p:sp>
-        <p:nvSpPr>
-          <p:cNvPr id="31" name="TextBox 30"/>
-          <p:cNvSpPr txBox="1"/>
-          <p:nvPr/>
-        </p:nvSpPr>
-        <p:spPr>
-          <a:xfrm>
-            <a:off x="972476" y="1056482"/>
-            <a:ext cx="1760030" cy="369332"/>
-          </a:xfrm>
-          <a:prstGeom prst="rect">
-            <a:avLst/>
-          </a:prstGeom>
-          <a:noFill/>
-        </p:spPr>
-        <p:txBody>
-          <a:bodyPr wrap="none" rtlCol="0">
-            <a:spAutoFit/>
-          </a:bodyPr>
-          <a:lstStyle/>
-          <a:p>
-            <a:r>
-              <a:rPr lang="en-US" dirty="0" smtClean="0"/>
-              <a:t>Get Visualization</a:t>
-            </a:r>
-            <a:endParaRPr lang="en-US" dirty="0"/>
-          </a:p>
-        </p:txBody>
-      </p:sp>
-      <p:sp>
-        <p:nvSpPr>
-          <p:cNvPr id="32" name="TextBox 31"/>
-          <p:cNvSpPr txBox="1"/>
-          <p:nvPr/>
-        </p:nvSpPr>
-        <p:spPr>
-          <a:xfrm>
-            <a:off x="3265846" y="5188903"/>
-            <a:ext cx="1627369" cy="646331"/>
-          </a:xfrm>
-          <a:prstGeom prst="rect">
-            <a:avLst/>
-          </a:prstGeom>
-          <a:noFill/>
-        </p:spPr>
-        <p:txBody>
-          <a:bodyPr wrap="none" rtlCol="0">
-            <a:spAutoFit/>
-          </a:bodyPr>
-          <a:lstStyle/>
-          <a:p>
-            <a:r>
-              <a:rPr lang="en-US" dirty="0" smtClean="0"/>
-              <a:t>Get JSON</a:t>
-            </a:r>
-            <a:endParaRPr lang="en-US" dirty="0"/>
-          </a:p>
-          <a:p>
-            <a:r>
-              <a:rPr lang="en-US" dirty="0" smtClean="0"/>
-              <a:t>Representation</a:t>
-            </a:r>
-            <a:endParaRPr lang="en-US" dirty="0"/>
-          </a:p>
-        </p:txBody>
-      </p:sp>
-      <p:sp>
-        <p:nvSpPr>
-          <p:cNvPr id="33" name="TextBox 32"/>
-          <p:cNvSpPr txBox="1"/>
-          <p:nvPr/>
-        </p:nvSpPr>
-        <p:spPr>
-          <a:xfrm>
-            <a:off x="1118845" y="5386697"/>
-            <a:ext cx="1392929" cy="369332"/>
-          </a:xfrm>
-          <a:prstGeom prst="rect">
-            <a:avLst/>
-          </a:prstGeom>
-          <a:noFill/>
-        </p:spPr>
-        <p:txBody>
-          <a:bodyPr wrap="none" rtlCol="0">
-            <a:spAutoFit/>
-          </a:bodyPr>
-          <a:lstStyle/>
-          <a:p>
-            <a:r>
-              <a:rPr lang="en-US" dirty="0" smtClean="0"/>
-              <a:t>Display JSON</a:t>
-            </a:r>
-            <a:endParaRPr lang="en-US" dirty="0"/>
-          </a:p>
-        </p:txBody>
-      </p:sp>
+          </p:spPr>
+          <p:style>
+            <a:lnRef idx="2">
+              <a:schemeClr val="dk1"/>
+            </a:lnRef>
+            <a:fillRef idx="1">
+              <a:schemeClr val="lt1"/>
+            </a:fillRef>
+            <a:effectRef idx="0">
+              <a:schemeClr val="dk1"/>
+            </a:effectRef>
+            <a:fontRef idx="minor">
+              <a:schemeClr val="dk1"/>
+            </a:fontRef>
+          </p:style>
+          <p:txBody>
+            <a:bodyPr rtlCol="0" anchor="ctr"/>
+            <a:lstStyle/>
+            <a:p>
+              <a:pPr algn="ctr"/>
+              <a:r>
+                <a:rPr lang="en-US" dirty="0" err="1" smtClean="0"/>
+                <a:t>Resouces</a:t>
+              </a:r>
+              <a:endParaRPr lang="en-US" dirty="0"/>
+            </a:p>
+          </p:txBody>
+        </p:sp>
+      </p:grpSp>
     </p:spTree>
     <p:extLst>
       <p:ext uri="{BB962C8B-B14F-4D97-AF65-F5344CB8AC3E}">
         <p14:creationId xmlns:p14="http://schemas.microsoft.com/office/powerpoint/2010/main" val="304724213"/>
+      </p:ext>
+    </p:extLst>
+  </p:cSld>
+  <p:clrMapOvr>
+    <a:masterClrMapping/>
+  </p:clrMapOvr>
+</p:sld>
+</file>
+
+<file path=ppt/slides/slide3.xml><?xml version="1.0" encoding="utf-8"?>
+<p:sld xmlns:a="http://schemas.openxmlformats.org/drawingml/2006/main" xmlns:r="http://schemas.openxmlformats.org/officeDocument/2006/relationships" xmlns:p="http://schemas.openxmlformats.org/presentationml/2006/main">
+  <p:cSld>
+    <p:spTree>
+      <p:nvGrpSpPr>
+        <p:cNvPr id="1" name=""/>
+        <p:cNvGrpSpPr/>
+        <p:nvPr/>
+      </p:nvGrpSpPr>
+      <p:grpSpPr>
+        <a:xfrm>
+          <a:off x="0" y="0"/>
+          <a:ext cx="0" cy="0"/>
+          <a:chOff x="0" y="0"/>
+          <a:chExt cx="0" cy="0"/>
+        </a:xfrm>
+      </p:grpSpPr>
+      <p:grpSp>
+        <p:nvGrpSpPr>
+          <p:cNvPr id="131" name="Group 130"/>
+          <p:cNvGrpSpPr/>
+          <p:nvPr/>
+        </p:nvGrpSpPr>
+        <p:grpSpPr>
+          <a:xfrm>
+            <a:off x="203993" y="103953"/>
+            <a:ext cx="8756932" cy="7029246"/>
+            <a:chOff x="203993" y="103953"/>
+            <a:chExt cx="8756932" cy="7029246"/>
+          </a:xfrm>
+        </p:grpSpPr>
+        <p:sp>
+          <p:nvSpPr>
+            <p:cNvPr id="120" name="Rectangle 119"/>
+            <p:cNvSpPr/>
+            <p:nvPr/>
+          </p:nvSpPr>
+          <p:spPr>
+            <a:xfrm>
+              <a:off x="4343326" y="4053429"/>
+              <a:ext cx="4617599" cy="2710438"/>
+            </a:xfrm>
+            <a:prstGeom prst="rect">
+              <a:avLst/>
+            </a:prstGeom>
+          </p:spPr>
+          <p:style>
+            <a:lnRef idx="2">
+              <a:schemeClr val="dk1"/>
+            </a:lnRef>
+            <a:fillRef idx="1">
+              <a:schemeClr val="lt1"/>
+            </a:fillRef>
+            <a:effectRef idx="0">
+              <a:schemeClr val="dk1"/>
+            </a:effectRef>
+            <a:fontRef idx="minor">
+              <a:schemeClr val="dk1"/>
+            </a:fontRef>
+          </p:style>
+          <p:txBody>
+            <a:bodyPr rtlCol="0" anchor="ctr"/>
+            <a:lstStyle/>
+            <a:p>
+              <a:pPr algn="ctr"/>
+              <a:endParaRPr lang="en-US"/>
+            </a:p>
+          </p:txBody>
+        </p:sp>
+        <p:sp>
+          <p:nvSpPr>
+            <p:cNvPr id="119" name="Rectangle 118"/>
+            <p:cNvSpPr/>
+            <p:nvPr/>
+          </p:nvSpPr>
+          <p:spPr>
+            <a:xfrm>
+              <a:off x="1123199" y="4053429"/>
+              <a:ext cx="2355384" cy="2458815"/>
+            </a:xfrm>
+            <a:prstGeom prst="rect">
+              <a:avLst/>
+            </a:prstGeom>
+          </p:spPr>
+          <p:style>
+            <a:lnRef idx="2">
+              <a:schemeClr val="dk1"/>
+            </a:lnRef>
+            <a:fillRef idx="1">
+              <a:schemeClr val="lt1"/>
+            </a:fillRef>
+            <a:effectRef idx="0">
+              <a:schemeClr val="dk1"/>
+            </a:effectRef>
+            <a:fontRef idx="minor">
+              <a:schemeClr val="dk1"/>
+            </a:fontRef>
+          </p:style>
+          <p:txBody>
+            <a:bodyPr rtlCol="0" anchor="ctr"/>
+            <a:lstStyle/>
+            <a:p>
+              <a:pPr algn="ctr"/>
+              <a:endParaRPr lang="en-US"/>
+            </a:p>
+          </p:txBody>
+        </p:sp>
+        <p:sp>
+          <p:nvSpPr>
+            <p:cNvPr id="118" name="Rectangle 117"/>
+            <p:cNvSpPr/>
+            <p:nvPr/>
+          </p:nvSpPr>
+          <p:spPr>
+            <a:xfrm>
+              <a:off x="203993" y="473285"/>
+              <a:ext cx="7964077" cy="3296433"/>
+            </a:xfrm>
+            <a:prstGeom prst="rect">
+              <a:avLst/>
+            </a:prstGeom>
+          </p:spPr>
+          <p:style>
+            <a:lnRef idx="2">
+              <a:schemeClr val="dk1"/>
+            </a:lnRef>
+            <a:fillRef idx="1">
+              <a:schemeClr val="lt1"/>
+            </a:fillRef>
+            <a:effectRef idx="0">
+              <a:schemeClr val="dk1"/>
+            </a:effectRef>
+            <a:fontRef idx="minor">
+              <a:schemeClr val="dk1"/>
+            </a:fontRef>
+          </p:style>
+          <p:txBody>
+            <a:bodyPr rtlCol="0" anchor="ctr"/>
+            <a:lstStyle/>
+            <a:p>
+              <a:pPr algn="ctr"/>
+              <a:endParaRPr lang="en-US"/>
+            </a:p>
+          </p:txBody>
+        </p:sp>
+        <p:sp>
+          <p:nvSpPr>
+            <p:cNvPr id="29" name="Rounded Rectangle 28"/>
+            <p:cNvSpPr/>
+            <p:nvPr/>
+          </p:nvSpPr>
+          <p:spPr>
+            <a:xfrm>
+              <a:off x="3214042" y="2820483"/>
+              <a:ext cx="1800000" cy="720000"/>
+            </a:xfrm>
+            <a:prstGeom prst="roundRect">
+              <a:avLst/>
+            </a:prstGeom>
+            <a:effectLst/>
+          </p:spPr>
+          <p:style>
+            <a:lnRef idx="2">
+              <a:schemeClr val="accent6">
+                <a:shade val="50000"/>
+              </a:schemeClr>
+            </a:lnRef>
+            <a:fillRef idx="1">
+              <a:schemeClr val="accent6"/>
+            </a:fillRef>
+            <a:effectRef idx="0">
+              <a:schemeClr val="accent6"/>
+            </a:effectRef>
+            <a:fontRef idx="minor">
+              <a:schemeClr val="lt1"/>
+            </a:fontRef>
+          </p:style>
+          <p:txBody>
+            <a:bodyPr rtlCol="0" anchor="ctr"/>
+            <a:lstStyle/>
+            <a:p>
+              <a:pPr algn="ctr"/>
+              <a:r>
+                <a:rPr lang="en-US" dirty="0" smtClean="0"/>
+                <a:t>Controller</a:t>
+              </a:r>
+              <a:endParaRPr lang="en-US" dirty="0" smtClean="0"/>
+            </a:p>
+          </p:txBody>
+        </p:sp>
+        <p:sp>
+          <p:nvSpPr>
+            <p:cNvPr id="30" name="Rounded Rectangle 29"/>
+            <p:cNvSpPr/>
+            <p:nvPr/>
+          </p:nvSpPr>
+          <p:spPr>
+            <a:xfrm>
+              <a:off x="1403238" y="4264858"/>
+              <a:ext cx="1800000" cy="720000"/>
+            </a:xfrm>
+            <a:prstGeom prst="roundRect">
+              <a:avLst/>
+            </a:prstGeom>
+            <a:effectLst/>
+          </p:spPr>
+          <p:style>
+            <a:lnRef idx="2">
+              <a:schemeClr val="accent5">
+                <a:shade val="50000"/>
+              </a:schemeClr>
+            </a:lnRef>
+            <a:fillRef idx="1">
+              <a:schemeClr val="accent5"/>
+            </a:fillRef>
+            <a:effectRef idx="0">
+              <a:schemeClr val="accent5"/>
+            </a:effectRef>
+            <a:fontRef idx="minor">
+              <a:schemeClr val="lt1"/>
+            </a:fontRef>
+          </p:style>
+          <p:txBody>
+            <a:bodyPr rtlCol="0" anchor="ctr"/>
+            <a:lstStyle/>
+            <a:p>
+              <a:pPr algn="ctr"/>
+              <a:r>
+                <a:rPr lang="en-US" dirty="0" err="1" smtClean="0"/>
+                <a:t>UserInterface</a:t>
+              </a:r>
+              <a:endParaRPr lang="en-US" dirty="0"/>
+            </a:p>
+          </p:txBody>
+        </p:sp>
+        <p:sp>
+          <p:nvSpPr>
+            <p:cNvPr id="31" name="Rounded Rectangle 30"/>
+            <p:cNvSpPr/>
+            <p:nvPr/>
+          </p:nvSpPr>
+          <p:spPr>
+            <a:xfrm>
+              <a:off x="4548017" y="4265038"/>
+              <a:ext cx="1800000" cy="720000"/>
+            </a:xfrm>
+            <a:prstGeom prst="roundRect">
+              <a:avLst/>
+            </a:prstGeom>
+            <a:effectLst/>
+          </p:spPr>
+          <p:style>
+            <a:lnRef idx="2">
+              <a:schemeClr val="accent3">
+                <a:shade val="50000"/>
+              </a:schemeClr>
+            </a:lnRef>
+            <a:fillRef idx="1">
+              <a:schemeClr val="accent3"/>
+            </a:fillRef>
+            <a:effectRef idx="0">
+              <a:schemeClr val="accent3"/>
+            </a:effectRef>
+            <a:fontRef idx="minor">
+              <a:schemeClr val="lt1"/>
+            </a:fontRef>
+          </p:style>
+          <p:txBody>
+            <a:bodyPr rtlCol="0" anchor="ctr"/>
+            <a:lstStyle/>
+            <a:p>
+              <a:pPr algn="ctr"/>
+              <a:r>
+                <a:rPr lang="en-US" dirty="0" smtClean="0"/>
+                <a:t>Model</a:t>
+              </a:r>
+            </a:p>
+          </p:txBody>
+        </p:sp>
+        <p:sp>
+          <p:nvSpPr>
+            <p:cNvPr id="32" name="Rounded Rectangle 31"/>
+            <p:cNvSpPr/>
+            <p:nvPr/>
+          </p:nvSpPr>
+          <p:spPr>
+            <a:xfrm>
+              <a:off x="4548017" y="5498236"/>
+              <a:ext cx="1800000" cy="720000"/>
+            </a:xfrm>
+            <a:prstGeom prst="roundRect">
+              <a:avLst/>
+            </a:prstGeom>
+            <a:effectLst/>
+          </p:spPr>
+          <p:style>
+            <a:lnRef idx="2">
+              <a:schemeClr val="accent3">
+                <a:shade val="50000"/>
+              </a:schemeClr>
+            </a:lnRef>
+            <a:fillRef idx="1">
+              <a:schemeClr val="accent3"/>
+            </a:fillRef>
+            <a:effectRef idx="0">
+              <a:schemeClr val="accent3"/>
+            </a:effectRef>
+            <a:fontRef idx="minor">
+              <a:schemeClr val="lt1"/>
+            </a:fontRef>
+          </p:style>
+          <p:txBody>
+            <a:bodyPr rtlCol="0" anchor="ctr"/>
+            <a:lstStyle/>
+            <a:p>
+              <a:pPr algn="ctr"/>
+              <a:r>
+                <a:rPr lang="en-US" dirty="0" err="1" smtClean="0"/>
+                <a:t>ModelManager</a:t>
+              </a:r>
+              <a:endParaRPr lang="en-US" dirty="0" smtClean="0"/>
+            </a:p>
+          </p:txBody>
+        </p:sp>
+        <p:cxnSp>
+          <p:nvCxnSpPr>
+            <p:cNvPr id="36" name="Straight Arrow Connector 35"/>
+            <p:cNvCxnSpPr>
+              <a:stCxn id="30" idx="0"/>
+              <a:endCxn id="29" idx="2"/>
+            </p:cNvCxnSpPr>
+            <p:nvPr/>
+          </p:nvCxnSpPr>
+          <p:spPr>
+            <a:xfrm flipV="1">
+              <a:off x="2303238" y="3540483"/>
+              <a:ext cx="1810804" cy="724375"/>
+            </a:xfrm>
+            <a:prstGeom prst="straightConnector1">
+              <a:avLst/>
+            </a:prstGeom>
+            <a:ln>
+              <a:prstDash val="solid"/>
+              <a:tailEnd type="arrow"/>
+            </a:ln>
+            <a:effectLst/>
+          </p:spPr>
+          <p:style>
+            <a:lnRef idx="2">
+              <a:schemeClr val="dk1"/>
+            </a:lnRef>
+            <a:fillRef idx="0">
+              <a:schemeClr val="dk1"/>
+            </a:fillRef>
+            <a:effectRef idx="1">
+              <a:schemeClr val="dk1"/>
+            </a:effectRef>
+            <a:fontRef idx="minor">
+              <a:schemeClr val="tx1"/>
+            </a:fontRef>
+          </p:style>
+        </p:cxnSp>
+        <p:cxnSp>
+          <p:nvCxnSpPr>
+            <p:cNvPr id="37" name="Straight Arrow Connector 36"/>
+            <p:cNvCxnSpPr>
+              <a:endCxn id="32" idx="3"/>
+            </p:cNvCxnSpPr>
+            <p:nvPr/>
+          </p:nvCxnSpPr>
+          <p:spPr>
+            <a:xfrm flipH="1">
+              <a:off x="6348017" y="5858236"/>
+              <a:ext cx="359846" cy="0"/>
+            </a:xfrm>
+            <a:prstGeom prst="straightConnector1">
+              <a:avLst/>
+            </a:prstGeom>
+            <a:ln>
+              <a:prstDash val="solid"/>
+              <a:tailEnd type="diamond" w="lg" len="lg"/>
+            </a:ln>
+            <a:effectLst/>
+          </p:spPr>
+          <p:style>
+            <a:lnRef idx="2">
+              <a:schemeClr val="dk1"/>
+            </a:lnRef>
+            <a:fillRef idx="0">
+              <a:schemeClr val="dk1"/>
+            </a:fillRef>
+            <a:effectRef idx="1">
+              <a:schemeClr val="dk1"/>
+            </a:effectRef>
+            <a:fontRef idx="minor">
+              <a:schemeClr val="tx1"/>
+            </a:fontRef>
+          </p:style>
+        </p:cxnSp>
+        <p:cxnSp>
+          <p:nvCxnSpPr>
+            <p:cNvPr id="38" name="Straight Arrow Connector 37"/>
+            <p:cNvCxnSpPr>
+              <a:stCxn id="32" idx="0"/>
+              <a:endCxn id="2" idx="3"/>
+            </p:cNvCxnSpPr>
+            <p:nvPr/>
+          </p:nvCxnSpPr>
+          <p:spPr>
+            <a:xfrm flipV="1">
+              <a:off x="5448017" y="5164858"/>
+              <a:ext cx="0" cy="333378"/>
+            </a:xfrm>
+            <a:prstGeom prst="straightConnector1">
+              <a:avLst/>
+            </a:prstGeom>
+            <a:ln>
+              <a:prstDash val="solid"/>
+              <a:headEnd type="none"/>
+              <a:tailEnd type="none"/>
+            </a:ln>
+            <a:effectLst/>
+          </p:spPr>
+          <p:style>
+            <a:lnRef idx="2">
+              <a:schemeClr val="dk1"/>
+            </a:lnRef>
+            <a:fillRef idx="0">
+              <a:schemeClr val="dk1"/>
+            </a:fillRef>
+            <a:effectRef idx="1">
+              <a:schemeClr val="dk1"/>
+            </a:effectRef>
+            <a:fontRef idx="minor">
+              <a:schemeClr val="tx1"/>
+            </a:fontRef>
+          </p:style>
+        </p:cxnSp>
+        <p:sp>
+          <p:nvSpPr>
+            <p:cNvPr id="2" name="Isosceles Triangle 1"/>
+            <p:cNvSpPr/>
+            <p:nvPr/>
+          </p:nvSpPr>
+          <p:spPr>
+            <a:xfrm>
+              <a:off x="5358017" y="4984858"/>
+              <a:ext cx="180000" cy="180000"/>
+            </a:xfrm>
+            <a:prstGeom prst="triangle">
+              <a:avLst/>
+            </a:prstGeom>
+          </p:spPr>
+          <p:style>
+            <a:lnRef idx="2">
+              <a:schemeClr val="dk1"/>
+            </a:lnRef>
+            <a:fillRef idx="1">
+              <a:schemeClr val="lt1"/>
+            </a:fillRef>
+            <a:effectRef idx="0">
+              <a:schemeClr val="dk1"/>
+            </a:effectRef>
+            <a:fontRef idx="minor">
+              <a:schemeClr val="dk1"/>
+            </a:fontRef>
+          </p:style>
+          <p:txBody>
+            <a:bodyPr rtlCol="0" anchor="ctr"/>
+            <a:lstStyle/>
+            <a:p>
+              <a:pPr algn="ctr"/>
+              <a:endParaRPr lang="en-US"/>
+            </a:p>
+          </p:txBody>
+        </p:sp>
+        <p:sp>
+          <p:nvSpPr>
+            <p:cNvPr id="45" name="Rounded Rectangle 44"/>
+            <p:cNvSpPr/>
+            <p:nvPr/>
+          </p:nvSpPr>
+          <p:spPr>
+            <a:xfrm>
+              <a:off x="7032142" y="4926448"/>
+              <a:ext cx="1800000" cy="720000"/>
+            </a:xfrm>
+            <a:prstGeom prst="roundRect">
+              <a:avLst/>
+            </a:prstGeom>
+            <a:effectLst/>
+          </p:spPr>
+          <p:style>
+            <a:lnRef idx="2">
+              <a:schemeClr val="accent3">
+                <a:shade val="50000"/>
+              </a:schemeClr>
+            </a:lnRef>
+            <a:fillRef idx="1">
+              <a:schemeClr val="accent3"/>
+            </a:fillRef>
+            <a:effectRef idx="0">
+              <a:schemeClr val="accent3"/>
+            </a:effectRef>
+            <a:fontRef idx="minor">
+              <a:schemeClr val="lt1"/>
+            </a:fontRef>
+          </p:style>
+          <p:txBody>
+            <a:bodyPr rtlCol="0" anchor="ctr"/>
+            <a:lstStyle/>
+            <a:p>
+              <a:pPr algn="ctr"/>
+              <a:r>
+                <a:rPr lang="en-US" dirty="0" smtClean="0"/>
+                <a:t>Paper</a:t>
+              </a:r>
+              <a:endParaRPr lang="en-US" dirty="0" smtClean="0"/>
+            </a:p>
+          </p:txBody>
+        </p:sp>
+        <p:sp>
+          <p:nvSpPr>
+            <p:cNvPr id="47" name="Rounded Rectangle 46"/>
+            <p:cNvSpPr/>
+            <p:nvPr/>
+          </p:nvSpPr>
+          <p:spPr>
+            <a:xfrm>
+              <a:off x="7032142" y="5966316"/>
+              <a:ext cx="1800000" cy="720000"/>
+            </a:xfrm>
+            <a:prstGeom prst="roundRect">
+              <a:avLst/>
+            </a:prstGeom>
+            <a:effectLst/>
+          </p:spPr>
+          <p:style>
+            <a:lnRef idx="2">
+              <a:schemeClr val="accent3">
+                <a:shade val="50000"/>
+              </a:schemeClr>
+            </a:lnRef>
+            <a:fillRef idx="1">
+              <a:schemeClr val="accent3"/>
+            </a:fillRef>
+            <a:effectRef idx="0">
+              <a:schemeClr val="accent3"/>
+            </a:effectRef>
+            <a:fontRef idx="minor">
+              <a:schemeClr val="lt1"/>
+            </a:fontRef>
+          </p:style>
+          <p:txBody>
+            <a:bodyPr rtlCol="0" anchor="ctr"/>
+            <a:lstStyle/>
+            <a:p>
+              <a:pPr algn="ctr"/>
+              <a:r>
+                <a:rPr lang="en-US" dirty="0" smtClean="0"/>
+                <a:t>Author</a:t>
+              </a:r>
+              <a:endParaRPr lang="en-US" dirty="0" smtClean="0"/>
+            </a:p>
+          </p:txBody>
+        </p:sp>
+        <p:cxnSp>
+          <p:nvCxnSpPr>
+            <p:cNvPr id="48" name="Straight Arrow Connector 47"/>
+            <p:cNvCxnSpPr/>
+            <p:nvPr/>
+          </p:nvCxnSpPr>
+          <p:spPr>
+            <a:xfrm flipV="1">
+              <a:off x="6694860" y="5272938"/>
+              <a:ext cx="0" cy="1066888"/>
+            </a:xfrm>
+            <a:prstGeom prst="straightConnector1">
+              <a:avLst/>
+            </a:prstGeom>
+            <a:ln>
+              <a:prstDash val="solid"/>
+              <a:headEnd type="none"/>
+              <a:tailEnd type="none"/>
+            </a:ln>
+            <a:effectLst/>
+          </p:spPr>
+          <p:style>
+            <a:lnRef idx="2">
+              <a:schemeClr val="dk1"/>
+            </a:lnRef>
+            <a:fillRef idx="0">
+              <a:schemeClr val="dk1"/>
+            </a:fillRef>
+            <a:effectRef idx="1">
+              <a:schemeClr val="dk1"/>
+            </a:effectRef>
+            <a:fontRef idx="minor">
+              <a:schemeClr val="tx1"/>
+            </a:fontRef>
+          </p:style>
+        </p:cxnSp>
+        <p:cxnSp>
+          <p:nvCxnSpPr>
+            <p:cNvPr id="51" name="Straight Arrow Connector 50"/>
+            <p:cNvCxnSpPr>
+              <a:endCxn id="45" idx="1"/>
+            </p:cNvCxnSpPr>
+            <p:nvPr/>
+          </p:nvCxnSpPr>
+          <p:spPr>
+            <a:xfrm>
+              <a:off x="6694860" y="5286448"/>
+              <a:ext cx="337282" cy="0"/>
+            </a:xfrm>
+            <a:prstGeom prst="straightConnector1">
+              <a:avLst/>
+            </a:prstGeom>
+            <a:ln>
+              <a:prstDash val="solid"/>
+              <a:headEnd type="none"/>
+              <a:tailEnd type="none"/>
+            </a:ln>
+            <a:effectLst/>
+          </p:spPr>
+          <p:style>
+            <a:lnRef idx="2">
+              <a:schemeClr val="dk1"/>
+            </a:lnRef>
+            <a:fillRef idx="0">
+              <a:schemeClr val="dk1"/>
+            </a:fillRef>
+            <a:effectRef idx="1">
+              <a:schemeClr val="dk1"/>
+            </a:effectRef>
+            <a:fontRef idx="minor">
+              <a:schemeClr val="tx1"/>
+            </a:fontRef>
+          </p:style>
+        </p:cxnSp>
+        <p:cxnSp>
+          <p:nvCxnSpPr>
+            <p:cNvPr id="52" name="Straight Arrow Connector 51"/>
+            <p:cNvCxnSpPr>
+              <a:endCxn id="47" idx="1"/>
+            </p:cNvCxnSpPr>
+            <p:nvPr/>
+          </p:nvCxnSpPr>
+          <p:spPr>
+            <a:xfrm>
+              <a:off x="6707863" y="6326316"/>
+              <a:ext cx="324279" cy="0"/>
+            </a:xfrm>
+            <a:prstGeom prst="straightConnector1">
+              <a:avLst/>
+            </a:prstGeom>
+            <a:ln>
+              <a:prstDash val="solid"/>
+              <a:headEnd type="none"/>
+              <a:tailEnd type="none"/>
+            </a:ln>
+            <a:effectLst/>
+          </p:spPr>
+          <p:style>
+            <a:lnRef idx="2">
+              <a:schemeClr val="dk1"/>
+            </a:lnRef>
+            <a:fillRef idx="0">
+              <a:schemeClr val="dk1"/>
+            </a:fillRef>
+            <a:effectRef idx="1">
+              <a:schemeClr val="dk1"/>
+            </a:effectRef>
+            <a:fontRef idx="minor">
+              <a:schemeClr val="tx1"/>
+            </a:fontRef>
+          </p:style>
+        </p:cxnSp>
+        <p:sp>
+          <p:nvSpPr>
+            <p:cNvPr id="58" name="Rounded Rectangle 57"/>
+            <p:cNvSpPr/>
+            <p:nvPr/>
+          </p:nvSpPr>
+          <p:spPr>
+            <a:xfrm>
+              <a:off x="1403238" y="5498236"/>
+              <a:ext cx="1800000" cy="720000"/>
+            </a:xfrm>
+            <a:prstGeom prst="roundRect">
+              <a:avLst/>
+            </a:prstGeom>
+            <a:effectLst/>
+          </p:spPr>
+          <p:style>
+            <a:lnRef idx="2">
+              <a:schemeClr val="accent5">
+                <a:shade val="50000"/>
+              </a:schemeClr>
+            </a:lnRef>
+            <a:fillRef idx="1">
+              <a:schemeClr val="accent5"/>
+            </a:fillRef>
+            <a:effectRef idx="0">
+              <a:schemeClr val="accent5"/>
+            </a:effectRef>
+            <a:fontRef idx="minor">
+              <a:schemeClr val="lt1"/>
+            </a:fontRef>
+          </p:style>
+          <p:txBody>
+            <a:bodyPr rtlCol="0" anchor="ctr"/>
+            <a:lstStyle/>
+            <a:p>
+              <a:pPr algn="ctr"/>
+              <a:r>
+                <a:rPr lang="en-US" dirty="0" err="1" smtClean="0"/>
+                <a:t>HttpUI</a:t>
+              </a:r>
+              <a:endParaRPr lang="en-US" dirty="0"/>
+            </a:p>
+          </p:txBody>
+        </p:sp>
+        <p:cxnSp>
+          <p:nvCxnSpPr>
+            <p:cNvPr id="61" name="Straight Arrow Connector 60"/>
+            <p:cNvCxnSpPr>
+              <a:stCxn id="58" idx="0"/>
+              <a:endCxn id="62" idx="3"/>
+            </p:cNvCxnSpPr>
+            <p:nvPr/>
+          </p:nvCxnSpPr>
+          <p:spPr>
+            <a:xfrm flipV="1">
+              <a:off x="2303238" y="5165038"/>
+              <a:ext cx="340" cy="333198"/>
+            </a:xfrm>
+            <a:prstGeom prst="straightConnector1">
+              <a:avLst/>
+            </a:prstGeom>
+            <a:ln>
+              <a:prstDash val="solid"/>
+              <a:headEnd type="none"/>
+              <a:tailEnd type="none"/>
+            </a:ln>
+            <a:effectLst/>
+          </p:spPr>
+          <p:style>
+            <a:lnRef idx="2">
+              <a:schemeClr val="dk1"/>
+            </a:lnRef>
+            <a:fillRef idx="0">
+              <a:schemeClr val="dk1"/>
+            </a:fillRef>
+            <a:effectRef idx="1">
+              <a:schemeClr val="dk1"/>
+            </a:effectRef>
+            <a:fontRef idx="minor">
+              <a:schemeClr val="tx1"/>
+            </a:fontRef>
+          </p:style>
+        </p:cxnSp>
+        <p:sp>
+          <p:nvSpPr>
+            <p:cNvPr id="62" name="Isosceles Triangle 61"/>
+            <p:cNvSpPr/>
+            <p:nvPr/>
+          </p:nvSpPr>
+          <p:spPr>
+            <a:xfrm>
+              <a:off x="2213578" y="4985038"/>
+              <a:ext cx="180000" cy="180000"/>
+            </a:xfrm>
+            <a:prstGeom prst="triangle">
+              <a:avLst/>
+            </a:prstGeom>
+          </p:spPr>
+          <p:style>
+            <a:lnRef idx="2">
+              <a:schemeClr val="dk1"/>
+            </a:lnRef>
+            <a:fillRef idx="1">
+              <a:schemeClr val="lt1"/>
+            </a:fillRef>
+            <a:effectRef idx="0">
+              <a:schemeClr val="dk1"/>
+            </a:effectRef>
+            <a:fontRef idx="minor">
+              <a:schemeClr val="dk1"/>
+            </a:fontRef>
+          </p:style>
+          <p:txBody>
+            <a:bodyPr rtlCol="0" anchor="ctr"/>
+            <a:lstStyle/>
+            <a:p>
+              <a:pPr algn="ctr"/>
+              <a:endParaRPr lang="en-US"/>
+            </a:p>
+          </p:txBody>
+        </p:sp>
+        <p:cxnSp>
+          <p:nvCxnSpPr>
+            <p:cNvPr id="63" name="Straight Arrow Connector 62"/>
+            <p:cNvCxnSpPr>
+              <a:stCxn id="29" idx="2"/>
+              <a:endCxn id="31" idx="0"/>
+            </p:cNvCxnSpPr>
+            <p:nvPr/>
+          </p:nvCxnSpPr>
+          <p:spPr>
+            <a:xfrm>
+              <a:off x="4114042" y="3540483"/>
+              <a:ext cx="1333975" cy="724555"/>
+            </a:xfrm>
+            <a:prstGeom prst="straightConnector1">
+              <a:avLst/>
+            </a:prstGeom>
+            <a:ln>
+              <a:prstDash val="solid"/>
+              <a:tailEnd type="arrow"/>
+            </a:ln>
+            <a:effectLst/>
+          </p:spPr>
+          <p:style>
+            <a:lnRef idx="2">
+              <a:schemeClr val="dk1"/>
+            </a:lnRef>
+            <a:fillRef idx="0">
+              <a:schemeClr val="dk1"/>
+            </a:fillRef>
+            <a:effectRef idx="1">
+              <a:schemeClr val="dk1"/>
+            </a:effectRef>
+            <a:fontRef idx="minor">
+              <a:schemeClr val="tx1"/>
+            </a:fontRef>
+          </p:style>
+        </p:cxnSp>
+        <p:sp>
+          <p:nvSpPr>
+            <p:cNvPr id="64" name="Rounded Rectangle 63"/>
+            <p:cNvSpPr/>
+            <p:nvPr/>
+          </p:nvSpPr>
+          <p:spPr>
+            <a:xfrm>
+              <a:off x="5817022" y="2820483"/>
+              <a:ext cx="2160000" cy="720000"/>
+            </a:xfrm>
+            <a:prstGeom prst="roundRect">
+              <a:avLst/>
+            </a:prstGeom>
+            <a:effectLst/>
+          </p:spPr>
+          <p:style>
+            <a:lnRef idx="2">
+              <a:schemeClr val="accent6">
+                <a:shade val="50000"/>
+              </a:schemeClr>
+            </a:lnRef>
+            <a:fillRef idx="1">
+              <a:schemeClr val="accent6"/>
+            </a:fillRef>
+            <a:effectRef idx="0">
+              <a:schemeClr val="accent6"/>
+            </a:effectRef>
+            <a:fontRef idx="minor">
+              <a:schemeClr val="lt1"/>
+            </a:fontRef>
+          </p:style>
+          <p:txBody>
+            <a:bodyPr rtlCol="0" anchor="ctr"/>
+            <a:lstStyle/>
+            <a:p>
+              <a:pPr algn="ctr"/>
+              <a:r>
+                <a:rPr lang="en-US" dirty="0" err="1" smtClean="0"/>
+                <a:t>FileParserManager</a:t>
+              </a:r>
+              <a:endParaRPr lang="en-US" dirty="0" smtClean="0"/>
+            </a:p>
+          </p:txBody>
+        </p:sp>
+        <p:sp>
+          <p:nvSpPr>
+            <p:cNvPr id="65" name="Rounded Rectangle 64"/>
+            <p:cNvSpPr/>
+            <p:nvPr/>
+          </p:nvSpPr>
+          <p:spPr>
+            <a:xfrm>
+              <a:off x="5817022" y="1716455"/>
+              <a:ext cx="2160000" cy="720000"/>
+            </a:xfrm>
+            <a:prstGeom prst="roundRect">
+              <a:avLst/>
+            </a:prstGeom>
+            <a:effectLst/>
+          </p:spPr>
+          <p:style>
+            <a:lnRef idx="2">
+              <a:schemeClr val="accent6">
+                <a:shade val="50000"/>
+              </a:schemeClr>
+            </a:lnRef>
+            <a:fillRef idx="1">
+              <a:schemeClr val="accent6"/>
+            </a:fillRef>
+            <a:effectRef idx="0">
+              <a:schemeClr val="accent6"/>
+            </a:effectRef>
+            <a:fontRef idx="minor">
+              <a:schemeClr val="lt1"/>
+            </a:fontRef>
+          </p:style>
+          <p:txBody>
+            <a:bodyPr rtlCol="0" anchor="ctr"/>
+            <a:lstStyle/>
+            <a:p>
+              <a:pPr algn="ctr"/>
+              <a:r>
+                <a:rPr lang="en-US" dirty="0" err="1" smtClean="0"/>
+                <a:t>FileParser</a:t>
+              </a:r>
+              <a:endParaRPr lang="en-US" dirty="0" smtClean="0"/>
+            </a:p>
+          </p:txBody>
+        </p:sp>
+        <p:sp>
+          <p:nvSpPr>
+            <p:cNvPr id="66" name="Rounded Rectangle 65"/>
+            <p:cNvSpPr/>
+            <p:nvPr/>
+          </p:nvSpPr>
+          <p:spPr>
+            <a:xfrm>
+              <a:off x="5817022" y="584931"/>
+              <a:ext cx="2160000" cy="720000"/>
+            </a:xfrm>
+            <a:prstGeom prst="roundRect">
+              <a:avLst/>
+            </a:prstGeom>
+            <a:effectLst/>
+          </p:spPr>
+          <p:style>
+            <a:lnRef idx="2">
+              <a:schemeClr val="accent6">
+                <a:shade val="50000"/>
+              </a:schemeClr>
+            </a:lnRef>
+            <a:fillRef idx="1">
+              <a:schemeClr val="accent6"/>
+            </a:fillRef>
+            <a:effectRef idx="0">
+              <a:schemeClr val="accent6"/>
+            </a:effectRef>
+            <a:fontRef idx="minor">
+              <a:schemeClr val="lt1"/>
+            </a:fontRef>
+          </p:style>
+          <p:txBody>
+            <a:bodyPr rtlCol="0" anchor="ctr"/>
+            <a:lstStyle/>
+            <a:p>
+              <a:pPr algn="ctr"/>
+              <a:r>
+                <a:rPr lang="en-US" dirty="0" err="1" smtClean="0"/>
+                <a:t>JsonFileParser</a:t>
+              </a:r>
+              <a:endParaRPr lang="en-US" dirty="0" smtClean="0"/>
+            </a:p>
+          </p:txBody>
+        </p:sp>
+        <p:cxnSp>
+          <p:nvCxnSpPr>
+            <p:cNvPr id="67" name="Straight Arrow Connector 66"/>
+            <p:cNvCxnSpPr>
+              <a:stCxn id="66" idx="2"/>
+            </p:cNvCxnSpPr>
+            <p:nvPr/>
+          </p:nvCxnSpPr>
+          <p:spPr>
+            <a:xfrm>
+              <a:off x="6897022" y="1304931"/>
+              <a:ext cx="0" cy="248201"/>
+            </a:xfrm>
+            <a:prstGeom prst="straightConnector1">
+              <a:avLst/>
+            </a:prstGeom>
+            <a:ln>
+              <a:prstDash val="solid"/>
+              <a:headEnd type="none"/>
+              <a:tailEnd type="none"/>
+            </a:ln>
+            <a:effectLst/>
+          </p:spPr>
+          <p:style>
+            <a:lnRef idx="2">
+              <a:schemeClr val="dk1"/>
+            </a:lnRef>
+            <a:fillRef idx="0">
+              <a:schemeClr val="dk1"/>
+            </a:fillRef>
+            <a:effectRef idx="1">
+              <a:schemeClr val="dk1"/>
+            </a:effectRef>
+            <a:fontRef idx="minor">
+              <a:schemeClr val="tx1"/>
+            </a:fontRef>
+          </p:style>
+        </p:cxnSp>
+        <p:sp>
+          <p:nvSpPr>
+            <p:cNvPr id="69" name="Isosceles Triangle 68"/>
+            <p:cNvSpPr/>
+            <p:nvPr/>
+          </p:nvSpPr>
+          <p:spPr>
+            <a:xfrm flipV="1">
+              <a:off x="6807022" y="1540098"/>
+              <a:ext cx="180000" cy="180000"/>
+            </a:xfrm>
+            <a:prstGeom prst="triangle">
+              <a:avLst/>
+            </a:prstGeom>
+          </p:spPr>
+          <p:style>
+            <a:lnRef idx="2">
+              <a:schemeClr val="dk1"/>
+            </a:lnRef>
+            <a:fillRef idx="1">
+              <a:schemeClr val="lt1"/>
+            </a:fillRef>
+            <a:effectRef idx="0">
+              <a:schemeClr val="dk1"/>
+            </a:effectRef>
+            <a:fontRef idx="minor">
+              <a:schemeClr val="dk1"/>
+            </a:fontRef>
+          </p:style>
+          <p:txBody>
+            <a:bodyPr rtlCol="0" anchor="ctr"/>
+            <a:lstStyle/>
+            <a:p>
+              <a:pPr algn="ctr"/>
+              <a:endParaRPr lang="en-US"/>
+            </a:p>
+          </p:txBody>
+        </p:sp>
+        <p:cxnSp>
+          <p:nvCxnSpPr>
+            <p:cNvPr id="70" name="Straight Arrow Connector 69"/>
+            <p:cNvCxnSpPr>
+              <a:stCxn id="65" idx="2"/>
+              <a:endCxn id="64" idx="0"/>
+            </p:cNvCxnSpPr>
+            <p:nvPr/>
+          </p:nvCxnSpPr>
+          <p:spPr>
+            <a:xfrm>
+              <a:off x="6897022" y="2436455"/>
+              <a:ext cx="0" cy="384028"/>
+            </a:xfrm>
+            <a:prstGeom prst="straightConnector1">
+              <a:avLst/>
+            </a:prstGeom>
+            <a:ln>
+              <a:prstDash val="solid"/>
+              <a:tailEnd type="diamond" w="lg" len="lg"/>
+            </a:ln>
+            <a:effectLst/>
+          </p:spPr>
+          <p:style>
+            <a:lnRef idx="2">
+              <a:schemeClr val="dk1"/>
+            </a:lnRef>
+            <a:fillRef idx="0">
+              <a:schemeClr val="dk1"/>
+            </a:fillRef>
+            <a:effectRef idx="1">
+              <a:schemeClr val="dk1"/>
+            </a:effectRef>
+            <a:fontRef idx="minor">
+              <a:schemeClr val="tx1"/>
+            </a:fontRef>
+          </p:style>
+        </p:cxnSp>
+        <p:cxnSp>
+          <p:nvCxnSpPr>
+            <p:cNvPr id="75" name="Straight Arrow Connector 74"/>
+            <p:cNvCxnSpPr>
+              <a:stCxn id="29" idx="3"/>
+              <a:endCxn id="64" idx="1"/>
+            </p:cNvCxnSpPr>
+            <p:nvPr/>
+          </p:nvCxnSpPr>
+          <p:spPr>
+            <a:xfrm>
+              <a:off x="5014042" y="3180483"/>
+              <a:ext cx="802980" cy="0"/>
+            </a:xfrm>
+            <a:prstGeom prst="straightConnector1">
+              <a:avLst/>
+            </a:prstGeom>
+            <a:ln>
+              <a:prstDash val="solid"/>
+              <a:tailEnd type="arrow"/>
+            </a:ln>
+            <a:effectLst/>
+          </p:spPr>
+          <p:style>
+            <a:lnRef idx="2">
+              <a:schemeClr val="dk1"/>
+            </a:lnRef>
+            <a:fillRef idx="0">
+              <a:schemeClr val="dk1"/>
+            </a:fillRef>
+            <a:effectRef idx="1">
+              <a:schemeClr val="dk1"/>
+            </a:effectRef>
+            <a:fontRef idx="minor">
+              <a:schemeClr val="tx1"/>
+            </a:fontRef>
+          </p:style>
+        </p:cxnSp>
+        <p:sp>
+          <p:nvSpPr>
+            <p:cNvPr id="82" name="Rounded Rectangle 81"/>
+            <p:cNvSpPr/>
+            <p:nvPr/>
+          </p:nvSpPr>
+          <p:spPr>
+            <a:xfrm>
+              <a:off x="3214042" y="1710049"/>
+              <a:ext cx="1800000" cy="720000"/>
+            </a:xfrm>
+            <a:prstGeom prst="roundRect">
+              <a:avLst/>
+            </a:prstGeom>
+            <a:effectLst/>
+          </p:spPr>
+          <p:style>
+            <a:lnRef idx="2">
+              <a:schemeClr val="accent6">
+                <a:shade val="50000"/>
+              </a:schemeClr>
+            </a:lnRef>
+            <a:fillRef idx="1">
+              <a:schemeClr val="accent6"/>
+            </a:fillRef>
+            <a:effectRef idx="0">
+              <a:schemeClr val="accent6"/>
+            </a:effectRef>
+            <a:fontRef idx="minor">
+              <a:schemeClr val="lt1"/>
+            </a:fontRef>
+          </p:style>
+          <p:txBody>
+            <a:bodyPr rtlCol="0" anchor="ctr"/>
+            <a:lstStyle/>
+            <a:p>
+              <a:pPr algn="ctr"/>
+              <a:r>
+                <a:rPr lang="en-US" dirty="0" err="1" smtClean="0"/>
+                <a:t>CommandParser</a:t>
+              </a:r>
+              <a:endParaRPr lang="en-US" dirty="0" smtClean="0"/>
+            </a:p>
+          </p:txBody>
+        </p:sp>
+        <p:sp>
+          <p:nvSpPr>
+            <p:cNvPr id="84" name="Rounded Rectangle 83"/>
+            <p:cNvSpPr/>
+            <p:nvPr/>
+          </p:nvSpPr>
+          <p:spPr>
+            <a:xfrm>
+              <a:off x="3214042" y="570972"/>
+              <a:ext cx="1800000" cy="720000"/>
+            </a:xfrm>
+            <a:prstGeom prst="roundRect">
+              <a:avLst/>
+            </a:prstGeom>
+            <a:effectLst/>
+          </p:spPr>
+          <p:style>
+            <a:lnRef idx="2">
+              <a:schemeClr val="accent6">
+                <a:shade val="50000"/>
+              </a:schemeClr>
+            </a:lnRef>
+            <a:fillRef idx="1">
+              <a:schemeClr val="accent6"/>
+            </a:fillRef>
+            <a:effectRef idx="0">
+              <a:schemeClr val="accent6"/>
+            </a:effectRef>
+            <a:fontRef idx="minor">
+              <a:schemeClr val="lt1"/>
+            </a:fontRef>
+          </p:style>
+          <p:txBody>
+            <a:bodyPr rtlCol="0" anchor="ctr"/>
+            <a:lstStyle/>
+            <a:p>
+              <a:pPr algn="ctr"/>
+              <a:r>
+                <a:rPr lang="en-US" dirty="0" smtClean="0"/>
+                <a:t>Command</a:t>
+              </a:r>
+              <a:endParaRPr lang="en-US" dirty="0" smtClean="0"/>
+            </a:p>
+          </p:txBody>
+        </p:sp>
+        <p:sp>
+          <p:nvSpPr>
+            <p:cNvPr id="85" name="Rounded Rectangle 84"/>
+            <p:cNvSpPr/>
+            <p:nvPr/>
+          </p:nvSpPr>
+          <p:spPr>
+            <a:xfrm>
+              <a:off x="371893" y="584931"/>
+              <a:ext cx="1800000" cy="720000"/>
+            </a:xfrm>
+            <a:prstGeom prst="roundRect">
+              <a:avLst/>
+            </a:prstGeom>
+            <a:effectLst/>
+          </p:spPr>
+          <p:style>
+            <a:lnRef idx="2">
+              <a:schemeClr val="accent6">
+                <a:shade val="50000"/>
+              </a:schemeClr>
+            </a:lnRef>
+            <a:fillRef idx="1">
+              <a:schemeClr val="accent6"/>
+            </a:fillRef>
+            <a:effectRef idx="0">
+              <a:schemeClr val="accent6"/>
+            </a:effectRef>
+            <a:fontRef idx="minor">
+              <a:schemeClr val="lt1"/>
+            </a:fontRef>
+          </p:style>
+          <p:txBody>
+            <a:bodyPr rtlCol="0" anchor="ctr"/>
+            <a:lstStyle/>
+            <a:p>
+              <a:pPr algn="ctr"/>
+              <a:r>
+                <a:rPr lang="en-US" dirty="0" err="1" smtClean="0"/>
+                <a:t>TopCommand</a:t>
+              </a:r>
+              <a:endParaRPr lang="en-US" dirty="0" smtClean="0"/>
+            </a:p>
+          </p:txBody>
+        </p:sp>
+        <p:sp>
+          <p:nvSpPr>
+            <p:cNvPr id="86" name="Rounded Rectangle 85"/>
+            <p:cNvSpPr/>
+            <p:nvPr/>
+          </p:nvSpPr>
+          <p:spPr>
+            <a:xfrm>
+              <a:off x="371893" y="1431290"/>
+              <a:ext cx="1800000" cy="720000"/>
+            </a:xfrm>
+            <a:prstGeom prst="roundRect">
+              <a:avLst/>
+            </a:prstGeom>
+            <a:effectLst/>
+          </p:spPr>
+          <p:style>
+            <a:lnRef idx="2">
+              <a:schemeClr val="accent6">
+                <a:shade val="50000"/>
+              </a:schemeClr>
+            </a:lnRef>
+            <a:fillRef idx="1">
+              <a:schemeClr val="accent6"/>
+            </a:fillRef>
+            <a:effectRef idx="0">
+              <a:schemeClr val="accent6"/>
+            </a:effectRef>
+            <a:fontRef idx="minor">
+              <a:schemeClr val="lt1"/>
+            </a:fontRef>
+          </p:style>
+          <p:txBody>
+            <a:bodyPr rtlCol="0" anchor="ctr"/>
+            <a:lstStyle/>
+            <a:p>
+              <a:pPr algn="ctr"/>
+              <a:r>
+                <a:rPr lang="en-US" dirty="0" err="1" smtClean="0"/>
+                <a:t>TrendCommand</a:t>
+              </a:r>
+              <a:endParaRPr lang="en-US" dirty="0" smtClean="0"/>
+            </a:p>
+          </p:txBody>
+        </p:sp>
+        <p:sp>
+          <p:nvSpPr>
+            <p:cNvPr id="73" name="TextBox 72"/>
+            <p:cNvSpPr txBox="1"/>
+            <p:nvPr/>
+          </p:nvSpPr>
+          <p:spPr>
+            <a:xfrm>
+              <a:off x="1727517" y="2245383"/>
+              <a:ext cx="344039" cy="369332"/>
+            </a:xfrm>
+            <a:prstGeom prst="rect">
+              <a:avLst/>
+            </a:prstGeom>
+            <a:noFill/>
+          </p:spPr>
+          <p:txBody>
+            <a:bodyPr wrap="none" rtlCol="0">
+              <a:spAutoFit/>
+            </a:bodyPr>
+            <a:lstStyle/>
+            <a:p>
+              <a:r>
+                <a:rPr lang="is-IS" dirty="0" smtClean="0"/>
+                <a:t>…</a:t>
+              </a:r>
+              <a:endParaRPr lang="en-US" dirty="0"/>
+            </a:p>
+          </p:txBody>
+        </p:sp>
+        <p:cxnSp>
+          <p:nvCxnSpPr>
+            <p:cNvPr id="89" name="Straight Arrow Connector 88"/>
+            <p:cNvCxnSpPr>
+              <a:stCxn id="85" idx="3"/>
+              <a:endCxn id="90" idx="3"/>
+            </p:cNvCxnSpPr>
+            <p:nvPr/>
+          </p:nvCxnSpPr>
+          <p:spPr>
+            <a:xfrm>
+              <a:off x="2171893" y="944931"/>
+              <a:ext cx="862149" cy="8289"/>
+            </a:xfrm>
+            <a:prstGeom prst="straightConnector1">
+              <a:avLst/>
+            </a:prstGeom>
+            <a:ln>
+              <a:prstDash val="solid"/>
+              <a:headEnd type="none"/>
+              <a:tailEnd type="none"/>
+            </a:ln>
+            <a:effectLst/>
+          </p:spPr>
+          <p:style>
+            <a:lnRef idx="2">
+              <a:schemeClr val="dk1"/>
+            </a:lnRef>
+            <a:fillRef idx="0">
+              <a:schemeClr val="dk1"/>
+            </a:fillRef>
+            <a:effectRef idx="1">
+              <a:schemeClr val="dk1"/>
+            </a:effectRef>
+            <a:fontRef idx="minor">
+              <a:schemeClr val="tx1"/>
+            </a:fontRef>
+          </p:style>
+        </p:cxnSp>
+        <p:sp>
+          <p:nvSpPr>
+            <p:cNvPr id="90" name="Isosceles Triangle 89"/>
+            <p:cNvSpPr/>
+            <p:nvPr/>
+          </p:nvSpPr>
+          <p:spPr>
+            <a:xfrm rot="16200000" flipV="1">
+              <a:off x="3034042" y="863220"/>
+              <a:ext cx="180000" cy="180000"/>
+            </a:xfrm>
+            <a:prstGeom prst="triangle">
+              <a:avLst/>
+            </a:prstGeom>
+          </p:spPr>
+          <p:style>
+            <a:lnRef idx="2">
+              <a:schemeClr val="dk1"/>
+            </a:lnRef>
+            <a:fillRef idx="1">
+              <a:schemeClr val="lt1"/>
+            </a:fillRef>
+            <a:effectRef idx="0">
+              <a:schemeClr val="dk1"/>
+            </a:effectRef>
+            <a:fontRef idx="minor">
+              <a:schemeClr val="dk1"/>
+            </a:fontRef>
+          </p:style>
+          <p:txBody>
+            <a:bodyPr rtlCol="0" anchor="ctr"/>
+            <a:lstStyle/>
+            <a:p>
+              <a:pPr algn="ctr"/>
+              <a:endParaRPr lang="en-US"/>
+            </a:p>
+          </p:txBody>
+        </p:sp>
+        <p:cxnSp>
+          <p:nvCxnSpPr>
+            <p:cNvPr id="92" name="Straight Arrow Connector 91"/>
+            <p:cNvCxnSpPr/>
+            <p:nvPr/>
+          </p:nvCxnSpPr>
+          <p:spPr>
+            <a:xfrm flipV="1">
+              <a:off x="2535830" y="930972"/>
+              <a:ext cx="0" cy="1512587"/>
+            </a:xfrm>
+            <a:prstGeom prst="straightConnector1">
+              <a:avLst/>
+            </a:prstGeom>
+            <a:ln>
+              <a:prstDash val="solid"/>
+              <a:headEnd type="none"/>
+              <a:tailEnd type="none"/>
+            </a:ln>
+            <a:effectLst/>
+          </p:spPr>
+          <p:style>
+            <a:lnRef idx="2">
+              <a:schemeClr val="dk1"/>
+            </a:lnRef>
+            <a:fillRef idx="0">
+              <a:schemeClr val="dk1"/>
+            </a:fillRef>
+            <a:effectRef idx="1">
+              <a:schemeClr val="dk1"/>
+            </a:effectRef>
+            <a:fontRef idx="minor">
+              <a:schemeClr val="tx1"/>
+            </a:fontRef>
+          </p:style>
+        </p:cxnSp>
+        <p:cxnSp>
+          <p:nvCxnSpPr>
+            <p:cNvPr id="97" name="Straight Arrow Connector 96"/>
+            <p:cNvCxnSpPr>
+              <a:stCxn id="86" idx="3"/>
+            </p:cNvCxnSpPr>
+            <p:nvPr/>
+          </p:nvCxnSpPr>
+          <p:spPr>
+            <a:xfrm>
+              <a:off x="2171893" y="1791290"/>
+              <a:ext cx="365964" cy="0"/>
+            </a:xfrm>
+            <a:prstGeom prst="straightConnector1">
+              <a:avLst/>
+            </a:prstGeom>
+            <a:ln>
+              <a:prstDash val="solid"/>
+              <a:headEnd type="none"/>
+              <a:tailEnd type="none"/>
+            </a:ln>
+            <a:effectLst/>
+          </p:spPr>
+          <p:style>
+            <a:lnRef idx="2">
+              <a:schemeClr val="dk1"/>
+            </a:lnRef>
+            <a:fillRef idx="0">
+              <a:schemeClr val="dk1"/>
+            </a:fillRef>
+            <a:effectRef idx="1">
+              <a:schemeClr val="dk1"/>
+            </a:effectRef>
+            <a:fontRef idx="minor">
+              <a:schemeClr val="tx1"/>
+            </a:fontRef>
+          </p:style>
+        </p:cxnSp>
+        <p:cxnSp>
+          <p:nvCxnSpPr>
+            <p:cNvPr id="99" name="Straight Arrow Connector 98"/>
+            <p:cNvCxnSpPr/>
+            <p:nvPr/>
+          </p:nvCxnSpPr>
+          <p:spPr>
+            <a:xfrm>
+              <a:off x="2169866" y="2430049"/>
+              <a:ext cx="365964" cy="0"/>
+            </a:xfrm>
+            <a:prstGeom prst="straightConnector1">
+              <a:avLst/>
+            </a:prstGeom>
+            <a:ln>
+              <a:prstDash val="solid"/>
+              <a:headEnd type="none"/>
+              <a:tailEnd type="none"/>
+            </a:ln>
+            <a:effectLst/>
+          </p:spPr>
+          <p:style>
+            <a:lnRef idx="2">
+              <a:schemeClr val="dk1"/>
+            </a:lnRef>
+            <a:fillRef idx="0">
+              <a:schemeClr val="dk1"/>
+            </a:fillRef>
+            <a:effectRef idx="1">
+              <a:schemeClr val="dk1"/>
+            </a:effectRef>
+            <a:fontRef idx="minor">
+              <a:schemeClr val="tx1"/>
+            </a:fontRef>
+          </p:style>
+        </p:cxnSp>
+        <p:cxnSp>
+          <p:nvCxnSpPr>
+            <p:cNvPr id="101" name="Straight Arrow Connector 100"/>
+            <p:cNvCxnSpPr>
+              <a:stCxn id="82" idx="2"/>
+              <a:endCxn id="29" idx="0"/>
+            </p:cNvCxnSpPr>
+            <p:nvPr/>
+          </p:nvCxnSpPr>
+          <p:spPr>
+            <a:xfrm>
+              <a:off x="4114042" y="2430049"/>
+              <a:ext cx="0" cy="390434"/>
+            </a:xfrm>
+            <a:prstGeom prst="straightConnector1">
+              <a:avLst/>
+            </a:prstGeom>
+            <a:ln>
+              <a:prstDash val="solid"/>
+              <a:headEnd type="arrow"/>
+              <a:tailEnd type="none"/>
+            </a:ln>
+            <a:effectLst/>
+          </p:spPr>
+          <p:style>
+            <a:lnRef idx="2">
+              <a:schemeClr val="dk1"/>
+            </a:lnRef>
+            <a:fillRef idx="0">
+              <a:schemeClr val="dk1"/>
+            </a:fillRef>
+            <a:effectRef idx="1">
+              <a:schemeClr val="dk1"/>
+            </a:effectRef>
+            <a:fontRef idx="minor">
+              <a:schemeClr val="tx1"/>
+            </a:fontRef>
+          </p:style>
+        </p:cxnSp>
+        <p:cxnSp>
+          <p:nvCxnSpPr>
+            <p:cNvPr id="106" name="Straight Arrow Connector 105"/>
+            <p:cNvCxnSpPr>
+              <a:stCxn id="84" idx="2"/>
+              <a:endCxn id="82" idx="0"/>
+            </p:cNvCxnSpPr>
+            <p:nvPr/>
+          </p:nvCxnSpPr>
+          <p:spPr>
+            <a:xfrm>
+              <a:off x="4114042" y="1290972"/>
+              <a:ext cx="0" cy="419077"/>
+            </a:xfrm>
+            <a:prstGeom prst="straightConnector1">
+              <a:avLst/>
+            </a:prstGeom>
+            <a:ln>
+              <a:prstDash val="solid"/>
+              <a:headEnd type="arrow"/>
+              <a:tailEnd type="none"/>
+            </a:ln>
+            <a:effectLst/>
+          </p:spPr>
+          <p:style>
+            <a:lnRef idx="2">
+              <a:schemeClr val="dk1"/>
+            </a:lnRef>
+            <a:fillRef idx="0">
+              <a:schemeClr val="dk1"/>
+            </a:fillRef>
+            <a:effectRef idx="1">
+              <a:schemeClr val="dk1"/>
+            </a:effectRef>
+            <a:fontRef idx="minor">
+              <a:schemeClr val="tx1"/>
+            </a:fontRef>
+          </p:style>
+        </p:cxnSp>
+        <p:sp>
+          <p:nvSpPr>
+            <p:cNvPr id="122" name="TextBox 121"/>
+            <p:cNvSpPr txBox="1"/>
+            <p:nvPr/>
+          </p:nvSpPr>
+          <p:spPr>
+            <a:xfrm>
+              <a:off x="203993" y="103953"/>
+              <a:ext cx="662674" cy="369332"/>
+            </a:xfrm>
+            <a:prstGeom prst="rect">
+              <a:avLst/>
+            </a:prstGeom>
+            <a:noFill/>
+          </p:spPr>
+          <p:txBody>
+            <a:bodyPr wrap="none" rtlCol="0">
+              <a:spAutoFit/>
+            </a:bodyPr>
+            <a:lstStyle/>
+            <a:p>
+              <a:r>
+                <a:rPr lang="en-US" dirty="0" smtClean="0"/>
+                <a:t>Logic</a:t>
+              </a:r>
+              <a:endParaRPr lang="en-US" dirty="0"/>
+            </a:p>
+          </p:txBody>
+        </p:sp>
+        <p:sp>
+          <p:nvSpPr>
+            <p:cNvPr id="123" name="TextBox 122"/>
+            <p:cNvSpPr txBox="1"/>
+            <p:nvPr/>
+          </p:nvSpPr>
+          <p:spPr>
+            <a:xfrm>
+              <a:off x="1123199" y="6512244"/>
+              <a:ext cx="648472" cy="369332"/>
+            </a:xfrm>
+            <a:prstGeom prst="rect">
+              <a:avLst/>
+            </a:prstGeom>
+            <a:noFill/>
+          </p:spPr>
+          <p:txBody>
+            <a:bodyPr wrap="none" rtlCol="0">
+              <a:spAutoFit/>
+            </a:bodyPr>
+            <a:lstStyle/>
+            <a:p>
+              <a:r>
+                <a:rPr lang="en-US" dirty="0" smtClean="0"/>
+                <a:t>View</a:t>
+              </a:r>
+              <a:endParaRPr lang="en-US" dirty="0"/>
+            </a:p>
+          </p:txBody>
+        </p:sp>
+        <p:sp>
+          <p:nvSpPr>
+            <p:cNvPr id="124" name="TextBox 123"/>
+            <p:cNvSpPr txBox="1"/>
+            <p:nvPr/>
+          </p:nvSpPr>
+          <p:spPr>
+            <a:xfrm>
+              <a:off x="8168070" y="6763867"/>
+              <a:ext cx="792855" cy="369332"/>
+            </a:xfrm>
+            <a:prstGeom prst="rect">
+              <a:avLst/>
+            </a:prstGeom>
+            <a:noFill/>
+          </p:spPr>
+          <p:txBody>
+            <a:bodyPr wrap="none" rtlCol="0">
+              <a:spAutoFit/>
+            </a:bodyPr>
+            <a:lstStyle/>
+            <a:p>
+              <a:r>
+                <a:rPr lang="en-US" dirty="0" smtClean="0"/>
+                <a:t>Model</a:t>
+              </a:r>
+              <a:endParaRPr lang="en-US" dirty="0"/>
+            </a:p>
+          </p:txBody>
+        </p:sp>
+        <p:sp>
+          <p:nvSpPr>
+            <p:cNvPr id="127" name="Rounded Rectangle 126"/>
+            <p:cNvSpPr/>
+            <p:nvPr/>
+          </p:nvSpPr>
+          <p:spPr>
+            <a:xfrm>
+              <a:off x="398812" y="2809503"/>
+              <a:ext cx="1800000" cy="720000"/>
+            </a:xfrm>
+            <a:prstGeom prst="roundRect">
+              <a:avLst/>
+            </a:prstGeom>
+            <a:effectLst/>
+          </p:spPr>
+          <p:style>
+            <a:lnRef idx="2">
+              <a:schemeClr val="accent6">
+                <a:shade val="50000"/>
+              </a:schemeClr>
+            </a:lnRef>
+            <a:fillRef idx="1">
+              <a:schemeClr val="accent6"/>
+            </a:fillRef>
+            <a:effectRef idx="0">
+              <a:schemeClr val="accent6"/>
+            </a:effectRef>
+            <a:fontRef idx="minor">
+              <a:schemeClr val="lt1"/>
+            </a:fontRef>
+          </p:style>
+          <p:txBody>
+            <a:bodyPr rtlCol="0" anchor="ctr"/>
+            <a:lstStyle/>
+            <a:p>
+              <a:pPr algn="ctr"/>
+              <a:r>
+                <a:rPr lang="en-US" dirty="0" smtClean="0"/>
+                <a:t>Utility</a:t>
+              </a:r>
+              <a:endParaRPr lang="en-US" dirty="0" smtClean="0"/>
+            </a:p>
+          </p:txBody>
+        </p:sp>
+      </p:grpSp>
+    </p:spTree>
+    <p:extLst>
+      <p:ext uri="{BB962C8B-B14F-4D97-AF65-F5344CB8AC3E}">
+        <p14:creationId xmlns:p14="http://schemas.microsoft.com/office/powerpoint/2010/main" val="1133209893"/>
       </p:ext>
     </p:extLst>
   </p:cSld>

</xml_diff>

<commit_message>
Change architecture diagram and wording
</commit_message>
<xml_diff>
--- a/docs/Diagrams.pptx
+++ b/docs/Diagrams.pptx
@@ -6692,50 +6692,6 @@
             </a:p>
           </p:txBody>
         </p:sp>
-        <p:sp>
-          <p:nvSpPr>
-            <p:cNvPr id="127" name="Rounded Rectangle 126"/>
-            <p:cNvSpPr/>
-            <p:nvPr/>
-          </p:nvSpPr>
-          <p:spPr>
-            <a:xfrm>
-              <a:off x="398812" y="2809503"/>
-              <a:ext cx="1800000" cy="720000"/>
-            </a:xfrm>
-            <a:prstGeom prst="roundRect">
-              <a:avLst/>
-            </a:prstGeom>
-            <a:effectLst/>
-          </p:spPr>
-          <p:style>
-            <a:lnRef idx="2">
-              <a:schemeClr val="accent6">
-                <a:shade val="50000"/>
-              </a:schemeClr>
-            </a:lnRef>
-            <a:fillRef idx="1">
-              <a:schemeClr val="accent6"/>
-            </a:fillRef>
-            <a:effectRef idx="0">
-              <a:schemeClr val="accent6"/>
-            </a:effectRef>
-            <a:fontRef idx="minor">
-              <a:schemeClr val="lt1"/>
-            </a:fontRef>
-          </p:style>
-          <p:txBody>
-            <a:bodyPr rtlCol="0" anchor="ctr"/>
-            <a:lstStyle/>
-            <a:p>
-              <a:pPr algn="ctr"/>
-              <a:r>
-                <a:rPr lang="en-US" dirty="0" smtClean="0"/>
-                <a:t>Utility</a:t>
-              </a:r>
-            </a:p>
-          </p:txBody>
-        </p:sp>
       </p:grpSp>
     </p:spTree>
     <p:extLst>
@@ -6775,10 +6731,10 @@
         </p:nvGrpSpPr>
         <p:grpSpPr>
           <a:xfrm>
-            <a:off x="-1173349" y="594995"/>
-            <a:ext cx="9976031" cy="5420940"/>
-            <a:chOff x="-1173349" y="594995"/>
-            <a:chExt cx="9976031" cy="5420940"/>
+            <a:off x="-1430071" y="594995"/>
+            <a:ext cx="11934194" cy="5420940"/>
+            <a:chOff x="-1186861" y="594995"/>
+            <a:chExt cx="11934194" cy="5420940"/>
           </a:xfrm>
         </p:grpSpPr>
         <p:pic>
@@ -6822,8 +6778,8 @@
           </p:nvCxnSpPr>
           <p:spPr>
             <a:xfrm flipV="1">
-              <a:off x="601496" y="2113279"/>
-              <a:ext cx="362222" cy="243870"/>
+              <a:off x="587984" y="2113279"/>
+              <a:ext cx="375734" cy="6211"/>
             </a:xfrm>
             <a:prstGeom prst="straightConnector1">
               <a:avLst/>
@@ -6907,7 +6863,7 @@
           </p:nvSpPr>
           <p:spPr>
             <a:xfrm>
-              <a:off x="-1173349" y="2033983"/>
+              <a:off x="-1186861" y="1796324"/>
               <a:ext cx="1774845" cy="646331"/>
             </a:xfrm>
             <a:prstGeom prst="rect">
@@ -6997,15 +6953,15 @@
           <p:nvCxnSpPr>
             <p:cNvPr id="24" name="Straight Arrow Connector 23"/>
             <p:cNvCxnSpPr>
-              <a:stCxn id="25" idx="3"/>
-              <a:endCxn id="20" idx="1"/>
+              <a:stCxn id="25" idx="1"/>
+              <a:endCxn id="20" idx="3"/>
             </p:cNvCxnSpPr>
             <p:nvPr/>
           </p:nvCxnSpPr>
           <p:spPr>
-            <a:xfrm>
-              <a:off x="621341" y="1543693"/>
-              <a:ext cx="342376" cy="239805"/>
+            <a:xfrm flipH="1">
+              <a:off x="8796074" y="1783498"/>
+              <a:ext cx="355061" cy="0"/>
             </a:xfrm>
             <a:prstGeom prst="straightConnector1">
               <a:avLst/>
@@ -7041,7 +6997,7 @@
           </p:nvSpPr>
           <p:spPr>
             <a:xfrm>
-              <a:off x="-974857" y="1220527"/>
+              <a:off x="9151135" y="1460332"/>
               <a:ext cx="1596198" cy="646331"/>
             </a:xfrm>
             <a:prstGeom prst="rect">
@@ -7058,7 +7014,6 @@
             </a:bodyPr>
             <a:lstStyle/>
             <a:p>
-              <a:pPr algn="r"/>
               <a:r>
                 <a:rPr lang="en-US" dirty="0" smtClean="0">
                   <a:solidFill>
@@ -7069,7 +7024,6 @@
               </a:r>
             </a:p>
             <a:p>
-              <a:pPr algn="r"/>
               <a:r>
                 <a:rPr lang="en-US" dirty="0" smtClean="0">
                   <a:solidFill>
@@ -7495,9 +7449,9 @@
         <p:grpSpPr>
           <a:xfrm>
             <a:off x="-974857" y="594995"/>
-            <a:ext cx="9770931" cy="5137985"/>
+            <a:ext cx="11313486" cy="5137985"/>
             <a:chOff x="-974857" y="594995"/>
-            <a:chExt cx="9770931" cy="5137985"/>
+            <a:chExt cx="11313486" cy="5137985"/>
           </a:xfrm>
         </p:grpSpPr>
         <p:pic>
@@ -8040,21 +7994,22 @@
           <p:nvCxnSpPr>
             <p:cNvPr id="24" name="Straight Arrow Connector 23"/>
             <p:cNvCxnSpPr>
-              <a:endCxn id="25" idx="2"/>
+              <a:stCxn id="26" idx="1"/>
+              <a:endCxn id="25" idx="3"/>
             </p:cNvCxnSpPr>
             <p:nvPr/>
           </p:nvCxnSpPr>
           <p:spPr>
-            <a:xfrm flipH="1" flipV="1">
-              <a:off x="6916454" y="3503587"/>
-              <a:ext cx="166656" cy="386089"/>
+            <a:xfrm flipH="1">
+              <a:off x="7367749" y="3122348"/>
+              <a:ext cx="1629460" cy="0"/>
             </a:xfrm>
             <a:prstGeom prst="straightConnector1">
               <a:avLst/>
             </a:prstGeom>
             <a:ln>
               <a:solidFill>
-                <a:schemeClr val="accent6"/>
+                <a:schemeClr val="accent4"/>
               </a:solidFill>
               <a:tailEnd type="arrow"/>
             </a:ln>
@@ -8092,7 +8047,7 @@
             <a:noFill/>
             <a:ln>
               <a:solidFill>
-                <a:schemeClr val="accent6"/>
+                <a:schemeClr val="accent4"/>
               </a:solidFill>
             </a:ln>
           </p:spPr>
@@ -8127,8 +8082,8 @@
           </p:nvSpPr>
           <p:spPr>
             <a:xfrm>
-              <a:off x="6354375" y="3889676"/>
-              <a:ext cx="2378588" cy="369332"/>
+              <a:off x="8997209" y="2799182"/>
+              <a:ext cx="1341420" cy="646331"/>
             </a:xfrm>
             <a:prstGeom prst="rect">
               <a:avLst/>
@@ -8144,10 +8099,36 @@
               <a:r>
                 <a:rPr lang="en-US" dirty="0" smtClean="0">
                   <a:solidFill>
-                    <a:srgbClr val="F79646"/>
+                    <a:schemeClr val="accent4"/>
                   </a:solidFill>
                 </a:rPr>
-                <a:t>Toggle the line visibility</a:t>
+                <a:t>Toggle </a:t>
+              </a:r>
+              <a:r>
+                <a:rPr lang="en-US" dirty="0" smtClean="0">
+                  <a:solidFill>
+                    <a:schemeClr val="accent4"/>
+                  </a:solidFill>
+                </a:rPr>
+                <a:t>the</a:t>
+              </a:r>
+            </a:p>
+            <a:p>
+              <a:r>
+                <a:rPr lang="en-US" dirty="0" smtClean="0">
+                  <a:solidFill>
+                    <a:schemeClr val="accent4"/>
+                  </a:solidFill>
+                </a:rPr>
+                <a:t>line </a:t>
+              </a:r>
+              <a:r>
+                <a:rPr lang="en-US" dirty="0" smtClean="0">
+                  <a:solidFill>
+                    <a:schemeClr val="accent4"/>
+                  </a:solidFill>
+                </a:rPr>
+                <a:t>visibility</a:t>
               </a:r>
             </a:p>
           </p:txBody>
@@ -8192,9 +8173,9 @@
         <p:grpSpPr>
           <a:xfrm>
             <a:off x="-974857" y="594995"/>
-            <a:ext cx="9770931" cy="4841802"/>
+            <a:ext cx="11860872" cy="4841802"/>
             <a:chOff x="-974857" y="594995"/>
-            <a:chExt cx="9770931" cy="4841802"/>
+            <a:chExt cx="11860872" cy="4841802"/>
           </a:xfrm>
         </p:grpSpPr>
         <p:pic>
@@ -8744,15 +8725,15 @@
           </p:nvCxnSpPr>
           <p:spPr>
             <a:xfrm flipH="1">
-              <a:off x="3883963" y="3308605"/>
-              <a:ext cx="867304" cy="0"/>
+              <a:off x="3883963" y="3307448"/>
+              <a:ext cx="4848999" cy="1157"/>
             </a:xfrm>
             <a:prstGeom prst="straightConnector1">
               <a:avLst/>
             </a:prstGeom>
             <a:ln>
               <a:solidFill>
-                <a:schemeClr val="accent6"/>
+                <a:srgbClr val="8064A2"/>
               </a:solidFill>
               <a:tailEnd type="arrow"/>
             </a:ln>
@@ -8790,7 +8771,7 @@
             <a:noFill/>
             <a:ln>
               <a:solidFill>
-                <a:schemeClr val="accent6"/>
+                <a:srgbClr val="8064A2"/>
               </a:solidFill>
             </a:ln>
           </p:spPr>
@@ -8813,7 +8794,11 @@
             <a:lstStyle/>
             <a:p>
               <a:pPr algn="ctr"/>
-              <a:endParaRPr lang="en-US"/>
+              <a:endParaRPr lang="en-US">
+                <a:solidFill>
+                  <a:srgbClr val="8064A2"/>
+                </a:solidFill>
+              </a:endParaRPr>
             </a:p>
           </p:txBody>
         </p:sp>
@@ -8825,7 +8810,7 @@
           </p:nvSpPr>
           <p:spPr>
             <a:xfrm>
-              <a:off x="4751267" y="2985439"/>
+              <a:off x="8732962" y="2984282"/>
               <a:ext cx="2153053" cy="646331"/>
             </a:xfrm>
             <a:prstGeom prst="rect">
@@ -8842,21 +8827,34 @@
               <a:r>
                 <a:rPr lang="en-US" dirty="0" smtClean="0">
                   <a:solidFill>
-                    <a:srgbClr val="F79646"/>
+                    <a:srgbClr val="8064A2"/>
                   </a:solidFill>
                 </a:rPr>
-                <a:t>Mouse over any slice</a:t>
+                <a:t>Mouse </a:t>
+              </a:r>
+              <a:r>
+                <a:rPr lang="en-US" dirty="0" smtClean="0">
+                  <a:solidFill>
+                    <a:srgbClr val="8064A2"/>
+                  </a:solidFill>
+                </a:rPr>
+                <a:t>over any slice</a:t>
               </a:r>
             </a:p>
             <a:p>
               <a:r>
                 <a:rPr lang="en-US" dirty="0" smtClean="0">
                   <a:solidFill>
-                    <a:srgbClr val="F79646"/>
+                    <a:srgbClr val="8064A2"/>
                   </a:solidFill>
                 </a:rPr>
                 <a:t>to view percentage</a:t>
               </a:r>
+              <a:endParaRPr lang="en-US" dirty="0" smtClean="0">
+                <a:solidFill>
+                  <a:srgbClr val="8064A2"/>
+                </a:solidFill>
+              </a:endParaRPr>
             </a:p>
           </p:txBody>
         </p:sp>

</xml_diff>

<commit_message>
Add TrendCommand Sequence diagram
</commit_message>
<xml_diff>
--- a/docs/Diagrams.pptx
+++ b/docs/Diagrams.pptx
@@ -8,11 +8,12 @@
     <p:sldId id="259" r:id="rId2"/>
     <p:sldId id="257" r:id="rId3"/>
     <p:sldId id="260" r:id="rId4"/>
-    <p:sldId id="261" r:id="rId5"/>
-    <p:sldId id="262" r:id="rId6"/>
-    <p:sldId id="263" r:id="rId7"/>
-    <p:sldId id="265" r:id="rId8"/>
-    <p:sldId id="264" r:id="rId9"/>
+    <p:sldId id="266" r:id="rId5"/>
+    <p:sldId id="261" r:id="rId6"/>
+    <p:sldId id="262" r:id="rId7"/>
+    <p:sldId id="263" r:id="rId8"/>
+    <p:sldId id="265" r:id="rId9"/>
+    <p:sldId id="264" r:id="rId10"/>
   </p:sldIdLst>
   <p:sldSz cx="9144000" cy="6858000" type="screen4x3"/>
   <p:notesSz cx="6858000" cy="9144000"/>
@@ -6726,6 +6727,1655 @@
       </p:grpSpPr>
       <p:grpSp>
         <p:nvGrpSpPr>
+          <p:cNvPr id="3" name="Group 2"/>
+          <p:cNvGrpSpPr/>
+          <p:nvPr/>
+        </p:nvGrpSpPr>
+        <p:grpSpPr>
+          <a:xfrm>
+            <a:off x="6299046" y="0"/>
+            <a:ext cx="324000" cy="278330"/>
+            <a:chOff x="4519050" y="2418417"/>
+            <a:chExt cx="324000" cy="278330"/>
+          </a:xfrm>
+        </p:grpSpPr>
+        <p:cxnSp>
+          <p:nvCxnSpPr>
+            <p:cNvPr id="43" name="Straight Arrow Connector 42"/>
+            <p:cNvCxnSpPr/>
+            <p:nvPr/>
+          </p:nvCxnSpPr>
+          <p:spPr>
+            <a:xfrm>
+              <a:off x="4519050" y="2692485"/>
+              <a:ext cx="324000" cy="0"/>
+            </a:xfrm>
+            <a:prstGeom prst="straightConnector1">
+              <a:avLst/>
+            </a:prstGeom>
+            <a:ln>
+              <a:prstDash val="solid"/>
+              <a:headEnd type="arrow"/>
+              <a:tailEnd type="none"/>
+            </a:ln>
+            <a:effectLst/>
+          </p:spPr>
+          <p:style>
+            <a:lnRef idx="2">
+              <a:schemeClr val="dk1"/>
+            </a:lnRef>
+            <a:fillRef idx="0">
+              <a:schemeClr val="dk1"/>
+            </a:fillRef>
+            <a:effectRef idx="1">
+              <a:schemeClr val="dk1"/>
+            </a:effectRef>
+            <a:fontRef idx="minor">
+              <a:schemeClr val="tx1"/>
+            </a:fontRef>
+          </p:style>
+        </p:cxnSp>
+        <p:cxnSp>
+          <p:nvCxnSpPr>
+            <p:cNvPr id="44" name="Straight Arrow Connector 43"/>
+            <p:cNvCxnSpPr/>
+            <p:nvPr/>
+          </p:nvCxnSpPr>
+          <p:spPr>
+            <a:xfrm>
+              <a:off x="4538324" y="2422230"/>
+              <a:ext cx="304726" cy="0"/>
+            </a:xfrm>
+            <a:prstGeom prst="straightConnector1">
+              <a:avLst/>
+            </a:prstGeom>
+            <a:ln>
+              <a:prstDash val="solid"/>
+              <a:headEnd type="none"/>
+              <a:tailEnd type="none"/>
+            </a:ln>
+            <a:effectLst/>
+          </p:spPr>
+          <p:style>
+            <a:lnRef idx="2">
+              <a:schemeClr val="dk1"/>
+            </a:lnRef>
+            <a:fillRef idx="0">
+              <a:schemeClr val="dk1"/>
+            </a:fillRef>
+            <a:effectRef idx="1">
+              <a:schemeClr val="dk1"/>
+            </a:effectRef>
+            <a:fontRef idx="minor">
+              <a:schemeClr val="tx1"/>
+            </a:fontRef>
+          </p:style>
+        </p:cxnSp>
+        <p:cxnSp>
+          <p:nvCxnSpPr>
+            <p:cNvPr id="46" name="Straight Arrow Connector 45"/>
+            <p:cNvCxnSpPr/>
+            <p:nvPr/>
+          </p:nvCxnSpPr>
+          <p:spPr>
+            <a:xfrm>
+              <a:off x="4830264" y="2418417"/>
+              <a:ext cx="0" cy="278330"/>
+            </a:xfrm>
+            <a:prstGeom prst="straightConnector1">
+              <a:avLst/>
+            </a:prstGeom>
+            <a:ln>
+              <a:prstDash val="solid"/>
+              <a:headEnd type="none"/>
+              <a:tailEnd type="none"/>
+            </a:ln>
+            <a:effectLst/>
+          </p:spPr>
+          <p:style>
+            <a:lnRef idx="2">
+              <a:schemeClr val="dk1"/>
+            </a:lnRef>
+            <a:fillRef idx="0">
+              <a:schemeClr val="dk1"/>
+            </a:fillRef>
+            <a:effectRef idx="1">
+              <a:schemeClr val="dk1"/>
+            </a:effectRef>
+            <a:fontRef idx="minor">
+              <a:schemeClr val="tx1"/>
+            </a:fontRef>
+          </p:style>
+        </p:cxnSp>
+      </p:grpSp>
+      <p:grpSp>
+        <p:nvGrpSpPr>
+          <p:cNvPr id="103" name="Group 102"/>
+          <p:cNvGrpSpPr/>
+          <p:nvPr/>
+        </p:nvGrpSpPr>
+        <p:grpSpPr>
+          <a:xfrm>
+            <a:off x="132254" y="710227"/>
+            <a:ext cx="10631746" cy="4985321"/>
+            <a:chOff x="132254" y="710227"/>
+            <a:chExt cx="10631746" cy="4985321"/>
+          </a:xfrm>
+        </p:grpSpPr>
+        <p:cxnSp>
+          <p:nvCxnSpPr>
+            <p:cNvPr id="6" name="Straight Connector 5"/>
+            <p:cNvCxnSpPr/>
+            <p:nvPr/>
+          </p:nvCxnSpPr>
+          <p:spPr>
+            <a:xfrm>
+              <a:off x="942254" y="1103053"/>
+              <a:ext cx="0" cy="4592495"/>
+            </a:xfrm>
+            <a:prstGeom prst="line">
+              <a:avLst/>
+            </a:prstGeom>
+            <a:ln>
+              <a:prstDash val="dash"/>
+            </a:ln>
+            <a:effectLst/>
+          </p:spPr>
+          <p:style>
+            <a:lnRef idx="2">
+              <a:schemeClr val="dk1"/>
+            </a:lnRef>
+            <a:fillRef idx="0">
+              <a:schemeClr val="dk1"/>
+            </a:fillRef>
+            <a:effectRef idx="1">
+              <a:schemeClr val="dk1"/>
+            </a:effectRef>
+            <a:fontRef idx="minor">
+              <a:schemeClr val="tx1"/>
+            </a:fontRef>
+          </p:style>
+        </p:cxnSp>
+        <p:cxnSp>
+          <p:nvCxnSpPr>
+            <p:cNvPr id="11" name="Straight Connector 10"/>
+            <p:cNvCxnSpPr/>
+            <p:nvPr/>
+          </p:nvCxnSpPr>
+          <p:spPr>
+            <a:xfrm>
+              <a:off x="2709086" y="1108826"/>
+              <a:ext cx="0" cy="2269317"/>
+            </a:xfrm>
+            <a:prstGeom prst="line">
+              <a:avLst/>
+            </a:prstGeom>
+            <a:ln>
+              <a:prstDash val="dash"/>
+            </a:ln>
+            <a:effectLst/>
+          </p:spPr>
+          <p:style>
+            <a:lnRef idx="2">
+              <a:schemeClr val="dk1"/>
+            </a:lnRef>
+            <a:fillRef idx="0">
+              <a:schemeClr val="dk1"/>
+            </a:fillRef>
+            <a:effectRef idx="1">
+              <a:schemeClr val="dk1"/>
+            </a:effectRef>
+            <a:fontRef idx="minor">
+              <a:schemeClr val="tx1"/>
+            </a:fontRef>
+          </p:style>
+        </p:cxnSp>
+        <p:sp>
+          <p:nvSpPr>
+            <p:cNvPr id="17" name="Rectangle 16"/>
+            <p:cNvSpPr/>
+            <p:nvPr/>
+          </p:nvSpPr>
+          <p:spPr>
+            <a:xfrm>
+              <a:off x="755710" y="1380847"/>
+              <a:ext cx="378325" cy="4110256"/>
+            </a:xfrm>
+            <a:prstGeom prst="rect">
+              <a:avLst/>
+            </a:prstGeom>
+          </p:spPr>
+          <p:style>
+            <a:lnRef idx="2">
+              <a:schemeClr val="dk1"/>
+            </a:lnRef>
+            <a:fillRef idx="1">
+              <a:schemeClr val="lt1"/>
+            </a:fillRef>
+            <a:effectRef idx="0">
+              <a:schemeClr val="dk1"/>
+            </a:effectRef>
+            <a:fontRef idx="minor">
+              <a:schemeClr val="dk1"/>
+            </a:fontRef>
+          </p:style>
+          <p:txBody>
+            <a:bodyPr rtlCol="0" anchor="ctr"/>
+            <a:lstStyle/>
+            <a:p>
+              <a:pPr algn="ctr"/>
+              <a:endParaRPr lang="en-US"/>
+            </a:p>
+          </p:txBody>
+        </p:sp>
+        <p:cxnSp>
+          <p:nvCxnSpPr>
+            <p:cNvPr id="50" name="Straight Arrow Connector 49"/>
+            <p:cNvCxnSpPr/>
+            <p:nvPr/>
+          </p:nvCxnSpPr>
+          <p:spPr>
+            <a:xfrm flipV="1">
+              <a:off x="1132561" y="3639448"/>
+              <a:ext cx="4977322" cy="1"/>
+            </a:xfrm>
+            <a:prstGeom prst="straightConnector1">
+              <a:avLst/>
+            </a:prstGeom>
+            <a:ln>
+              <a:prstDash val="solid"/>
+              <a:tailEnd type="arrow"/>
+            </a:ln>
+            <a:effectLst/>
+          </p:spPr>
+          <p:style>
+            <a:lnRef idx="2">
+              <a:schemeClr val="dk1"/>
+            </a:lnRef>
+            <a:fillRef idx="0">
+              <a:schemeClr val="dk1"/>
+            </a:fillRef>
+            <a:effectRef idx="1">
+              <a:schemeClr val="dk1"/>
+            </a:effectRef>
+            <a:fontRef idx="minor">
+              <a:schemeClr val="tx1"/>
+            </a:fontRef>
+          </p:style>
+        </p:cxnSp>
+        <p:cxnSp>
+          <p:nvCxnSpPr>
+            <p:cNvPr id="57" name="Straight Arrow Connector 56"/>
+            <p:cNvCxnSpPr/>
+            <p:nvPr/>
+          </p:nvCxnSpPr>
+          <p:spPr>
+            <a:xfrm>
+              <a:off x="1134035" y="2983615"/>
+              <a:ext cx="1387362" cy="0"/>
+            </a:xfrm>
+            <a:prstGeom prst="straightConnector1">
+              <a:avLst/>
+            </a:prstGeom>
+            <a:ln>
+              <a:prstDash val="dash"/>
+              <a:headEnd type="arrow"/>
+              <a:tailEnd type="none"/>
+            </a:ln>
+            <a:effectLst/>
+          </p:spPr>
+          <p:style>
+            <a:lnRef idx="2">
+              <a:schemeClr val="dk1"/>
+            </a:lnRef>
+            <a:fillRef idx="0">
+              <a:schemeClr val="dk1"/>
+            </a:fillRef>
+            <a:effectRef idx="1">
+              <a:schemeClr val="dk1"/>
+            </a:effectRef>
+            <a:fontRef idx="minor">
+              <a:schemeClr val="tx1"/>
+            </a:fontRef>
+          </p:style>
+        </p:cxnSp>
+        <p:sp>
+          <p:nvSpPr>
+            <p:cNvPr id="79" name="Rectangle 78"/>
+            <p:cNvSpPr/>
+            <p:nvPr/>
+          </p:nvSpPr>
+          <p:spPr>
+            <a:xfrm>
+              <a:off x="132254" y="718845"/>
+              <a:ext cx="1620000" cy="384208"/>
+            </a:xfrm>
+            <a:prstGeom prst="rect">
+              <a:avLst/>
+            </a:prstGeom>
+            <a:solidFill>
+              <a:srgbClr val="FFFFFF"/>
+            </a:solidFill>
+          </p:spPr>
+          <p:style>
+            <a:lnRef idx="2">
+              <a:schemeClr val="dk1"/>
+            </a:lnRef>
+            <a:fillRef idx="1">
+              <a:schemeClr val="lt1"/>
+            </a:fillRef>
+            <a:effectRef idx="0">
+              <a:schemeClr val="dk1"/>
+            </a:effectRef>
+            <a:fontRef idx="minor">
+              <a:schemeClr val="dk1"/>
+            </a:fontRef>
+          </p:style>
+          <p:txBody>
+            <a:bodyPr rtlCol="0" anchor="ctr"/>
+            <a:lstStyle/>
+            <a:p>
+              <a:pPr algn="ctr"/>
+              <a:r>
+                <a:rPr lang="en-US" sz="1200" dirty="0" smtClean="0"/>
+                <a:t>Controller</a:t>
+              </a:r>
+              <a:endParaRPr lang="en-US" sz="1200" dirty="0"/>
+            </a:p>
+          </p:txBody>
+        </p:sp>
+        <p:sp>
+          <p:nvSpPr>
+            <p:cNvPr id="80" name="Rectangle 79"/>
+            <p:cNvSpPr/>
+            <p:nvPr/>
+          </p:nvSpPr>
+          <p:spPr>
+            <a:xfrm>
+              <a:off x="1899086" y="724618"/>
+              <a:ext cx="1620000" cy="384208"/>
+            </a:xfrm>
+            <a:prstGeom prst="rect">
+              <a:avLst/>
+            </a:prstGeom>
+            <a:solidFill>
+              <a:srgbClr val="FFFFFF"/>
+            </a:solidFill>
+          </p:spPr>
+          <p:style>
+            <a:lnRef idx="2">
+              <a:schemeClr val="dk1"/>
+            </a:lnRef>
+            <a:fillRef idx="1">
+              <a:schemeClr val="lt1"/>
+            </a:fillRef>
+            <a:effectRef idx="0">
+              <a:schemeClr val="dk1"/>
+            </a:effectRef>
+            <a:fontRef idx="minor">
+              <a:schemeClr val="dk1"/>
+            </a:fontRef>
+          </p:style>
+          <p:txBody>
+            <a:bodyPr rtlCol="0" anchor="ctr"/>
+            <a:lstStyle/>
+            <a:p>
+              <a:pPr algn="ctr"/>
+              <a:r>
+                <a:rPr lang="en-US" sz="1200" dirty="0" err="1" smtClean="0"/>
+                <a:t>CommandParser</a:t>
+              </a:r>
+              <a:endParaRPr lang="en-US" sz="1200" dirty="0"/>
+            </a:p>
+          </p:txBody>
+        </p:sp>
+        <p:cxnSp>
+          <p:nvCxnSpPr>
+            <p:cNvPr id="31" name="Straight Connector 30"/>
+            <p:cNvCxnSpPr>
+              <a:stCxn id="32" idx="2"/>
+            </p:cNvCxnSpPr>
+            <p:nvPr/>
+          </p:nvCxnSpPr>
+          <p:spPr>
+            <a:xfrm>
+              <a:off x="4531321" y="1865356"/>
+              <a:ext cx="0" cy="1512787"/>
+            </a:xfrm>
+            <a:prstGeom prst="line">
+              <a:avLst/>
+            </a:prstGeom>
+            <a:ln>
+              <a:prstDash val="dash"/>
+            </a:ln>
+            <a:effectLst/>
+          </p:spPr>
+          <p:style>
+            <a:lnRef idx="2">
+              <a:schemeClr val="dk1"/>
+            </a:lnRef>
+            <a:fillRef idx="0">
+              <a:schemeClr val="dk1"/>
+            </a:fillRef>
+            <a:effectRef idx="1">
+              <a:schemeClr val="dk1"/>
+            </a:effectRef>
+            <a:fontRef idx="minor">
+              <a:schemeClr val="tx1"/>
+            </a:fontRef>
+          </p:style>
+        </p:cxnSp>
+        <p:sp>
+          <p:nvSpPr>
+            <p:cNvPr id="32" name="Rectangle 31"/>
+            <p:cNvSpPr/>
+            <p:nvPr/>
+          </p:nvSpPr>
+          <p:spPr>
+            <a:xfrm>
+              <a:off x="3721321" y="1481148"/>
+              <a:ext cx="1620000" cy="384208"/>
+            </a:xfrm>
+            <a:prstGeom prst="rect">
+              <a:avLst/>
+            </a:prstGeom>
+            <a:solidFill>
+              <a:srgbClr val="FFFFFF"/>
+            </a:solidFill>
+          </p:spPr>
+          <p:style>
+            <a:lnRef idx="2">
+              <a:schemeClr val="dk1"/>
+            </a:lnRef>
+            <a:fillRef idx="1">
+              <a:schemeClr val="lt1"/>
+            </a:fillRef>
+            <a:effectRef idx="0">
+              <a:schemeClr val="dk1"/>
+            </a:effectRef>
+            <a:fontRef idx="minor">
+              <a:schemeClr val="dk1"/>
+            </a:fontRef>
+          </p:style>
+          <p:txBody>
+            <a:bodyPr rtlCol="0" anchor="ctr"/>
+            <a:lstStyle/>
+            <a:p>
+              <a:pPr algn="ctr"/>
+              <a:r>
+                <a:rPr lang="en-US" sz="1200" dirty="0" err="1" smtClean="0"/>
+                <a:t>Trend</a:t>
+              </a:r>
+              <a:r>
+                <a:rPr lang="en-US" sz="1200" dirty="0" err="1" smtClean="0"/>
+                <a:t>CommandParser</a:t>
+              </a:r>
+              <a:endParaRPr lang="en-US" sz="1200" dirty="0"/>
+            </a:p>
+          </p:txBody>
+        </p:sp>
+        <p:cxnSp>
+          <p:nvCxnSpPr>
+            <p:cNvPr id="36" name="Straight Arrow Connector 35"/>
+            <p:cNvCxnSpPr/>
+            <p:nvPr/>
+          </p:nvCxnSpPr>
+          <p:spPr>
+            <a:xfrm flipV="1">
+              <a:off x="1132561" y="1494677"/>
+              <a:ext cx="1387362" cy="1"/>
+            </a:xfrm>
+            <a:prstGeom prst="straightConnector1">
+              <a:avLst/>
+            </a:prstGeom>
+            <a:ln>
+              <a:prstDash val="solid"/>
+              <a:tailEnd type="arrow"/>
+            </a:ln>
+            <a:effectLst/>
+          </p:spPr>
+          <p:style>
+            <a:lnRef idx="2">
+              <a:schemeClr val="dk1"/>
+            </a:lnRef>
+            <a:fillRef idx="0">
+              <a:schemeClr val="dk1"/>
+            </a:fillRef>
+            <a:effectRef idx="1">
+              <a:schemeClr val="dk1"/>
+            </a:effectRef>
+            <a:fontRef idx="minor">
+              <a:schemeClr val="tx1"/>
+            </a:fontRef>
+          </p:style>
+        </p:cxnSp>
+        <p:sp>
+          <p:nvSpPr>
+            <p:cNvPr id="37" name="Rectangle 36"/>
+            <p:cNvSpPr/>
+            <p:nvPr/>
+          </p:nvSpPr>
+          <p:spPr>
+            <a:xfrm>
+              <a:off x="2519923" y="1431361"/>
+              <a:ext cx="378325" cy="1552254"/>
+            </a:xfrm>
+            <a:prstGeom prst="rect">
+              <a:avLst/>
+            </a:prstGeom>
+          </p:spPr>
+          <p:style>
+            <a:lnRef idx="2">
+              <a:schemeClr val="dk1"/>
+            </a:lnRef>
+            <a:fillRef idx="1">
+              <a:schemeClr val="lt1"/>
+            </a:fillRef>
+            <a:effectRef idx="0">
+              <a:schemeClr val="dk1"/>
+            </a:effectRef>
+            <a:fontRef idx="minor">
+              <a:schemeClr val="dk1"/>
+            </a:fontRef>
+          </p:style>
+          <p:txBody>
+            <a:bodyPr rtlCol="0" anchor="ctr"/>
+            <a:lstStyle/>
+            <a:p>
+              <a:pPr algn="ctr"/>
+              <a:endParaRPr lang="en-US"/>
+            </a:p>
+          </p:txBody>
+        </p:sp>
+        <p:cxnSp>
+          <p:nvCxnSpPr>
+            <p:cNvPr id="47" name="Straight Connector 46"/>
+            <p:cNvCxnSpPr>
+              <a:stCxn id="48" idx="2"/>
+            </p:cNvCxnSpPr>
+            <p:nvPr/>
+          </p:nvCxnSpPr>
+          <p:spPr>
+            <a:xfrm>
+              <a:off x="6299046" y="2483994"/>
+              <a:ext cx="19274" cy="3211554"/>
+            </a:xfrm>
+            <a:prstGeom prst="line">
+              <a:avLst/>
+            </a:prstGeom>
+            <a:ln>
+              <a:prstDash val="dash"/>
+            </a:ln>
+            <a:effectLst/>
+          </p:spPr>
+          <p:style>
+            <a:lnRef idx="2">
+              <a:schemeClr val="dk1"/>
+            </a:lnRef>
+            <a:fillRef idx="0">
+              <a:schemeClr val="dk1"/>
+            </a:fillRef>
+            <a:effectRef idx="1">
+              <a:schemeClr val="dk1"/>
+            </a:effectRef>
+            <a:fontRef idx="minor">
+              <a:schemeClr val="tx1"/>
+            </a:fontRef>
+          </p:style>
+        </p:cxnSp>
+        <p:sp>
+          <p:nvSpPr>
+            <p:cNvPr id="48" name="Rectangle 47"/>
+            <p:cNvSpPr/>
+            <p:nvPr/>
+          </p:nvSpPr>
+          <p:spPr>
+            <a:xfrm>
+              <a:off x="5489046" y="2099786"/>
+              <a:ext cx="1620000" cy="384208"/>
+            </a:xfrm>
+            <a:prstGeom prst="rect">
+              <a:avLst/>
+            </a:prstGeom>
+            <a:solidFill>
+              <a:srgbClr val="FFFFFF"/>
+            </a:solidFill>
+          </p:spPr>
+          <p:style>
+            <a:lnRef idx="2">
+              <a:schemeClr val="dk1"/>
+            </a:lnRef>
+            <a:fillRef idx="1">
+              <a:schemeClr val="lt1"/>
+            </a:fillRef>
+            <a:effectRef idx="0">
+              <a:schemeClr val="dk1"/>
+            </a:effectRef>
+            <a:fontRef idx="minor">
+              <a:schemeClr val="dk1"/>
+            </a:fontRef>
+          </p:style>
+          <p:txBody>
+            <a:bodyPr rtlCol="0" anchor="ctr"/>
+            <a:lstStyle/>
+            <a:p>
+              <a:pPr algn="ctr"/>
+              <a:r>
+                <a:rPr lang="en-US" sz="1200" dirty="0" err="1" smtClean="0"/>
+                <a:t>Trend</a:t>
+              </a:r>
+              <a:r>
+                <a:rPr lang="en-US" sz="1200" dirty="0" err="1" smtClean="0"/>
+                <a:t>Command</a:t>
+              </a:r>
+              <a:endParaRPr lang="en-US" sz="1200" dirty="0"/>
+            </a:p>
+          </p:txBody>
+        </p:sp>
+        <p:sp>
+          <p:nvSpPr>
+            <p:cNvPr id="51" name="Rectangle 50"/>
+            <p:cNvSpPr/>
+            <p:nvPr/>
+          </p:nvSpPr>
+          <p:spPr>
+            <a:xfrm>
+              <a:off x="4327718" y="2207489"/>
+              <a:ext cx="378325" cy="612648"/>
+            </a:xfrm>
+            <a:prstGeom prst="rect">
+              <a:avLst/>
+            </a:prstGeom>
+          </p:spPr>
+          <p:style>
+            <a:lnRef idx="2">
+              <a:schemeClr val="dk1"/>
+            </a:lnRef>
+            <a:fillRef idx="1">
+              <a:schemeClr val="lt1"/>
+            </a:fillRef>
+            <a:effectRef idx="0">
+              <a:schemeClr val="dk1"/>
+            </a:effectRef>
+            <a:fontRef idx="minor">
+              <a:schemeClr val="dk1"/>
+            </a:fontRef>
+          </p:style>
+          <p:txBody>
+            <a:bodyPr rtlCol="0" anchor="ctr"/>
+            <a:lstStyle/>
+            <a:p>
+              <a:pPr algn="ctr"/>
+              <a:endParaRPr lang="en-US"/>
+            </a:p>
+          </p:txBody>
+        </p:sp>
+        <p:cxnSp>
+          <p:nvCxnSpPr>
+            <p:cNvPr id="52" name="Straight Connector 51"/>
+            <p:cNvCxnSpPr/>
+            <p:nvPr/>
+          </p:nvCxnSpPr>
+          <p:spPr>
+            <a:xfrm>
+              <a:off x="8070430" y="1103053"/>
+              <a:ext cx="0" cy="4592495"/>
+            </a:xfrm>
+            <a:prstGeom prst="line">
+              <a:avLst/>
+            </a:prstGeom>
+            <a:ln>
+              <a:prstDash val="dash"/>
+            </a:ln>
+            <a:effectLst/>
+          </p:spPr>
+          <p:style>
+            <a:lnRef idx="2">
+              <a:schemeClr val="dk1"/>
+            </a:lnRef>
+            <a:fillRef idx="0">
+              <a:schemeClr val="dk1"/>
+            </a:fillRef>
+            <a:effectRef idx="1">
+              <a:schemeClr val="dk1"/>
+            </a:effectRef>
+            <a:fontRef idx="minor">
+              <a:schemeClr val="tx1"/>
+            </a:fontRef>
+          </p:style>
+        </p:cxnSp>
+        <p:sp>
+          <p:nvSpPr>
+            <p:cNvPr id="58" name="Rectangle 57"/>
+            <p:cNvSpPr/>
+            <p:nvPr/>
+          </p:nvSpPr>
+          <p:spPr>
+            <a:xfrm>
+              <a:off x="7260430" y="718845"/>
+              <a:ext cx="1620000" cy="384208"/>
+            </a:xfrm>
+            <a:prstGeom prst="rect">
+              <a:avLst/>
+            </a:prstGeom>
+            <a:solidFill>
+              <a:srgbClr val="FFFFFF"/>
+            </a:solidFill>
+          </p:spPr>
+          <p:style>
+            <a:lnRef idx="2">
+              <a:schemeClr val="dk1"/>
+            </a:lnRef>
+            <a:fillRef idx="1">
+              <a:schemeClr val="lt1"/>
+            </a:fillRef>
+            <a:effectRef idx="0">
+              <a:schemeClr val="dk1"/>
+            </a:effectRef>
+            <a:fontRef idx="minor">
+              <a:schemeClr val="dk1"/>
+            </a:fontRef>
+          </p:style>
+          <p:txBody>
+            <a:bodyPr rtlCol="0" anchor="ctr"/>
+            <a:lstStyle/>
+            <a:p>
+              <a:pPr algn="ctr"/>
+              <a:r>
+                <a:rPr lang="en-US" sz="1200" dirty="0" smtClean="0"/>
+                <a:t>Model</a:t>
+              </a:r>
+              <a:endParaRPr lang="en-US" sz="1200" dirty="0"/>
+            </a:p>
+          </p:txBody>
+        </p:sp>
+        <p:cxnSp>
+          <p:nvCxnSpPr>
+            <p:cNvPr id="61" name="Straight Arrow Connector 60"/>
+            <p:cNvCxnSpPr>
+              <a:endCxn id="32" idx="1"/>
+            </p:cNvCxnSpPr>
+            <p:nvPr/>
+          </p:nvCxnSpPr>
+          <p:spPr>
+            <a:xfrm>
+              <a:off x="2898248" y="1673252"/>
+              <a:ext cx="823073" cy="0"/>
+            </a:xfrm>
+            <a:prstGeom prst="straightConnector1">
+              <a:avLst/>
+            </a:prstGeom>
+            <a:ln>
+              <a:prstDash val="solid"/>
+              <a:tailEnd type="arrow"/>
+            </a:ln>
+            <a:effectLst/>
+          </p:spPr>
+          <p:style>
+            <a:lnRef idx="2">
+              <a:schemeClr val="dk1"/>
+            </a:lnRef>
+            <a:fillRef idx="0">
+              <a:schemeClr val="dk1"/>
+            </a:fillRef>
+            <a:effectRef idx="1">
+              <a:schemeClr val="dk1"/>
+            </a:effectRef>
+            <a:fontRef idx="minor">
+              <a:schemeClr val="tx1"/>
+            </a:fontRef>
+          </p:style>
+        </p:cxnSp>
+        <p:cxnSp>
+          <p:nvCxnSpPr>
+            <p:cNvPr id="62" name="Straight Arrow Connector 61"/>
+            <p:cNvCxnSpPr>
+              <a:stCxn id="37" idx="3"/>
+            </p:cNvCxnSpPr>
+            <p:nvPr/>
+          </p:nvCxnSpPr>
+          <p:spPr>
+            <a:xfrm>
+              <a:off x="2898248" y="2207488"/>
+              <a:ext cx="1429470" cy="10428"/>
+            </a:xfrm>
+            <a:prstGeom prst="straightConnector1">
+              <a:avLst/>
+            </a:prstGeom>
+            <a:ln>
+              <a:prstDash val="solid"/>
+              <a:tailEnd type="arrow"/>
+            </a:ln>
+            <a:effectLst/>
+          </p:spPr>
+          <p:style>
+            <a:lnRef idx="2">
+              <a:schemeClr val="dk1"/>
+            </a:lnRef>
+            <a:fillRef idx="0">
+              <a:schemeClr val="dk1"/>
+            </a:fillRef>
+            <a:effectRef idx="1">
+              <a:schemeClr val="dk1"/>
+            </a:effectRef>
+            <a:fontRef idx="minor">
+              <a:schemeClr val="tx1"/>
+            </a:fontRef>
+          </p:style>
+        </p:cxnSp>
+        <p:sp>
+          <p:nvSpPr>
+            <p:cNvPr id="63" name="Rectangle 62"/>
+            <p:cNvSpPr/>
+            <p:nvPr/>
+          </p:nvSpPr>
+          <p:spPr>
+            <a:xfrm>
+              <a:off x="4344727" y="1865356"/>
+              <a:ext cx="378325" cy="179884"/>
+            </a:xfrm>
+            <a:prstGeom prst="rect">
+              <a:avLst/>
+            </a:prstGeom>
+          </p:spPr>
+          <p:style>
+            <a:lnRef idx="2">
+              <a:schemeClr val="dk1"/>
+            </a:lnRef>
+            <a:fillRef idx="1">
+              <a:schemeClr val="lt1"/>
+            </a:fillRef>
+            <a:effectRef idx="0">
+              <a:schemeClr val="dk1"/>
+            </a:effectRef>
+            <a:fontRef idx="minor">
+              <a:schemeClr val="dk1"/>
+            </a:fontRef>
+          </p:style>
+          <p:txBody>
+            <a:bodyPr rtlCol="0" anchor="ctr"/>
+            <a:lstStyle/>
+            <a:p>
+              <a:pPr algn="ctr"/>
+              <a:endParaRPr lang="en-US"/>
+            </a:p>
+          </p:txBody>
+        </p:sp>
+        <p:cxnSp>
+          <p:nvCxnSpPr>
+            <p:cNvPr id="64" name="Straight Arrow Connector 63"/>
+            <p:cNvCxnSpPr/>
+            <p:nvPr/>
+          </p:nvCxnSpPr>
+          <p:spPr>
+            <a:xfrm>
+              <a:off x="2898248" y="2032911"/>
+              <a:ext cx="1387362" cy="0"/>
+            </a:xfrm>
+            <a:prstGeom prst="straightConnector1">
+              <a:avLst/>
+            </a:prstGeom>
+            <a:ln>
+              <a:prstDash val="dash"/>
+              <a:headEnd type="arrow"/>
+              <a:tailEnd type="none"/>
+            </a:ln>
+            <a:effectLst/>
+          </p:spPr>
+          <p:style>
+            <a:lnRef idx="2">
+              <a:schemeClr val="dk1"/>
+            </a:lnRef>
+            <a:fillRef idx="0">
+              <a:schemeClr val="dk1"/>
+            </a:fillRef>
+            <a:effectRef idx="1">
+              <a:schemeClr val="dk1"/>
+            </a:effectRef>
+            <a:fontRef idx="minor">
+              <a:schemeClr val="tx1"/>
+            </a:fontRef>
+          </p:style>
+        </p:cxnSp>
+        <p:cxnSp>
+          <p:nvCxnSpPr>
+            <p:cNvPr id="65" name="Straight Arrow Connector 64"/>
+            <p:cNvCxnSpPr>
+              <a:endCxn id="48" idx="1"/>
+            </p:cNvCxnSpPr>
+            <p:nvPr/>
+          </p:nvCxnSpPr>
+          <p:spPr>
+            <a:xfrm>
+              <a:off x="4723052" y="2291890"/>
+              <a:ext cx="765994" cy="0"/>
+            </a:xfrm>
+            <a:prstGeom prst="straightConnector1">
+              <a:avLst/>
+            </a:prstGeom>
+            <a:ln>
+              <a:prstDash val="solid"/>
+              <a:tailEnd type="arrow"/>
+            </a:ln>
+            <a:effectLst/>
+          </p:spPr>
+          <p:style>
+            <a:lnRef idx="2">
+              <a:schemeClr val="dk1"/>
+            </a:lnRef>
+            <a:fillRef idx="0">
+              <a:schemeClr val="dk1"/>
+            </a:fillRef>
+            <a:effectRef idx="1">
+              <a:schemeClr val="dk1"/>
+            </a:effectRef>
+            <a:fontRef idx="minor">
+              <a:schemeClr val="tx1"/>
+            </a:fontRef>
+          </p:style>
+        </p:cxnSp>
+        <p:sp>
+          <p:nvSpPr>
+            <p:cNvPr id="69" name="Rectangle 68"/>
+            <p:cNvSpPr/>
+            <p:nvPr/>
+          </p:nvSpPr>
+          <p:spPr>
+            <a:xfrm>
+              <a:off x="6129157" y="2487852"/>
+              <a:ext cx="378325" cy="179884"/>
+            </a:xfrm>
+            <a:prstGeom prst="rect">
+              <a:avLst/>
+            </a:prstGeom>
+          </p:spPr>
+          <p:style>
+            <a:lnRef idx="2">
+              <a:schemeClr val="dk1"/>
+            </a:lnRef>
+            <a:fillRef idx="1">
+              <a:schemeClr val="lt1"/>
+            </a:fillRef>
+            <a:effectRef idx="0">
+              <a:schemeClr val="dk1"/>
+            </a:effectRef>
+            <a:fontRef idx="minor">
+              <a:schemeClr val="dk1"/>
+            </a:fontRef>
+          </p:style>
+          <p:txBody>
+            <a:bodyPr rtlCol="0" anchor="ctr"/>
+            <a:lstStyle/>
+            <a:p>
+              <a:pPr algn="ctr"/>
+              <a:endParaRPr lang="en-US"/>
+            </a:p>
+          </p:txBody>
+        </p:sp>
+        <p:cxnSp>
+          <p:nvCxnSpPr>
+            <p:cNvPr id="70" name="Straight Arrow Connector 69"/>
+            <p:cNvCxnSpPr/>
+            <p:nvPr/>
+          </p:nvCxnSpPr>
+          <p:spPr>
+            <a:xfrm>
+              <a:off x="4706043" y="2667736"/>
+              <a:ext cx="1387362" cy="0"/>
+            </a:xfrm>
+            <a:prstGeom prst="straightConnector1">
+              <a:avLst/>
+            </a:prstGeom>
+            <a:ln>
+              <a:prstDash val="dash"/>
+              <a:headEnd type="arrow"/>
+              <a:tailEnd type="none"/>
+            </a:ln>
+            <a:effectLst/>
+          </p:spPr>
+          <p:style>
+            <a:lnRef idx="2">
+              <a:schemeClr val="dk1"/>
+            </a:lnRef>
+            <a:fillRef idx="0">
+              <a:schemeClr val="dk1"/>
+            </a:fillRef>
+            <a:effectRef idx="1">
+              <a:schemeClr val="dk1"/>
+            </a:effectRef>
+            <a:fontRef idx="minor">
+              <a:schemeClr val="tx1"/>
+            </a:fontRef>
+          </p:style>
+        </p:cxnSp>
+        <p:cxnSp>
+          <p:nvCxnSpPr>
+            <p:cNvPr id="71" name="Straight Arrow Connector 70"/>
+            <p:cNvCxnSpPr/>
+            <p:nvPr/>
+          </p:nvCxnSpPr>
+          <p:spPr>
+            <a:xfrm>
+              <a:off x="2898248" y="2820137"/>
+              <a:ext cx="1387362" cy="0"/>
+            </a:xfrm>
+            <a:prstGeom prst="straightConnector1">
+              <a:avLst/>
+            </a:prstGeom>
+            <a:ln>
+              <a:prstDash val="dash"/>
+              <a:headEnd type="arrow"/>
+              <a:tailEnd type="none"/>
+            </a:ln>
+            <a:effectLst/>
+          </p:spPr>
+          <p:style>
+            <a:lnRef idx="2">
+              <a:schemeClr val="dk1"/>
+            </a:lnRef>
+            <a:fillRef idx="0">
+              <a:schemeClr val="dk1"/>
+            </a:fillRef>
+            <a:effectRef idx="1">
+              <a:schemeClr val="dk1"/>
+            </a:effectRef>
+            <a:fontRef idx="minor">
+              <a:schemeClr val="tx1"/>
+            </a:fontRef>
+          </p:style>
+        </p:cxnSp>
+        <p:sp>
+          <p:nvSpPr>
+            <p:cNvPr id="72" name="TextBox 71"/>
+            <p:cNvSpPr txBox="1"/>
+            <p:nvPr/>
+          </p:nvSpPr>
+          <p:spPr>
+            <a:xfrm>
+              <a:off x="3409840" y="2217916"/>
+              <a:ext cx="622962" cy="276999"/>
+            </a:xfrm>
+            <a:prstGeom prst="rect">
+              <a:avLst/>
+            </a:prstGeom>
+            <a:noFill/>
+          </p:spPr>
+          <p:txBody>
+            <a:bodyPr wrap="none" rtlCol="0">
+              <a:spAutoFit/>
+            </a:bodyPr>
+            <a:lstStyle/>
+            <a:p>
+              <a:r>
+                <a:rPr lang="en-US" sz="1200" dirty="0" smtClean="0"/>
+                <a:t>parse()</a:t>
+              </a:r>
+              <a:endParaRPr lang="en-US" sz="1200" dirty="0"/>
+            </a:p>
+          </p:txBody>
+        </p:sp>
+        <p:sp>
+          <p:nvSpPr>
+            <p:cNvPr id="78" name="TextBox 77"/>
+            <p:cNvSpPr txBox="1"/>
+            <p:nvPr/>
+          </p:nvSpPr>
+          <p:spPr>
+            <a:xfrm>
+              <a:off x="1132142" y="1208823"/>
+              <a:ext cx="1416298" cy="276999"/>
+            </a:xfrm>
+            <a:prstGeom prst="rect">
+              <a:avLst/>
+            </a:prstGeom>
+            <a:noFill/>
+          </p:spPr>
+          <p:txBody>
+            <a:bodyPr wrap="none" rtlCol="0">
+              <a:spAutoFit/>
+            </a:bodyPr>
+            <a:lstStyle/>
+            <a:p>
+              <a:r>
+                <a:rPr lang="en-US" sz="1200" dirty="0" err="1" smtClean="0"/>
+                <a:t>executeCommand</a:t>
+              </a:r>
+              <a:r>
+                <a:rPr lang="en-US" sz="1200" dirty="0" smtClean="0"/>
+                <a:t>()</a:t>
+              </a:r>
+              <a:endParaRPr lang="en-US" sz="1200" dirty="0"/>
+            </a:p>
+          </p:txBody>
+        </p:sp>
+        <p:sp>
+          <p:nvSpPr>
+            <p:cNvPr id="82" name="TextBox 81"/>
+            <p:cNvSpPr txBox="1"/>
+            <p:nvPr/>
+          </p:nvSpPr>
+          <p:spPr>
+            <a:xfrm>
+              <a:off x="3176332" y="3348922"/>
+              <a:ext cx="771816" cy="276999"/>
+            </a:xfrm>
+            <a:prstGeom prst="rect">
+              <a:avLst/>
+            </a:prstGeom>
+            <a:noFill/>
+          </p:spPr>
+          <p:txBody>
+            <a:bodyPr wrap="none" rtlCol="0">
+              <a:spAutoFit/>
+            </a:bodyPr>
+            <a:lstStyle/>
+            <a:p>
+              <a:r>
+                <a:rPr lang="en-US" sz="1200" dirty="0" smtClean="0"/>
+                <a:t>execute()</a:t>
+              </a:r>
+              <a:endParaRPr lang="en-US" sz="1200" dirty="0"/>
+            </a:p>
+          </p:txBody>
+        </p:sp>
+        <p:cxnSp>
+          <p:nvCxnSpPr>
+            <p:cNvPr id="84" name="Straight Connector 83"/>
+            <p:cNvCxnSpPr/>
+            <p:nvPr/>
+          </p:nvCxnSpPr>
+          <p:spPr>
+            <a:xfrm>
+              <a:off x="9954000" y="1094435"/>
+              <a:ext cx="0" cy="4601113"/>
+            </a:xfrm>
+            <a:prstGeom prst="line">
+              <a:avLst/>
+            </a:prstGeom>
+            <a:ln>
+              <a:prstDash val="dash"/>
+            </a:ln>
+            <a:effectLst/>
+          </p:spPr>
+          <p:style>
+            <a:lnRef idx="2">
+              <a:schemeClr val="dk1"/>
+            </a:lnRef>
+            <a:fillRef idx="0">
+              <a:schemeClr val="dk1"/>
+            </a:fillRef>
+            <a:effectRef idx="1">
+              <a:schemeClr val="dk1"/>
+            </a:effectRef>
+            <a:fontRef idx="minor">
+              <a:schemeClr val="tx1"/>
+            </a:fontRef>
+          </p:style>
+        </p:cxnSp>
+        <p:sp>
+          <p:nvSpPr>
+            <p:cNvPr id="85" name="Rectangle 84"/>
+            <p:cNvSpPr/>
+            <p:nvPr/>
+          </p:nvSpPr>
+          <p:spPr>
+            <a:xfrm>
+              <a:off x="9144000" y="710227"/>
+              <a:ext cx="1620000" cy="384208"/>
+            </a:xfrm>
+            <a:prstGeom prst="rect">
+              <a:avLst/>
+            </a:prstGeom>
+            <a:solidFill>
+              <a:srgbClr val="FFFFFF"/>
+            </a:solidFill>
+          </p:spPr>
+          <p:style>
+            <a:lnRef idx="2">
+              <a:schemeClr val="dk1"/>
+            </a:lnRef>
+            <a:fillRef idx="1">
+              <a:schemeClr val="lt1"/>
+            </a:fillRef>
+            <a:effectRef idx="0">
+              <a:schemeClr val="dk1"/>
+            </a:effectRef>
+            <a:fontRef idx="minor">
+              <a:schemeClr val="dk1"/>
+            </a:fontRef>
+          </p:style>
+          <p:txBody>
+            <a:bodyPr rtlCol="0" anchor="ctr"/>
+            <a:lstStyle/>
+            <a:p>
+              <a:pPr algn="ctr"/>
+              <a:r>
+                <a:rPr lang="en-US" sz="1200" dirty="0" smtClean="0"/>
+                <a:t>Filter</a:t>
+              </a:r>
+              <a:endParaRPr lang="en-US" sz="1200" dirty="0"/>
+            </a:p>
+          </p:txBody>
+        </p:sp>
+        <p:sp>
+          <p:nvSpPr>
+            <p:cNvPr id="86" name="Rectangle 85"/>
+            <p:cNvSpPr/>
+            <p:nvPr/>
+          </p:nvSpPr>
+          <p:spPr>
+            <a:xfrm>
+              <a:off x="6109883" y="3611195"/>
+              <a:ext cx="378325" cy="1552254"/>
+            </a:xfrm>
+            <a:prstGeom prst="rect">
+              <a:avLst/>
+            </a:prstGeom>
+          </p:spPr>
+          <p:style>
+            <a:lnRef idx="2">
+              <a:schemeClr val="dk1"/>
+            </a:lnRef>
+            <a:fillRef idx="1">
+              <a:schemeClr val="lt1"/>
+            </a:fillRef>
+            <a:effectRef idx="0">
+              <a:schemeClr val="dk1"/>
+            </a:effectRef>
+            <a:fontRef idx="minor">
+              <a:schemeClr val="dk1"/>
+            </a:fontRef>
+          </p:style>
+          <p:txBody>
+            <a:bodyPr rtlCol="0" anchor="ctr"/>
+            <a:lstStyle/>
+            <a:p>
+              <a:pPr algn="ctr"/>
+              <a:endParaRPr lang="en-US"/>
+            </a:p>
+          </p:txBody>
+        </p:sp>
+        <p:cxnSp>
+          <p:nvCxnSpPr>
+            <p:cNvPr id="88" name="Straight Arrow Connector 87"/>
+            <p:cNvCxnSpPr/>
+            <p:nvPr/>
+          </p:nvCxnSpPr>
+          <p:spPr>
+            <a:xfrm>
+              <a:off x="6488208" y="3751581"/>
+              <a:ext cx="1393059" cy="0"/>
+            </a:xfrm>
+            <a:prstGeom prst="straightConnector1">
+              <a:avLst/>
+            </a:prstGeom>
+            <a:ln>
+              <a:prstDash val="solid"/>
+              <a:tailEnd type="arrow"/>
+            </a:ln>
+            <a:effectLst/>
+          </p:spPr>
+          <p:style>
+            <a:lnRef idx="2">
+              <a:schemeClr val="dk1"/>
+            </a:lnRef>
+            <a:fillRef idx="0">
+              <a:schemeClr val="dk1"/>
+            </a:fillRef>
+            <a:effectRef idx="1">
+              <a:schemeClr val="dk1"/>
+            </a:effectRef>
+            <a:fontRef idx="minor">
+              <a:schemeClr val="tx1"/>
+            </a:fontRef>
+          </p:style>
+        </p:cxnSp>
+        <p:sp>
+          <p:nvSpPr>
+            <p:cNvPr id="90" name="Rectangle 89"/>
+            <p:cNvSpPr/>
+            <p:nvPr/>
+          </p:nvSpPr>
+          <p:spPr>
+            <a:xfrm>
+              <a:off x="7881267" y="3722457"/>
+              <a:ext cx="378325" cy="381174"/>
+            </a:xfrm>
+            <a:prstGeom prst="rect">
+              <a:avLst/>
+            </a:prstGeom>
+          </p:spPr>
+          <p:style>
+            <a:lnRef idx="2">
+              <a:schemeClr val="dk1"/>
+            </a:lnRef>
+            <a:fillRef idx="1">
+              <a:schemeClr val="lt1"/>
+            </a:fillRef>
+            <a:effectRef idx="0">
+              <a:schemeClr val="dk1"/>
+            </a:effectRef>
+            <a:fontRef idx="minor">
+              <a:schemeClr val="dk1"/>
+            </a:fontRef>
+          </p:style>
+          <p:txBody>
+            <a:bodyPr rtlCol="0" anchor="ctr"/>
+            <a:lstStyle/>
+            <a:p>
+              <a:pPr algn="ctr"/>
+              <a:endParaRPr lang="en-US"/>
+            </a:p>
+          </p:txBody>
+        </p:sp>
+        <p:cxnSp>
+          <p:nvCxnSpPr>
+            <p:cNvPr id="92" name="Straight Arrow Connector 91"/>
+            <p:cNvCxnSpPr/>
+            <p:nvPr/>
+          </p:nvCxnSpPr>
+          <p:spPr>
+            <a:xfrm>
+              <a:off x="6488208" y="4103631"/>
+              <a:ext cx="1387362" cy="0"/>
+            </a:xfrm>
+            <a:prstGeom prst="straightConnector1">
+              <a:avLst/>
+            </a:prstGeom>
+            <a:ln>
+              <a:prstDash val="dash"/>
+              <a:headEnd type="arrow"/>
+              <a:tailEnd type="none"/>
+            </a:ln>
+            <a:effectLst/>
+          </p:spPr>
+          <p:style>
+            <a:lnRef idx="2">
+              <a:schemeClr val="dk1"/>
+            </a:lnRef>
+            <a:fillRef idx="0">
+              <a:schemeClr val="dk1"/>
+            </a:fillRef>
+            <a:effectRef idx="1">
+              <a:schemeClr val="dk1"/>
+            </a:effectRef>
+            <a:fontRef idx="minor">
+              <a:schemeClr val="tx1"/>
+            </a:fontRef>
+          </p:style>
+        </p:cxnSp>
+        <p:sp>
+          <p:nvSpPr>
+            <p:cNvPr id="93" name="TextBox 92"/>
+            <p:cNvSpPr txBox="1"/>
+            <p:nvPr/>
+          </p:nvSpPr>
+          <p:spPr>
+            <a:xfrm>
+              <a:off x="6808924" y="3474582"/>
+              <a:ext cx="903012" cy="276999"/>
+            </a:xfrm>
+            <a:prstGeom prst="rect">
+              <a:avLst/>
+            </a:prstGeom>
+            <a:noFill/>
+          </p:spPr>
+          <p:txBody>
+            <a:bodyPr wrap="none" rtlCol="0">
+              <a:spAutoFit/>
+            </a:bodyPr>
+            <a:lstStyle/>
+            <a:p>
+              <a:r>
+                <a:rPr lang="en-US" sz="1200" dirty="0" err="1" smtClean="0"/>
+                <a:t>getPapers</a:t>
+              </a:r>
+              <a:r>
+                <a:rPr lang="en-US" sz="1200" dirty="0" smtClean="0"/>
+                <a:t>()</a:t>
+              </a:r>
+              <a:endParaRPr lang="en-US" sz="1200" dirty="0"/>
+            </a:p>
+          </p:txBody>
+        </p:sp>
+        <p:sp>
+          <p:nvSpPr>
+            <p:cNvPr id="94" name="Rectangle 93"/>
+            <p:cNvSpPr/>
+            <p:nvPr/>
+          </p:nvSpPr>
+          <p:spPr>
+            <a:xfrm>
+              <a:off x="9764837" y="4333605"/>
+              <a:ext cx="378325" cy="381761"/>
+            </a:xfrm>
+            <a:prstGeom prst="rect">
+              <a:avLst/>
+            </a:prstGeom>
+          </p:spPr>
+          <p:style>
+            <a:lnRef idx="2">
+              <a:schemeClr val="dk1"/>
+            </a:lnRef>
+            <a:fillRef idx="1">
+              <a:schemeClr val="lt1"/>
+            </a:fillRef>
+            <a:effectRef idx="0">
+              <a:schemeClr val="dk1"/>
+            </a:effectRef>
+            <a:fontRef idx="minor">
+              <a:schemeClr val="dk1"/>
+            </a:fontRef>
+          </p:style>
+          <p:txBody>
+            <a:bodyPr rtlCol="0" anchor="ctr"/>
+            <a:lstStyle/>
+            <a:p>
+              <a:pPr algn="ctr"/>
+              <a:endParaRPr lang="en-US"/>
+            </a:p>
+          </p:txBody>
+        </p:sp>
+        <p:cxnSp>
+          <p:nvCxnSpPr>
+            <p:cNvPr id="95" name="Straight Arrow Connector 94"/>
+            <p:cNvCxnSpPr/>
+            <p:nvPr/>
+          </p:nvCxnSpPr>
+          <p:spPr>
+            <a:xfrm>
+              <a:off x="6507482" y="4350794"/>
+              <a:ext cx="3257355" cy="0"/>
+            </a:xfrm>
+            <a:prstGeom prst="straightConnector1">
+              <a:avLst/>
+            </a:prstGeom>
+            <a:ln>
+              <a:prstDash val="solid"/>
+              <a:tailEnd type="arrow"/>
+            </a:ln>
+            <a:effectLst/>
+          </p:spPr>
+          <p:style>
+            <a:lnRef idx="2">
+              <a:schemeClr val="dk1"/>
+            </a:lnRef>
+            <a:fillRef idx="0">
+              <a:schemeClr val="dk1"/>
+            </a:fillRef>
+            <a:effectRef idx="1">
+              <a:schemeClr val="dk1"/>
+            </a:effectRef>
+            <a:fontRef idx="minor">
+              <a:schemeClr val="tx1"/>
+            </a:fontRef>
+          </p:style>
+        </p:cxnSp>
+        <p:sp>
+          <p:nvSpPr>
+            <p:cNvPr id="97" name="TextBox 96"/>
+            <p:cNvSpPr txBox="1"/>
+            <p:nvPr/>
+          </p:nvSpPr>
+          <p:spPr>
+            <a:xfrm>
+              <a:off x="8379256" y="4056606"/>
+              <a:ext cx="1002348" cy="276999"/>
+            </a:xfrm>
+            <a:prstGeom prst="rect">
+              <a:avLst/>
+            </a:prstGeom>
+            <a:noFill/>
+          </p:spPr>
+          <p:txBody>
+            <a:bodyPr wrap="none" rtlCol="0">
+              <a:spAutoFit/>
+            </a:bodyPr>
+            <a:lstStyle/>
+            <a:p>
+              <a:r>
+                <a:rPr lang="en-US" sz="1200" dirty="0" smtClean="0"/>
+                <a:t>filter(papers)</a:t>
+              </a:r>
+              <a:endParaRPr lang="en-US" sz="1200" dirty="0"/>
+            </a:p>
+          </p:txBody>
+        </p:sp>
+        <p:cxnSp>
+          <p:nvCxnSpPr>
+            <p:cNvPr id="98" name="Straight Arrow Connector 97"/>
+            <p:cNvCxnSpPr/>
+            <p:nvPr/>
+          </p:nvCxnSpPr>
+          <p:spPr>
+            <a:xfrm>
+              <a:off x="6507482" y="4715366"/>
+              <a:ext cx="3259136" cy="0"/>
+            </a:xfrm>
+            <a:prstGeom prst="straightConnector1">
+              <a:avLst/>
+            </a:prstGeom>
+            <a:ln>
+              <a:prstDash val="dash"/>
+              <a:headEnd type="arrow"/>
+              <a:tailEnd type="none"/>
+            </a:ln>
+            <a:effectLst/>
+          </p:spPr>
+          <p:style>
+            <a:lnRef idx="2">
+              <a:schemeClr val="dk1"/>
+            </a:lnRef>
+            <a:fillRef idx="0">
+              <a:schemeClr val="dk1"/>
+            </a:fillRef>
+            <a:effectRef idx="1">
+              <a:schemeClr val="dk1"/>
+            </a:effectRef>
+            <a:fontRef idx="minor">
+              <a:schemeClr val="tx1"/>
+            </a:fontRef>
+          </p:style>
+        </p:cxnSp>
+        <p:cxnSp>
+          <p:nvCxnSpPr>
+            <p:cNvPr id="100" name="Straight Arrow Connector 99"/>
+            <p:cNvCxnSpPr/>
+            <p:nvPr/>
+          </p:nvCxnSpPr>
+          <p:spPr>
+            <a:xfrm>
+              <a:off x="1132142" y="5163449"/>
+              <a:ext cx="4961263" cy="0"/>
+            </a:xfrm>
+            <a:prstGeom prst="straightConnector1">
+              <a:avLst/>
+            </a:prstGeom>
+            <a:ln>
+              <a:prstDash val="dash"/>
+              <a:headEnd type="arrow"/>
+              <a:tailEnd type="none"/>
+            </a:ln>
+            <a:effectLst/>
+          </p:spPr>
+          <p:style>
+            <a:lnRef idx="2">
+              <a:schemeClr val="dk1"/>
+            </a:lnRef>
+            <a:fillRef idx="0">
+              <a:schemeClr val="dk1"/>
+            </a:fillRef>
+            <a:effectRef idx="1">
+              <a:schemeClr val="dk1"/>
+            </a:effectRef>
+            <a:fontRef idx="minor">
+              <a:schemeClr val="tx1"/>
+            </a:fontRef>
+          </p:style>
+        </p:cxnSp>
+        <p:sp>
+          <p:nvSpPr>
+            <p:cNvPr id="102" name="TextBox 101"/>
+            <p:cNvSpPr txBox="1"/>
+            <p:nvPr/>
+          </p:nvSpPr>
+          <p:spPr>
+            <a:xfrm>
+              <a:off x="2855365" y="4886450"/>
+              <a:ext cx="1472353" cy="276999"/>
+            </a:xfrm>
+            <a:prstGeom prst="rect">
+              <a:avLst/>
+            </a:prstGeom>
+            <a:noFill/>
+          </p:spPr>
+          <p:txBody>
+            <a:bodyPr wrap="none" rtlCol="0">
+              <a:spAutoFit/>
+            </a:bodyPr>
+            <a:lstStyle/>
+            <a:p>
+              <a:r>
+                <a:rPr lang="en-US" sz="1200" dirty="0" smtClean="0"/>
+                <a:t>JSON representation</a:t>
+              </a:r>
+              <a:endParaRPr lang="en-US" sz="1200" dirty="0"/>
+            </a:p>
+          </p:txBody>
+        </p:sp>
+      </p:grpSp>
+    </p:spTree>
+    <p:extLst>
+      <p:ext uri="{BB962C8B-B14F-4D97-AF65-F5344CB8AC3E}">
+        <p14:creationId xmlns:p14="http://schemas.microsoft.com/office/powerpoint/2010/main" val="361538156"/>
+      </p:ext>
+    </p:extLst>
+  </p:cSld>
+  <p:clrMapOvr>
+    <a:masterClrMapping/>
+  </p:clrMapOvr>
+</p:sld>
+</file>
+
+<file path=ppt/slides/slide5.xml><?xml version="1.0" encoding="utf-8"?>
+<p:sld xmlns:a="http://schemas.openxmlformats.org/drawingml/2006/main" xmlns:r="http://schemas.openxmlformats.org/officeDocument/2006/relationships" xmlns:p="http://schemas.openxmlformats.org/presentationml/2006/main">
+  <p:cSld>
+    <p:spTree>
+      <p:nvGrpSpPr>
+        <p:cNvPr id="1" name=""/>
+        <p:cNvGrpSpPr/>
+        <p:nvPr/>
+      </p:nvGrpSpPr>
+      <p:grpSpPr>
+        <a:xfrm>
+          <a:off x="0" y="0"/>
+          <a:ext cx="0" cy="0"/>
+          <a:chOff x="0" y="0"/>
+          <a:chExt cx="0" cy="0"/>
+        </a:xfrm>
+      </p:grpSpPr>
+      <p:grpSp>
+        <p:nvGrpSpPr>
           <p:cNvPr id="65" name="Group 64"/>
           <p:cNvGrpSpPr/>
           <p:nvPr/>
@@ -7424,7 +9074,7 @@
 </p:sld>
 </file>
 
-<file path=ppt/slides/slide5.xml><?xml version="1.0" encoding="utf-8"?>
+<file path=ppt/slides/slide6.xml><?xml version="1.0" encoding="utf-8"?>
 <p:sld xmlns:a="http://schemas.openxmlformats.org/drawingml/2006/main" xmlns:r="http://schemas.openxmlformats.org/officeDocument/2006/relationships" xmlns:p="http://schemas.openxmlformats.org/presentationml/2006/main">
   <p:cSld>
     <p:spTree>
@@ -8132,7 +9782,7 @@
 </p:sld>
 </file>
 
-<file path=ppt/slides/slide6.xml><?xml version="1.0" encoding="utf-8"?>
+<file path=ppt/slides/slide7.xml><?xml version="1.0" encoding="utf-8"?>
 <p:sld xmlns:a="http://schemas.openxmlformats.org/drawingml/2006/main" xmlns:r="http://schemas.openxmlformats.org/officeDocument/2006/relationships" xmlns:p="http://schemas.openxmlformats.org/presentationml/2006/main">
   <p:cSld>
     <p:spTree>
@@ -8844,7 +10494,7 @@
 </p:sld>
 </file>
 
-<file path=ppt/slides/slide7.xml><?xml version="1.0" encoding="utf-8"?>
+<file path=ppt/slides/slide8.xml><?xml version="1.0" encoding="utf-8"?>
 <p:sld xmlns:a="http://schemas.openxmlformats.org/drawingml/2006/main" xmlns:r="http://schemas.openxmlformats.org/officeDocument/2006/relationships" xmlns:p="http://schemas.openxmlformats.org/presentationml/2006/main">
   <p:cSld>
     <p:spTree>
@@ -9268,7 +10918,7 @@
 </p:sld>
 </file>
 
-<file path=ppt/slides/slide8.xml><?xml version="1.0" encoding="utf-8"?>
+<file path=ppt/slides/slide9.xml><?xml version="1.0" encoding="utf-8"?>
 <p:sld xmlns:a="http://schemas.openxmlformats.org/drawingml/2006/main" xmlns:r="http://schemas.openxmlformats.org/officeDocument/2006/relationships" xmlns:p="http://schemas.openxmlformats.org/presentationml/2006/main">
   <p:cSld>
     <p:spTree>

</xml_diff>